<commit_message>
added handouts, adjusted links
</commit_message>
<xml_diff>
--- a/Introduction to D3.pptx
+++ b/Introduction to D3.pptx
@@ -6,42 +6,43 @@
   </p:sldMasterIdLst>
   <p:sldIdLst>
     <p:sldId id="256" r:id="rId2"/>
-    <p:sldId id="263" r:id="rId3"/>
-    <p:sldId id="285" r:id="rId4"/>
-    <p:sldId id="286" r:id="rId5"/>
-    <p:sldId id="287" r:id="rId6"/>
-    <p:sldId id="298" r:id="rId7"/>
-    <p:sldId id="288" r:id="rId8"/>
-    <p:sldId id="294" r:id="rId9"/>
-    <p:sldId id="293" r:id="rId10"/>
-    <p:sldId id="295" r:id="rId11"/>
-    <p:sldId id="296" r:id="rId12"/>
-    <p:sldId id="297" r:id="rId13"/>
-    <p:sldId id="299" r:id="rId14"/>
-    <p:sldId id="280" r:id="rId15"/>
-    <p:sldId id="273" r:id="rId16"/>
-    <p:sldId id="279" r:id="rId17"/>
-    <p:sldId id="274" r:id="rId18"/>
-    <p:sldId id="290" r:id="rId19"/>
-    <p:sldId id="284" r:id="rId20"/>
-    <p:sldId id="281" r:id="rId21"/>
-    <p:sldId id="275" r:id="rId22"/>
-    <p:sldId id="282" r:id="rId23"/>
-    <p:sldId id="276" r:id="rId24"/>
-    <p:sldId id="277" r:id="rId25"/>
-    <p:sldId id="283" r:id="rId26"/>
-    <p:sldId id="291" r:id="rId27"/>
-    <p:sldId id="278" r:id="rId28"/>
-    <p:sldId id="292" r:id="rId29"/>
-    <p:sldId id="270" r:id="rId30"/>
-    <p:sldId id="261" r:id="rId31"/>
-    <p:sldId id="268" r:id="rId32"/>
-    <p:sldId id="266" r:id="rId33"/>
-    <p:sldId id="264" r:id="rId34"/>
-    <p:sldId id="262" r:id="rId35"/>
-    <p:sldId id="269" r:id="rId36"/>
-    <p:sldId id="267" r:id="rId37"/>
-    <p:sldId id="259" r:id="rId38"/>
+    <p:sldId id="300" r:id="rId3"/>
+    <p:sldId id="263" r:id="rId4"/>
+    <p:sldId id="285" r:id="rId5"/>
+    <p:sldId id="286" r:id="rId6"/>
+    <p:sldId id="287" r:id="rId7"/>
+    <p:sldId id="298" r:id="rId8"/>
+    <p:sldId id="288" r:id="rId9"/>
+    <p:sldId id="294" r:id="rId10"/>
+    <p:sldId id="293" r:id="rId11"/>
+    <p:sldId id="295" r:id="rId12"/>
+    <p:sldId id="296" r:id="rId13"/>
+    <p:sldId id="297" r:id="rId14"/>
+    <p:sldId id="299" r:id="rId15"/>
+    <p:sldId id="280" r:id="rId16"/>
+    <p:sldId id="273" r:id="rId17"/>
+    <p:sldId id="279" r:id="rId18"/>
+    <p:sldId id="274" r:id="rId19"/>
+    <p:sldId id="290" r:id="rId20"/>
+    <p:sldId id="284" r:id="rId21"/>
+    <p:sldId id="281" r:id="rId22"/>
+    <p:sldId id="275" r:id="rId23"/>
+    <p:sldId id="282" r:id="rId24"/>
+    <p:sldId id="276" r:id="rId25"/>
+    <p:sldId id="277" r:id="rId26"/>
+    <p:sldId id="283" r:id="rId27"/>
+    <p:sldId id="291" r:id="rId28"/>
+    <p:sldId id="278" r:id="rId29"/>
+    <p:sldId id="292" r:id="rId30"/>
+    <p:sldId id="270" r:id="rId31"/>
+    <p:sldId id="261" r:id="rId32"/>
+    <p:sldId id="268" r:id="rId33"/>
+    <p:sldId id="266" r:id="rId34"/>
+    <p:sldId id="264" r:id="rId35"/>
+    <p:sldId id="262" r:id="rId36"/>
+    <p:sldId id="269" r:id="rId37"/>
+    <p:sldId id="267" r:id="rId38"/>
+    <p:sldId id="259" r:id="rId39"/>
   </p:sldIdLst>
   <p:sldSz cx="12192000" cy="6858000"/>
   <p:notesSz cx="6858000" cy="9144000"/>
@@ -3188,6 +3189,181 @@
         </p:nvSpPr>
         <p:spPr>
           <a:xfrm>
+            <a:off x="2739828" y="2657769"/>
+            <a:ext cx="10515600" cy="1325563"/>
+          </a:xfrm>
+        </p:spPr>
+        <p:txBody>
+          <a:bodyPr/>
+          <a:lstStyle/>
+          <a:p>
+            <a:r>
+              <a:rPr lang="en-US" dirty="0" smtClean="0"/>
+              <a:t>Tableau</a:t>
+            </a:r>
+            <a:endParaRPr lang="en-US" dirty="0"/>
+          </a:p>
+        </p:txBody>
+      </p:sp>
+      <p:pic>
+        <p:nvPicPr>
+          <p:cNvPr id="3080" name="Picture 8" descr="https://wittyandpretty.com/wp-content/uploads/2014/09/basic-cake.jpg"/>
+          <p:cNvPicPr>
+            <a:picLocks noChangeAspect="1" noChangeArrowheads="1"/>
+          </p:cNvPicPr>
+          <p:nvPr/>
+        </p:nvPicPr>
+        <p:blipFill rotWithShape="1">
+          <a:blip r:embed="rId2">
+            <a:extLst>
+              <a:ext uri="{28A0092B-C50C-407E-A947-70E740481C1C}">
+                <a14:useLocalDpi xmlns:a14="http://schemas.microsoft.com/office/drawing/2010/main" val="0"/>
+              </a:ext>
+            </a:extLst>
+          </a:blip>
+          <a:srcRect l="7729" r="12698"/>
+          <a:stretch/>
+        </p:blipFill>
+        <p:spPr bwMode="auto">
+          <a:xfrm>
+            <a:off x="5623965" y="365125"/>
+            <a:ext cx="6271327" cy="5910853"/>
+          </a:xfrm>
+          <a:prstGeom prst="rect">
+            <a:avLst/>
+          </a:prstGeom>
+          <a:noFill/>
+          <a:extLst>
+            <a:ext uri="{909E8E84-426E-40DD-AFC4-6F175D3DCCD1}">
+              <a14:hiddenFill xmlns:a14="http://schemas.microsoft.com/office/drawing/2010/main">
+                <a:solidFill>
+                  <a:srgbClr val="FFFFFF"/>
+                </a:solidFill>
+              </a14:hiddenFill>
+            </a:ext>
+          </a:extLst>
+        </p:spPr>
+      </p:pic>
+    </p:spTree>
+    <p:extLst>
+      <p:ext uri="{BB962C8B-B14F-4D97-AF65-F5344CB8AC3E}">
+        <p14:creationId xmlns:p14="http://schemas.microsoft.com/office/powerpoint/2010/main" val="3142918255"/>
+      </p:ext>
+    </p:extLst>
+  </p:cSld>
+  <p:clrMapOvr>
+    <a:masterClrMapping/>
+  </p:clrMapOvr>
+  <p:timing>
+    <p:tnLst>
+      <p:par>
+        <p:cTn id="1" dur="indefinite" restart="never" nodeType="tmRoot">
+          <p:childTnLst>
+            <p:seq concurrent="1" nextAc="seek">
+              <p:cTn id="2" dur="indefinite" nodeType="mainSeq">
+                <p:childTnLst>
+                  <p:par>
+                    <p:cTn id="3" fill="hold">
+                      <p:stCondLst>
+                        <p:cond delay="indefinite"/>
+                      </p:stCondLst>
+                      <p:childTnLst>
+                        <p:par>
+                          <p:cTn id="4" fill="hold">
+                            <p:stCondLst>
+                              <p:cond delay="0"/>
+                            </p:stCondLst>
+                            <p:childTnLst>
+                              <p:par>
+                                <p:cTn id="5" presetID="1" presetClass="entr" presetSubtype="0" fill="hold" grpId="0" nodeType="clickEffect">
+                                  <p:stCondLst>
+                                    <p:cond delay="0"/>
+                                  </p:stCondLst>
+                                  <p:childTnLst>
+                                    <p:set>
+                                      <p:cBhvr>
+                                        <p:cTn id="6" dur="1" fill="hold">
+                                          <p:stCondLst>
+                                            <p:cond delay="0"/>
+                                          </p:stCondLst>
+                                        </p:cTn>
+                                        <p:tgtEl>
+                                          <p:spTgt spid="2"/>
+                                        </p:tgtEl>
+                                        <p:attrNameLst>
+                                          <p:attrName>style.visibility</p:attrName>
+                                        </p:attrNameLst>
+                                      </p:cBhvr>
+                                      <p:to>
+                                        <p:strVal val="visible"/>
+                                      </p:to>
+                                    </p:set>
+                                  </p:childTnLst>
+                                </p:cTn>
+                              </p:par>
+                            </p:childTnLst>
+                          </p:cTn>
+                        </p:par>
+                      </p:childTnLst>
+                    </p:cTn>
+                  </p:par>
+                </p:childTnLst>
+              </p:cTn>
+              <p:prevCondLst>
+                <p:cond evt="onPrev" delay="0">
+                  <p:tgtEl>
+                    <p:sldTgt/>
+                  </p:tgtEl>
+                </p:cond>
+              </p:prevCondLst>
+              <p:nextCondLst>
+                <p:cond evt="onNext" delay="0">
+                  <p:tgtEl>
+                    <p:sldTgt/>
+                  </p:tgtEl>
+                </p:cond>
+              </p:nextCondLst>
+            </p:seq>
+          </p:childTnLst>
+        </p:cTn>
+      </p:par>
+    </p:tnLst>
+    <p:bldLst>
+      <p:bldP spid="2" grpId="0"/>
+    </p:bldLst>
+  </p:timing>
+</p:sld>
+</file>
+
+<file path=ppt/slides/slide11.xml><?xml version="1.0" encoding="utf-8"?>
+<p:sld xmlns:a="http://schemas.openxmlformats.org/drawingml/2006/main" xmlns:r="http://schemas.openxmlformats.org/officeDocument/2006/relationships" xmlns:p="http://schemas.openxmlformats.org/presentationml/2006/main">
+  <p:cSld>
+    <p:spTree>
+      <p:nvGrpSpPr>
+        <p:cNvPr id="1" name=""/>
+        <p:cNvGrpSpPr/>
+        <p:nvPr/>
+      </p:nvGrpSpPr>
+      <p:grpSpPr>
+        <a:xfrm>
+          <a:off x="0" y="0"/>
+          <a:ext cx="0" cy="0"/>
+          <a:chOff x="0" y="0"/>
+          <a:chExt cx="0" cy="0"/>
+        </a:xfrm>
+      </p:grpSpPr>
+      <p:sp>
+        <p:nvSpPr>
+          <p:cNvPr id="2" name="Title 1"/>
+          <p:cNvSpPr>
+            <a:spLocks noGrp="1"/>
+          </p:cNvSpPr>
+          <p:nvPr>
+            <p:ph type="title"/>
+          </p:nvPr>
+        </p:nvSpPr>
+        <p:spPr>
+          <a:xfrm>
             <a:off x="1857797" y="2589200"/>
             <a:ext cx="10515600" cy="1325563"/>
           </a:xfrm>
@@ -3334,7 +3510,7 @@
 </p:sld>
 </file>
 
-<file path=ppt/slides/slide11.xml><?xml version="1.0" encoding="utf-8"?>
+<file path=ppt/slides/slide12.xml><?xml version="1.0" encoding="utf-8"?>
 <p:sld xmlns:a="http://schemas.openxmlformats.org/drawingml/2006/main" xmlns:r="http://schemas.openxmlformats.org/officeDocument/2006/relationships" xmlns:p="http://schemas.openxmlformats.org/presentationml/2006/main">
   <p:cSld>
     <p:spTree>
@@ -3516,160 +3692,6 @@
 </p:sld>
 </file>
 
-<file path=ppt/slides/slide12.xml><?xml version="1.0" encoding="utf-8"?>
-<p:sld xmlns:a="http://schemas.openxmlformats.org/drawingml/2006/main" xmlns:r="http://schemas.openxmlformats.org/officeDocument/2006/relationships" xmlns:p="http://schemas.openxmlformats.org/presentationml/2006/main">
-  <p:cSld>
-    <p:spTree>
-      <p:nvGrpSpPr>
-        <p:cNvPr id="1" name=""/>
-        <p:cNvGrpSpPr/>
-        <p:nvPr/>
-      </p:nvGrpSpPr>
-      <p:grpSpPr>
-        <a:xfrm>
-          <a:off x="0" y="0"/>
-          <a:ext cx="0" cy="0"/>
-          <a:chOff x="0" y="0"/>
-          <a:chExt cx="0" cy="0"/>
-        </a:xfrm>
-      </p:grpSpPr>
-      <p:sp>
-        <p:nvSpPr>
-          <p:cNvPr id="2" name="Title 1"/>
-          <p:cNvSpPr>
-            <a:spLocks noGrp="1"/>
-          </p:cNvSpPr>
-          <p:nvPr>
-            <p:ph type="title"/>
-          </p:nvPr>
-        </p:nvSpPr>
-        <p:spPr/>
-        <p:txBody>
-          <a:bodyPr/>
-          <a:lstStyle/>
-          <a:p>
-            <a:r>
-              <a:rPr lang="en-US" dirty="0" smtClean="0"/>
-              <a:t>The difference is in the recipe:</a:t>
-            </a:r>
-            <a:endParaRPr lang="en-US" dirty="0"/>
-          </a:p>
-        </p:txBody>
-      </p:sp>
-      <p:sp>
-        <p:nvSpPr>
-          <p:cNvPr id="3" name="Content Placeholder 2"/>
-          <p:cNvSpPr>
-            <a:spLocks noGrp="1"/>
-          </p:cNvSpPr>
-          <p:nvPr>
-            <p:ph idx="1"/>
-          </p:nvPr>
-        </p:nvSpPr>
-        <p:spPr>
-          <a:xfrm>
-            <a:off x="838200" y="1537486"/>
-            <a:ext cx="10515600" cy="4960417"/>
-          </a:xfrm>
-        </p:spPr>
-        <p:txBody>
-          <a:bodyPr/>
-          <a:lstStyle/>
-          <a:p>
-            <a:r>
-              <a:rPr lang="en-US" b="1" dirty="0" smtClean="0"/>
-              <a:t>“Store bought” cake is easy: </a:t>
-            </a:r>
-          </a:p>
-          <a:p>
-            <a:pPr lvl="1"/>
-            <a:r>
-              <a:rPr lang="en-US" dirty="0" smtClean="0"/>
-              <a:t>eggs, water, and their pre-mixed flour, </a:t>
-            </a:r>
-          </a:p>
-          <a:p>
-            <a:pPr lvl="1"/>
-            <a:r>
-              <a:rPr lang="en-US" dirty="0" smtClean="0"/>
-              <a:t>bake, </a:t>
-            </a:r>
-          </a:p>
-          <a:p>
-            <a:pPr lvl="1"/>
-            <a:r>
-              <a:rPr lang="en-US" dirty="0" smtClean="0"/>
-              <a:t>and then if you have the time: add frosting</a:t>
-            </a:r>
-          </a:p>
-          <a:p>
-            <a:pPr lvl="1"/>
-            <a:r>
-              <a:rPr lang="en-US" dirty="0" smtClean="0"/>
-              <a:t>In the end? Boring!</a:t>
-            </a:r>
-          </a:p>
-          <a:p>
-            <a:pPr lvl="1"/>
-            <a:endParaRPr lang="en-US" dirty="0"/>
-          </a:p>
-          <a:p>
-            <a:r>
-              <a:rPr lang="en-US" b="1" dirty="0" smtClean="0"/>
-              <a:t>Cake “from scratch” is hard:</a:t>
-            </a:r>
-          </a:p>
-          <a:p>
-            <a:pPr lvl="1"/>
-            <a:r>
-              <a:rPr lang="en-US" dirty="0" smtClean="0"/>
-              <a:t>You have to think about each ingredient, its quality, its needs</a:t>
-            </a:r>
-          </a:p>
-          <a:p>
-            <a:pPr lvl="1"/>
-            <a:r>
-              <a:rPr lang="en-US" dirty="0" smtClean="0"/>
-              <a:t>You must imagine your end-result to find a useful recipe to get there</a:t>
-            </a:r>
-          </a:p>
-          <a:p>
-            <a:pPr lvl="1"/>
-            <a:r>
-              <a:rPr lang="en-US" dirty="0" smtClean="0"/>
-              <a:t>It can take a long time to master each ingredient</a:t>
-            </a:r>
-          </a:p>
-          <a:p>
-            <a:pPr lvl="1"/>
-            <a:r>
-              <a:rPr lang="en-US" dirty="0" smtClean="0"/>
-              <a:t>In the end? A unique masterpiece!</a:t>
-            </a:r>
-            <a:endParaRPr lang="en-US" dirty="0"/>
-          </a:p>
-        </p:txBody>
-      </p:sp>
-    </p:spTree>
-    <p:extLst>
-      <p:ext uri="{BB962C8B-B14F-4D97-AF65-F5344CB8AC3E}">
-        <p14:creationId xmlns:p14="http://schemas.microsoft.com/office/powerpoint/2010/main" val="2932848234"/>
-      </p:ext>
-    </p:extLst>
-  </p:cSld>
-  <p:clrMapOvr>
-    <a:masterClrMapping/>
-  </p:clrMapOvr>
-  <p:timing>
-    <p:tnLst>
-      <p:par>
-        <p:cTn id="1" dur="indefinite" restart="never" nodeType="tmRoot"/>
-      </p:par>
-    </p:tnLst>
-  </p:timing>
-</p:sld>
-</file>
-
 <file path=ppt/slides/slide13.xml><?xml version="1.0" encoding="utf-8"?>
 <p:sld xmlns:a="http://schemas.openxmlformats.org/drawingml/2006/main" xmlns:r="http://schemas.openxmlformats.org/officeDocument/2006/relationships" xmlns:p="http://schemas.openxmlformats.org/presentationml/2006/main">
   <p:cSld>
@@ -3689,51 +3711,116 @@
       </p:grpSpPr>
       <p:sp>
         <p:nvSpPr>
-          <p:cNvPr id="4" name="Title 3"/>
-          <p:cNvSpPr>
-            <a:spLocks noGrp="1"/>
-          </p:cNvSpPr>
-          <p:nvPr>
-            <p:ph type="ctrTitle"/>
-          </p:nvPr>
-        </p:nvSpPr>
-        <p:spPr/>
-        <p:txBody>
-          <a:bodyPr/>
-          <a:lstStyle/>
-          <a:p>
-            <a:r>
-              <a:rPr lang="en-US" dirty="0" smtClean="0"/>
-              <a:t>Cake from Scratch</a:t>
-            </a:r>
-            <a:endParaRPr lang="en-US" dirty="0"/>
-          </a:p>
-        </p:txBody>
-      </p:sp>
-      <p:sp>
-        <p:nvSpPr>
-          <p:cNvPr id="5" name="Subtitle 4"/>
-          <p:cNvSpPr>
-            <a:spLocks noGrp="1"/>
-          </p:cNvSpPr>
-          <p:nvPr>
-            <p:ph type="subTitle" idx="1"/>
-          </p:nvPr>
-        </p:nvSpPr>
-        <p:spPr/>
-        <p:txBody>
-          <a:bodyPr/>
-          <a:lstStyle/>
-          <a:p>
-            <a:r>
-              <a:rPr lang="en-US" dirty="0" smtClean="0"/>
-              <a:t>A “grammar of graphics” is key: </a:t>
-            </a:r>
-          </a:p>
-          <a:p>
-            <a:r>
-              <a:rPr lang="en-US" dirty="0" smtClean="0"/>
-              <a:t>How do we talk about and use visualizations?</a:t>
+          <p:cNvPr id="2" name="Title 1"/>
+          <p:cNvSpPr>
+            <a:spLocks noGrp="1"/>
+          </p:cNvSpPr>
+          <p:nvPr>
+            <p:ph type="title"/>
+          </p:nvPr>
+        </p:nvSpPr>
+        <p:spPr/>
+        <p:txBody>
+          <a:bodyPr/>
+          <a:lstStyle/>
+          <a:p>
+            <a:r>
+              <a:rPr lang="en-US" dirty="0" smtClean="0"/>
+              <a:t>The difference is in the recipe:</a:t>
+            </a:r>
+            <a:endParaRPr lang="en-US" dirty="0"/>
+          </a:p>
+        </p:txBody>
+      </p:sp>
+      <p:sp>
+        <p:nvSpPr>
+          <p:cNvPr id="3" name="Content Placeholder 2"/>
+          <p:cNvSpPr>
+            <a:spLocks noGrp="1"/>
+          </p:cNvSpPr>
+          <p:nvPr>
+            <p:ph idx="1"/>
+          </p:nvPr>
+        </p:nvSpPr>
+        <p:spPr>
+          <a:xfrm>
+            <a:off x="838200" y="1537486"/>
+            <a:ext cx="10515600" cy="4960417"/>
+          </a:xfrm>
+        </p:spPr>
+        <p:txBody>
+          <a:bodyPr/>
+          <a:lstStyle/>
+          <a:p>
+            <a:r>
+              <a:rPr lang="en-US" b="1" dirty="0" smtClean="0"/>
+              <a:t>“Store bought” cake is easy: </a:t>
+            </a:r>
+          </a:p>
+          <a:p>
+            <a:pPr lvl="1"/>
+            <a:r>
+              <a:rPr lang="en-US" dirty="0" smtClean="0"/>
+              <a:t>eggs, water, and their pre-mixed flour, </a:t>
+            </a:r>
+          </a:p>
+          <a:p>
+            <a:pPr lvl="1"/>
+            <a:r>
+              <a:rPr lang="en-US" dirty="0" smtClean="0"/>
+              <a:t>bake, </a:t>
+            </a:r>
+          </a:p>
+          <a:p>
+            <a:pPr lvl="1"/>
+            <a:r>
+              <a:rPr lang="en-US" dirty="0" smtClean="0"/>
+              <a:t>and then if you have the time: add frosting</a:t>
+            </a:r>
+          </a:p>
+          <a:p>
+            <a:pPr lvl="1"/>
+            <a:r>
+              <a:rPr lang="en-US" dirty="0" smtClean="0"/>
+              <a:t>In the end? Boring!</a:t>
+            </a:r>
+          </a:p>
+          <a:p>
+            <a:pPr lvl="1"/>
+            <a:endParaRPr lang="en-US" dirty="0"/>
+          </a:p>
+          <a:p>
+            <a:r>
+              <a:rPr lang="en-US" b="1" dirty="0" smtClean="0"/>
+              <a:t>Cake “from scratch” is hard:</a:t>
+            </a:r>
+          </a:p>
+          <a:p>
+            <a:pPr lvl="1"/>
+            <a:r>
+              <a:rPr lang="en-US" dirty="0" smtClean="0"/>
+              <a:t>You have to think about each ingredient, its quality, its needs</a:t>
+            </a:r>
+          </a:p>
+          <a:p>
+            <a:pPr lvl="1"/>
+            <a:r>
+              <a:rPr lang="en-US" dirty="0" smtClean="0"/>
+              <a:t>You must imagine your end-result to find a useful recipe to get there</a:t>
+            </a:r>
+          </a:p>
+          <a:p>
+            <a:pPr lvl="1"/>
+            <a:r>
+              <a:rPr lang="en-US" dirty="0" smtClean="0"/>
+              <a:t>It can take a long time to master each ingredient</a:t>
+            </a:r>
+          </a:p>
+          <a:p>
+            <a:pPr lvl="1"/>
+            <a:r>
+              <a:rPr lang="en-US" dirty="0" smtClean="0"/>
+              <a:t>In the end? A unique masterpiece!</a:t>
             </a:r>
             <a:endParaRPr lang="en-US" dirty="0"/>
           </a:p>
@@ -3742,7 +3829,7 @@
     </p:spTree>
     <p:extLst>
       <p:ext uri="{BB962C8B-B14F-4D97-AF65-F5344CB8AC3E}">
-        <p14:creationId xmlns:p14="http://schemas.microsoft.com/office/powerpoint/2010/main" val="305827575"/>
+        <p14:creationId xmlns:p14="http://schemas.microsoft.com/office/powerpoint/2010/main" val="2932848234"/>
       </p:ext>
     </p:extLst>
   </p:cSld>
@@ -3778,97 +3865,52 @@
       </p:grpSpPr>
       <p:sp>
         <p:nvSpPr>
-          <p:cNvPr id="2" name="Title 1"/>
-          <p:cNvSpPr>
-            <a:spLocks noGrp="1"/>
-          </p:cNvSpPr>
-          <p:nvPr>
-            <p:ph type="title"/>
-          </p:nvPr>
-        </p:nvSpPr>
-        <p:spPr/>
-        <p:txBody>
-          <a:bodyPr/>
-          <a:lstStyle/>
-          <a:p>
-            <a:r>
-              <a:rPr lang="en-US" dirty="0" smtClean="0"/>
-              <a:t>Getting Started:</a:t>
-            </a:r>
-            <a:endParaRPr lang="en-US" dirty="0"/>
-          </a:p>
-        </p:txBody>
-      </p:sp>
-      <p:sp>
-        <p:nvSpPr>
-          <p:cNvPr id="3" name="Content Placeholder 2"/>
-          <p:cNvSpPr>
-            <a:spLocks noGrp="1"/>
-          </p:cNvSpPr>
-          <p:nvPr>
-            <p:ph idx="1"/>
-          </p:nvPr>
-        </p:nvSpPr>
-        <p:spPr/>
-        <p:txBody>
-          <a:bodyPr/>
-          <a:lstStyle/>
-          <a:p>
-            <a:r>
-              <a:rPr lang="en-US" dirty="0"/>
-              <a:t>Get a text editor: </a:t>
-            </a:r>
-            <a:r>
-              <a:rPr lang="en-US" b="1" dirty="0"/>
-              <a:t>Sublime</a:t>
-            </a:r>
-            <a:r>
-              <a:rPr lang="en-US" dirty="0"/>
-              <a:t>, Atom, Notepad++, or </a:t>
-            </a:r>
-            <a:r>
-              <a:rPr lang="en-US" dirty="0" smtClean="0"/>
-              <a:t>Brackets</a:t>
-            </a:r>
-          </a:p>
-          <a:p>
-            <a:r>
-              <a:rPr lang="en-US" dirty="0" smtClean="0"/>
-              <a:t>Make sure you have either </a:t>
-            </a:r>
-            <a:r>
-              <a:rPr lang="en-US" b="1" dirty="0" smtClean="0"/>
-              <a:t>Chrome </a:t>
-            </a:r>
-            <a:r>
-              <a:rPr lang="en-US" dirty="0" smtClean="0"/>
-              <a:t>or Firefox</a:t>
-            </a:r>
-          </a:p>
-          <a:p>
-            <a:endParaRPr lang="en-US" dirty="0"/>
-          </a:p>
-          <a:p>
-            <a:r>
-              <a:rPr lang="en-US" dirty="0" smtClean="0"/>
-              <a:t>Open the “barchart_ready.html” file in your </a:t>
-            </a:r>
-            <a:r>
-              <a:rPr lang="en-US" b="1" dirty="0" smtClean="0"/>
-              <a:t>browser</a:t>
-            </a:r>
-          </a:p>
-          <a:p>
-            <a:r>
-              <a:rPr lang="en-US" dirty="0" smtClean="0"/>
-              <a:t>Open the “barchart_ready.html” file in your </a:t>
-            </a:r>
-            <a:r>
-              <a:rPr lang="en-US" b="1" dirty="0" smtClean="0"/>
-              <a:t>text editor</a:t>
-            </a:r>
-          </a:p>
-          <a:p>
+          <p:cNvPr id="4" name="Title 3"/>
+          <p:cNvSpPr>
+            <a:spLocks noGrp="1"/>
+          </p:cNvSpPr>
+          <p:nvPr>
+            <p:ph type="ctrTitle"/>
+          </p:nvPr>
+        </p:nvSpPr>
+        <p:spPr/>
+        <p:txBody>
+          <a:bodyPr/>
+          <a:lstStyle/>
+          <a:p>
+            <a:r>
+              <a:rPr lang="en-US" dirty="0" smtClean="0"/>
+              <a:t>Cake from Scratch</a:t>
+            </a:r>
+            <a:endParaRPr lang="en-US" dirty="0"/>
+          </a:p>
+        </p:txBody>
+      </p:sp>
+      <p:sp>
+        <p:nvSpPr>
+          <p:cNvPr id="5" name="Subtitle 4"/>
+          <p:cNvSpPr>
+            <a:spLocks noGrp="1"/>
+          </p:cNvSpPr>
+          <p:nvPr>
+            <p:ph type="subTitle" idx="1"/>
+          </p:nvPr>
+        </p:nvSpPr>
+        <p:spPr/>
+        <p:txBody>
+          <a:bodyPr/>
+          <a:lstStyle/>
+          <a:p>
+            <a:r>
+              <a:rPr lang="en-US" dirty="0" smtClean="0"/>
+              <a:t>A “grammar of graphics” is key: </a:t>
+            </a:r>
+          </a:p>
+          <a:p>
+            <a:r>
+              <a:rPr lang="en-US" dirty="0" smtClean="0"/>
+              <a:t>How do we talk about and use visualizations?</a:t>
+            </a:r>
             <a:endParaRPr lang="en-US" dirty="0"/>
           </a:p>
         </p:txBody>
@@ -3876,7 +3918,7 @@
     </p:spTree>
     <p:extLst>
       <p:ext uri="{BB962C8B-B14F-4D97-AF65-F5344CB8AC3E}">
-        <p14:creationId xmlns:p14="http://schemas.microsoft.com/office/powerpoint/2010/main" val="2894837639"/>
+        <p14:creationId xmlns:p14="http://schemas.microsoft.com/office/powerpoint/2010/main" val="305827575"/>
       </p:ext>
     </p:extLst>
   </p:cSld>
@@ -3927,6 +3969,140 @@
           <a:p>
             <a:r>
               <a:rPr lang="en-US" dirty="0" smtClean="0"/>
+              <a:t>Getting Started:</a:t>
+            </a:r>
+            <a:endParaRPr lang="en-US" dirty="0"/>
+          </a:p>
+        </p:txBody>
+      </p:sp>
+      <p:sp>
+        <p:nvSpPr>
+          <p:cNvPr id="3" name="Content Placeholder 2"/>
+          <p:cNvSpPr>
+            <a:spLocks noGrp="1"/>
+          </p:cNvSpPr>
+          <p:nvPr>
+            <p:ph idx="1"/>
+          </p:nvPr>
+        </p:nvSpPr>
+        <p:spPr/>
+        <p:txBody>
+          <a:bodyPr/>
+          <a:lstStyle/>
+          <a:p>
+            <a:r>
+              <a:rPr lang="en-US" dirty="0"/>
+              <a:t>Get a text editor: </a:t>
+            </a:r>
+            <a:r>
+              <a:rPr lang="en-US" b="1" dirty="0"/>
+              <a:t>Sublime</a:t>
+            </a:r>
+            <a:r>
+              <a:rPr lang="en-US" dirty="0"/>
+              <a:t>, Atom, Notepad++, or </a:t>
+            </a:r>
+            <a:r>
+              <a:rPr lang="en-US" dirty="0" smtClean="0"/>
+              <a:t>Brackets</a:t>
+            </a:r>
+          </a:p>
+          <a:p>
+            <a:r>
+              <a:rPr lang="en-US" dirty="0" smtClean="0"/>
+              <a:t>Make sure you have either </a:t>
+            </a:r>
+            <a:r>
+              <a:rPr lang="en-US" b="1" dirty="0" smtClean="0"/>
+              <a:t>Chrome </a:t>
+            </a:r>
+            <a:r>
+              <a:rPr lang="en-US" dirty="0" smtClean="0"/>
+              <a:t>or Firefox</a:t>
+            </a:r>
+          </a:p>
+          <a:p>
+            <a:endParaRPr lang="en-US" dirty="0"/>
+          </a:p>
+          <a:p>
+            <a:r>
+              <a:rPr lang="en-US" dirty="0" smtClean="0"/>
+              <a:t>Open the “barchart_ready.html” file in your </a:t>
+            </a:r>
+            <a:r>
+              <a:rPr lang="en-US" b="1" dirty="0" smtClean="0"/>
+              <a:t>browser</a:t>
+            </a:r>
+          </a:p>
+          <a:p>
+            <a:r>
+              <a:rPr lang="en-US" dirty="0" smtClean="0"/>
+              <a:t>Open the “barchart_ready.html” file in your </a:t>
+            </a:r>
+            <a:r>
+              <a:rPr lang="en-US" b="1" dirty="0" smtClean="0"/>
+              <a:t>text editor</a:t>
+            </a:r>
+          </a:p>
+          <a:p>
+            <a:endParaRPr lang="en-US" dirty="0"/>
+          </a:p>
+        </p:txBody>
+      </p:sp>
+    </p:spTree>
+    <p:extLst>
+      <p:ext uri="{BB962C8B-B14F-4D97-AF65-F5344CB8AC3E}">
+        <p14:creationId xmlns:p14="http://schemas.microsoft.com/office/powerpoint/2010/main" val="2894837639"/>
+      </p:ext>
+    </p:extLst>
+  </p:cSld>
+  <p:clrMapOvr>
+    <a:masterClrMapping/>
+  </p:clrMapOvr>
+  <p:timing>
+    <p:tnLst>
+      <p:par>
+        <p:cTn id="1" dur="indefinite" restart="never" nodeType="tmRoot"/>
+      </p:par>
+    </p:tnLst>
+  </p:timing>
+</p:sld>
+</file>
+
+<file path=ppt/slides/slide16.xml><?xml version="1.0" encoding="utf-8"?>
+<p:sld xmlns:a="http://schemas.openxmlformats.org/drawingml/2006/main" xmlns:r="http://schemas.openxmlformats.org/officeDocument/2006/relationships" xmlns:p="http://schemas.openxmlformats.org/presentationml/2006/main">
+  <p:cSld>
+    <p:spTree>
+      <p:nvGrpSpPr>
+        <p:cNvPr id="1" name=""/>
+        <p:cNvGrpSpPr/>
+        <p:nvPr/>
+      </p:nvGrpSpPr>
+      <p:grpSpPr>
+        <a:xfrm>
+          <a:off x="0" y="0"/>
+          <a:ext cx="0" cy="0"/>
+          <a:chOff x="0" y="0"/>
+          <a:chExt cx="0" cy="0"/>
+        </a:xfrm>
+      </p:grpSpPr>
+      <p:sp>
+        <p:nvSpPr>
+          <p:cNvPr id="2" name="Title 1"/>
+          <p:cNvSpPr>
+            <a:spLocks noGrp="1"/>
+          </p:cNvSpPr>
+          <p:nvPr>
+            <p:ph type="title"/>
+          </p:nvPr>
+        </p:nvSpPr>
+        <p:spPr/>
+        <p:txBody>
+          <a:bodyPr/>
+          <a:lstStyle/>
+          <a:p>
+            <a:r>
+              <a:rPr lang="en-US" dirty="0" smtClean="0"/>
               <a:t>Build your environment:</a:t>
             </a:r>
             <a:endParaRPr lang="en-US" dirty="0"/>
@@ -3953,19 +4129,7 @@
           <a:p>
             <a:r>
               <a:rPr lang="en-US" dirty="0" smtClean="0"/>
-              <a:t>Build </a:t>
-            </a:r>
-            <a:r>
-              <a:rPr lang="en-US" dirty="0" smtClean="0"/>
-              <a:t>index.html file with d3 </a:t>
-            </a:r>
-            <a:r>
-              <a:rPr lang="en-US" dirty="0" smtClean="0"/>
-              <a:t>source link </a:t>
-            </a:r>
-            <a:r>
-              <a:rPr lang="en-US" dirty="0" smtClean="0"/>
-              <a:t>(local or web)</a:t>
+              <a:t>Build index.html file with d3 source link (local or web)</a:t>
             </a:r>
           </a:p>
           <a:p>
@@ -3977,11 +4141,7 @@
           <a:p>
             <a:r>
               <a:rPr lang="en-US" dirty="0" smtClean="0"/>
-              <a:t>Create empty “controller.js” </a:t>
-            </a:r>
-            <a:r>
-              <a:rPr lang="en-US" dirty="0" smtClean="0"/>
-              <a:t>file</a:t>
+              <a:t>Create empty “controller.js” file</a:t>
             </a:r>
           </a:p>
           <a:p>
@@ -4036,7 +4196,7 @@
 </p:sld>
 </file>
 
-<file path=ppt/slides/slide16.xml><?xml version="1.0" encoding="utf-8"?>
+<file path=ppt/slides/slide17.xml><?xml version="1.0" encoding="utf-8"?>
 <p:sld xmlns:a="http://schemas.openxmlformats.org/drawingml/2006/main" xmlns:r="http://schemas.openxmlformats.org/officeDocument/2006/relationships" xmlns:p="http://schemas.openxmlformats.org/presentationml/2006/main">
   <p:cSld>
     <p:spTree>
@@ -4175,7 +4335,7 @@
 </p:sld>
 </file>
 
-<file path=ppt/slides/slide17.xml><?xml version="1.0" encoding="utf-8"?>
+<file path=ppt/slides/slide18.xml><?xml version="1.0" encoding="utf-8"?>
 <p:sld xmlns:a="http://schemas.openxmlformats.org/drawingml/2006/main" xmlns:r="http://schemas.openxmlformats.org/officeDocument/2006/relationships" xmlns:p="http://schemas.openxmlformats.org/presentationml/2006/main">
   <p:cSld>
     <p:spTree>
@@ -4264,11 +4424,7 @@
             </a:r>
             <a:r>
               <a:rPr lang="en-US" dirty="0" smtClean="0"/>
-              <a:t>here</a:t>
-            </a:r>
-            <a:r>
-              <a:rPr lang="en-US" dirty="0" smtClean="0"/>
-              <a:t>)</a:t>
+              <a:t>here)</a:t>
             </a:r>
           </a:p>
           <a:p>
@@ -4294,7 +4450,7 @@
 </p:sld>
 </file>
 
-<file path=ppt/slides/slide18.xml><?xml version="1.0" encoding="utf-8"?>
+<file path=ppt/slides/slide19.xml><?xml version="1.0" encoding="utf-8"?>
 <p:sld xmlns:a="http://schemas.openxmlformats.org/drawingml/2006/main" xmlns:r="http://schemas.openxmlformats.org/officeDocument/2006/relationships" xmlns:p="http://schemas.openxmlformats.org/presentationml/2006/main">
   <p:cSld>
     <p:spTree>
@@ -4517,7 +4673,82 @@
 </p:sld>
 </file>
 
-<file path=ppt/slides/slide19.xml><?xml version="1.0" encoding="utf-8"?>
+<file path=ppt/slides/slide2.xml><?xml version="1.0" encoding="utf-8"?>
+<p:sld xmlns:a="http://schemas.openxmlformats.org/drawingml/2006/main" xmlns:r="http://schemas.openxmlformats.org/officeDocument/2006/relationships" xmlns:p="http://schemas.openxmlformats.org/presentationml/2006/main">
+  <p:cSld>
+    <p:spTree>
+      <p:nvGrpSpPr>
+        <p:cNvPr id="1" name=""/>
+        <p:cNvGrpSpPr/>
+        <p:nvPr/>
+      </p:nvGrpSpPr>
+      <p:grpSpPr>
+        <a:xfrm>
+          <a:off x="0" y="0"/>
+          <a:ext cx="0" cy="0"/>
+          <a:chOff x="0" y="0"/>
+          <a:chExt cx="0" cy="0"/>
+        </a:xfrm>
+      </p:grpSpPr>
+      <p:sp>
+        <p:nvSpPr>
+          <p:cNvPr id="4" name="Title 3"/>
+          <p:cNvSpPr>
+            <a:spLocks noGrp="1"/>
+          </p:cNvSpPr>
+          <p:nvPr>
+            <p:ph type="ctrTitle"/>
+          </p:nvPr>
+        </p:nvSpPr>
+        <p:spPr/>
+        <p:txBody>
+          <a:bodyPr/>
+          <a:lstStyle/>
+          <a:p>
+            <a:r>
+              <a:rPr lang="en-US" dirty="0" smtClean="0"/>
+              <a:t>This Repo:</a:t>
+            </a:r>
+            <a:endParaRPr lang="en-US" dirty="0"/>
+          </a:p>
+        </p:txBody>
+      </p:sp>
+      <p:sp>
+        <p:nvSpPr>
+          <p:cNvPr id="5" name="Subtitle 4"/>
+          <p:cNvSpPr>
+            <a:spLocks noGrp="1"/>
+          </p:cNvSpPr>
+          <p:nvPr>
+            <p:ph type="subTitle" idx="1"/>
+          </p:nvPr>
+        </p:nvSpPr>
+        <p:spPr/>
+        <p:txBody>
+          <a:bodyPr/>
+          <a:lstStyle/>
+          <a:p>
+            <a:r>
+              <a:rPr lang="en-US" dirty="0"/>
+              <a:t>https://github.com/nuitrcs/Intro_to_d3_workshop</a:t>
+            </a:r>
+          </a:p>
+        </p:txBody>
+      </p:sp>
+    </p:spTree>
+    <p:extLst>
+      <p:ext uri="{BB962C8B-B14F-4D97-AF65-F5344CB8AC3E}">
+        <p14:creationId xmlns:p14="http://schemas.microsoft.com/office/powerpoint/2010/main" val="309578843"/>
+      </p:ext>
+    </p:extLst>
+  </p:cSld>
+  <p:clrMapOvr>
+    <a:masterClrMapping/>
+  </p:clrMapOvr>
+</p:sld>
+</file>
+
+<file path=ppt/slides/slide20.xml><?xml version="1.0" encoding="utf-8"?>
 <p:sld xmlns:a="http://schemas.openxmlformats.org/drawingml/2006/main" xmlns:r="http://schemas.openxmlformats.org/officeDocument/2006/relationships" xmlns:p="http://schemas.openxmlformats.org/presentationml/2006/main">
   <p:cSld>
     <p:spTree>
@@ -4613,232 +4844,6 @@
 </p:sld>
 </file>
 
-<file path=ppt/slides/slide2.xml><?xml version="1.0" encoding="utf-8"?>
-<p:sld xmlns:a="http://schemas.openxmlformats.org/drawingml/2006/main" xmlns:r="http://schemas.openxmlformats.org/officeDocument/2006/relationships" xmlns:p="http://schemas.openxmlformats.org/presentationml/2006/main">
-  <p:cSld>
-    <p:spTree>
-      <p:nvGrpSpPr>
-        <p:cNvPr id="1" name=""/>
-        <p:cNvGrpSpPr/>
-        <p:nvPr/>
-      </p:nvGrpSpPr>
-      <p:grpSpPr>
-        <a:xfrm>
-          <a:off x="0" y="0"/>
-          <a:ext cx="0" cy="0"/>
-          <a:chOff x="0" y="0"/>
-          <a:chExt cx="0" cy="0"/>
-        </a:xfrm>
-      </p:grpSpPr>
-      <p:sp>
-        <p:nvSpPr>
-          <p:cNvPr id="2" name="Title 1"/>
-          <p:cNvSpPr>
-            <a:spLocks noGrp="1"/>
-          </p:cNvSpPr>
-          <p:nvPr>
-            <p:ph type="ctrTitle"/>
-          </p:nvPr>
-        </p:nvSpPr>
-        <p:spPr>
-          <a:xfrm>
-            <a:off x="1524000" y="1064027"/>
-            <a:ext cx="9144000" cy="1207337"/>
-          </a:xfrm>
-        </p:spPr>
-        <p:txBody>
-          <a:bodyPr>
-            <a:normAutofit/>
-          </a:bodyPr>
-          <a:lstStyle/>
-          <a:p>
-            <a:pPr algn="l"/>
-            <a:r>
-              <a:rPr lang="en-US" dirty="0" smtClean="0"/>
-              <a:t>What is D3 capable of?</a:t>
-            </a:r>
-            <a:endParaRPr lang="en-US" dirty="0"/>
-          </a:p>
-        </p:txBody>
-      </p:sp>
-      <p:sp>
-        <p:nvSpPr>
-          <p:cNvPr id="3" name="Subtitle 2"/>
-          <p:cNvSpPr>
-            <a:spLocks noGrp="1"/>
-          </p:cNvSpPr>
-          <p:nvPr>
-            <p:ph type="subTitle" idx="1"/>
-          </p:nvPr>
-        </p:nvSpPr>
-        <p:spPr>
-          <a:xfrm>
-            <a:off x="1524000" y="2271364"/>
-            <a:ext cx="9144000" cy="4048320"/>
-          </a:xfrm>
-        </p:spPr>
-        <p:txBody>
-          <a:bodyPr/>
-          <a:lstStyle/>
-          <a:p>
-            <a:pPr algn="l"/>
-            <a:r>
-              <a:rPr lang="en-US" dirty="0"/>
-              <a:t>https://frankelavsky.github.io/LIGO-Virgo-Mass-Plot/</a:t>
-            </a:r>
-          </a:p>
-          <a:p>
-            <a:pPr algn="l"/>
-            <a:endParaRPr lang="en-US" dirty="0" smtClean="0"/>
-          </a:p>
-          <a:p>
-            <a:pPr algn="l"/>
-            <a:r>
-              <a:rPr lang="en-US" dirty="0" smtClean="0"/>
-              <a:t>http</a:t>
-            </a:r>
-            <a:r>
-              <a:rPr lang="en-US" dirty="0"/>
-              <a:t>://www.r2d3.us/visual-intro-to-machine-learning-part-1</a:t>
-            </a:r>
-            <a:r>
-              <a:rPr lang="en-US" dirty="0" smtClean="0"/>
-              <a:t>/</a:t>
-            </a:r>
-          </a:p>
-          <a:p>
-            <a:pPr algn="l"/>
-            <a:r>
-              <a:rPr lang="en-US" dirty="0"/>
-              <a:t>http://</a:t>
-            </a:r>
-            <a:r>
-              <a:rPr lang="en-US" dirty="0" smtClean="0"/>
-              <a:t>bit.ly/2wJEeIy</a:t>
-            </a:r>
-          </a:p>
-          <a:p>
-            <a:pPr algn="l"/>
-            <a:r>
-              <a:rPr lang="en-US" dirty="0" smtClean="0"/>
-              <a:t>http://nbremer.github.io/urbanization/</a:t>
-            </a:r>
-          </a:p>
-          <a:p>
-            <a:pPr algn="l"/>
-            <a:r>
-              <a:rPr lang="en-US" dirty="0" smtClean="0"/>
-              <a:t>https</a:t>
-            </a:r>
-            <a:r>
-              <a:rPr lang="en-US" dirty="0"/>
-              <a:t>://</a:t>
-            </a:r>
-            <a:r>
-              <a:rPr lang="en-US" dirty="0" smtClean="0"/>
-              <a:t>www.nytimes.com/interactive/2014/upshot/buy-rent-calculator.htmlhttps</a:t>
-            </a:r>
-            <a:r>
-              <a:rPr lang="en-US" dirty="0"/>
-              <a:t>://bost.ocks.org/mike/algorithms/</a:t>
-            </a:r>
-            <a:endParaRPr lang="en-US" dirty="0" smtClean="0"/>
-          </a:p>
-          <a:p>
-            <a:pPr algn="l"/>
-            <a:endParaRPr lang="en-US" dirty="0"/>
-          </a:p>
-        </p:txBody>
-      </p:sp>
-    </p:spTree>
-    <p:extLst>
-      <p:ext uri="{BB962C8B-B14F-4D97-AF65-F5344CB8AC3E}">
-        <p14:creationId xmlns:p14="http://schemas.microsoft.com/office/powerpoint/2010/main" val="990942484"/>
-      </p:ext>
-    </p:extLst>
-  </p:cSld>
-  <p:clrMapOvr>
-    <a:masterClrMapping/>
-  </p:clrMapOvr>
-</p:sld>
-</file>
-
-<file path=ppt/slides/slide20.xml><?xml version="1.0" encoding="utf-8"?>
-<p:sld xmlns:a="http://schemas.openxmlformats.org/drawingml/2006/main" xmlns:r="http://schemas.openxmlformats.org/officeDocument/2006/relationships" xmlns:p="http://schemas.openxmlformats.org/presentationml/2006/main">
-  <p:cSld>
-    <p:spTree>
-      <p:nvGrpSpPr>
-        <p:cNvPr id="1" name=""/>
-        <p:cNvGrpSpPr/>
-        <p:nvPr/>
-      </p:nvGrpSpPr>
-      <p:grpSpPr>
-        <a:xfrm>
-          <a:off x="0" y="0"/>
-          <a:ext cx="0" cy="0"/>
-          <a:chOff x="0" y="0"/>
-          <a:chExt cx="0" cy="0"/>
-        </a:xfrm>
-      </p:grpSpPr>
-      <p:sp>
-        <p:nvSpPr>
-          <p:cNvPr id="2" name="Title 1"/>
-          <p:cNvSpPr>
-            <a:spLocks noGrp="1"/>
-          </p:cNvSpPr>
-          <p:nvPr>
-            <p:ph type="ctrTitle"/>
-          </p:nvPr>
-        </p:nvSpPr>
-        <p:spPr/>
-        <p:txBody>
-          <a:bodyPr/>
-          <a:lstStyle/>
-          <a:p>
-            <a:r>
-              <a:rPr lang="en-US" dirty="0" smtClean="0"/>
-              <a:t>Begin writing code!</a:t>
-            </a:r>
-            <a:endParaRPr lang="en-US" dirty="0"/>
-          </a:p>
-        </p:txBody>
-      </p:sp>
-      <p:sp>
-        <p:nvSpPr>
-          <p:cNvPr id="5" name="Subtitle 4"/>
-          <p:cNvSpPr>
-            <a:spLocks noGrp="1"/>
-          </p:cNvSpPr>
-          <p:nvPr>
-            <p:ph type="subTitle" idx="1"/>
-          </p:nvPr>
-        </p:nvSpPr>
-        <p:spPr/>
-        <p:txBody>
-          <a:bodyPr/>
-          <a:lstStyle/>
-          <a:p>
-            <a:r>
-              <a:rPr lang="en-US" dirty="0" smtClean="0"/>
-              <a:t>Let’s recreate this monster (follow along)</a:t>
-            </a:r>
-            <a:endParaRPr lang="en-US" dirty="0"/>
-          </a:p>
-        </p:txBody>
-      </p:sp>
-    </p:spTree>
-    <p:extLst>
-      <p:ext uri="{BB962C8B-B14F-4D97-AF65-F5344CB8AC3E}">
-        <p14:creationId xmlns:p14="http://schemas.microsoft.com/office/powerpoint/2010/main" val="3899806170"/>
-      </p:ext>
-    </p:extLst>
-  </p:cSld>
-  <p:clrMapOvr>
-    <a:masterClrMapping/>
-  </p:clrMapOvr>
-</p:sld>
-</file>
-
 <file path=ppt/slides/slide21.xml><?xml version="1.0" encoding="utf-8"?>
 <p:sld xmlns:a="http://schemas.openxmlformats.org/drawingml/2006/main" xmlns:r="http://schemas.openxmlformats.org/officeDocument/2006/relationships" xmlns:p="http://schemas.openxmlformats.org/presentationml/2006/main">
   <p:cSld>
@@ -4863,211 +4868,40 @@
             <a:spLocks noGrp="1"/>
           </p:cNvSpPr>
           <p:nvPr>
-            <p:ph type="title"/>
-          </p:nvPr>
-        </p:nvSpPr>
-        <p:spPr/>
-        <p:txBody>
-          <a:bodyPr/>
-          <a:lstStyle/>
-          <a:p>
-            <a:r>
-              <a:rPr lang="en-US" dirty="0" smtClean="0"/>
-              <a:t>1a. Beginning </a:t>
-            </a:r>
-            <a:r>
-              <a:rPr lang="en-US" dirty="0" smtClean="0"/>
-              <a:t>with D3</a:t>
-            </a:r>
-            <a:endParaRPr lang="en-US" dirty="0"/>
-          </a:p>
-        </p:txBody>
-      </p:sp>
-      <p:sp>
-        <p:nvSpPr>
-          <p:cNvPr id="3" name="Content Placeholder 2"/>
-          <p:cNvSpPr>
-            <a:spLocks noGrp="1"/>
-          </p:cNvSpPr>
-          <p:nvPr>
-            <p:ph idx="1"/>
-          </p:nvPr>
-        </p:nvSpPr>
-        <p:spPr>
-          <a:xfrm>
-            <a:off x="838200" y="1825625"/>
-            <a:ext cx="10515600" cy="4777476"/>
-          </a:xfrm>
-        </p:spPr>
-        <p:txBody>
-          <a:bodyPr/>
-          <a:lstStyle/>
-          <a:p>
-            <a:pPr marL="0" indent="0">
-              <a:buNone/>
-            </a:pPr>
-            <a:r>
-              <a:rPr lang="en-US" i="1" dirty="0" smtClean="0"/>
-              <a:t>Once we get set up, we should only visit controller (and </a:t>
-            </a:r>
-            <a:r>
-              <a:rPr lang="en-US" i="1" dirty="0" err="1" smtClean="0"/>
-              <a:t>css</a:t>
-            </a:r>
-            <a:r>
-              <a:rPr lang="en-US" i="1" dirty="0" smtClean="0"/>
-              <a:t>)</a:t>
-            </a:r>
-          </a:p>
-          <a:p>
-            <a:r>
-              <a:rPr lang="en-US" dirty="0" smtClean="0"/>
-              <a:t>Select </a:t>
-            </a:r>
-            <a:r>
-              <a:rPr lang="en-US" dirty="0" smtClean="0"/>
-              <a:t>the </a:t>
-            </a:r>
-            <a:r>
-              <a:rPr lang="en-US" dirty="0" smtClean="0"/>
-              <a:t>“#graph” element</a:t>
-            </a:r>
-          </a:p>
-          <a:p>
-            <a:pPr lvl="1"/>
-            <a:r>
-              <a:rPr lang="en-US" dirty="0" smtClean="0"/>
-              <a:t>Reference this with a </a:t>
-            </a:r>
-            <a:r>
-              <a:rPr lang="en-US" b="1" i="1" dirty="0" err="1" smtClean="0">
-                <a:solidFill>
-                  <a:schemeClr val="accent1">
-                    <a:lumMod val="60000"/>
-                    <a:lumOff val="40000"/>
-                  </a:schemeClr>
-                </a:solidFill>
-              </a:rPr>
-              <a:t>var</a:t>
-            </a:r>
-            <a:r>
-              <a:rPr lang="en-US" b="1" i="1" dirty="0">
-                <a:solidFill>
-                  <a:schemeClr val="accent1">
-                    <a:lumMod val="60000"/>
-                    <a:lumOff val="40000"/>
-                  </a:schemeClr>
-                </a:solidFill>
-              </a:rPr>
-              <a:t> </a:t>
-            </a:r>
-            <a:endParaRPr lang="en-US" b="1" i="1" dirty="0" smtClean="0">
-              <a:solidFill>
-                <a:schemeClr val="accent1">
-                  <a:lumMod val="60000"/>
-                  <a:lumOff val="40000"/>
-                </a:schemeClr>
-              </a:solidFill>
-            </a:endParaRPr>
-          </a:p>
-          <a:p>
-            <a:pPr lvl="1"/>
-            <a:r>
-              <a:rPr lang="en-US" dirty="0" smtClean="0"/>
-              <a:t>Give it dimensions</a:t>
-            </a:r>
-            <a:endParaRPr lang="en-US" dirty="0" smtClean="0"/>
-          </a:p>
-          <a:p>
-            <a:r>
-              <a:rPr lang="en-US" dirty="0" smtClean="0"/>
-              <a:t>Append </a:t>
-            </a:r>
-            <a:r>
-              <a:rPr lang="en-US" dirty="0" smtClean="0"/>
-              <a:t>g</a:t>
-            </a:r>
-            <a:endParaRPr lang="en-US" dirty="0" smtClean="0"/>
-          </a:p>
-          <a:p>
-            <a:pPr lvl="1"/>
-            <a:r>
-              <a:rPr lang="en-US" dirty="0" smtClean="0"/>
-              <a:t>Reference this </a:t>
-            </a:r>
-            <a:r>
-              <a:rPr lang="en-US" dirty="0" smtClean="0"/>
-              <a:t>g </a:t>
-            </a:r>
-            <a:r>
-              <a:rPr lang="en-US" dirty="0" smtClean="0"/>
-              <a:t>with a </a:t>
-            </a:r>
-            <a:r>
-              <a:rPr lang="en-US" b="1" i="1" dirty="0" err="1" smtClean="0">
-                <a:solidFill>
-                  <a:schemeClr val="accent1">
-                    <a:lumMod val="60000"/>
-                    <a:lumOff val="40000"/>
-                  </a:schemeClr>
-                </a:solidFill>
-              </a:rPr>
-              <a:t>var</a:t>
-            </a:r>
-            <a:endParaRPr lang="en-US" b="1" i="1" dirty="0" smtClean="0">
-              <a:solidFill>
-                <a:schemeClr val="accent1">
-                  <a:lumMod val="60000"/>
-                  <a:lumOff val="40000"/>
-                </a:schemeClr>
-              </a:solidFill>
-            </a:endParaRPr>
-          </a:p>
-          <a:p>
-            <a:r>
-              <a:rPr lang="en-US" dirty="0" err="1" smtClean="0"/>
-              <a:t>g.selectAll</a:t>
-            </a:r>
-            <a:r>
-              <a:rPr lang="en-US" dirty="0" smtClean="0"/>
-              <a:t>(‘.bar’)</a:t>
-            </a:r>
-          </a:p>
-          <a:p>
-            <a:pPr marL="457200" lvl="1" indent="0">
-              <a:buNone/>
-            </a:pPr>
-            <a:r>
-              <a:rPr lang="en-US" dirty="0" smtClean="0"/>
-              <a:t>.data(data)</a:t>
-            </a:r>
-          </a:p>
-          <a:p>
-            <a:pPr marL="457200" lvl="1" indent="0">
-              <a:buNone/>
-            </a:pPr>
-            <a:r>
-              <a:rPr lang="en-US" dirty="0" smtClean="0"/>
-              <a:t>.enter().append(‘</a:t>
-            </a:r>
-            <a:r>
-              <a:rPr lang="en-US" dirty="0" err="1" smtClean="0"/>
-              <a:t>rect</a:t>
-            </a:r>
-            <a:r>
-              <a:rPr lang="en-US" dirty="0" smtClean="0"/>
-              <a:t>’)</a:t>
-            </a:r>
-            <a:endParaRPr lang="en-US" dirty="0"/>
-          </a:p>
-          <a:p>
-            <a:r>
-              <a:rPr lang="en-US" dirty="0"/>
-              <a:t>Discuss SVG types &amp; explain </a:t>
-            </a:r>
-            <a:r>
-              <a:rPr lang="en-US" dirty="0" smtClean="0"/>
-              <a:t>SVG</a:t>
+            <p:ph type="ctrTitle"/>
+          </p:nvPr>
+        </p:nvSpPr>
+        <p:spPr/>
+        <p:txBody>
+          <a:bodyPr/>
+          <a:lstStyle/>
+          <a:p>
+            <a:r>
+              <a:rPr lang="en-US" dirty="0" smtClean="0"/>
+              <a:t>Begin writing code!</a:t>
+            </a:r>
+            <a:endParaRPr lang="en-US" dirty="0"/>
+          </a:p>
+        </p:txBody>
+      </p:sp>
+      <p:sp>
+        <p:nvSpPr>
+          <p:cNvPr id="5" name="Subtitle 4"/>
+          <p:cNvSpPr>
+            <a:spLocks noGrp="1"/>
+          </p:cNvSpPr>
+          <p:nvPr>
+            <p:ph type="subTitle" idx="1"/>
+          </p:nvPr>
+        </p:nvSpPr>
+        <p:spPr/>
+        <p:txBody>
+          <a:bodyPr/>
+          <a:lstStyle/>
+          <a:p>
+            <a:r>
+              <a:rPr lang="en-US" dirty="0" smtClean="0"/>
+              <a:t>Let’s recreate this monster (follow along)</a:t>
             </a:r>
             <a:endParaRPr lang="en-US" dirty="0"/>
           </a:p>
@@ -5076,7 +4910,7 @@
     </p:spTree>
     <p:extLst>
       <p:ext uri="{BB962C8B-B14F-4D97-AF65-F5344CB8AC3E}">
-        <p14:creationId xmlns:p14="http://schemas.microsoft.com/office/powerpoint/2010/main" val="674903255"/>
+        <p14:creationId xmlns:p14="http://schemas.microsoft.com/office/powerpoint/2010/main" val="3899806170"/>
       </p:ext>
     </p:extLst>
   </p:cSld>
@@ -5120,7 +4954,7 @@
           <a:p>
             <a:r>
               <a:rPr lang="en-US" dirty="0" smtClean="0"/>
-              <a:t>1b. Use the bound data!</a:t>
+              <a:t>1a. Beginning with D3</a:t>
             </a:r>
             <a:endParaRPr lang="en-US" dirty="0"/>
           </a:p>
@@ -5136,78 +4970,160 @@
             <p:ph idx="1"/>
           </p:nvPr>
         </p:nvSpPr>
-        <p:spPr/>
-        <p:txBody>
-          <a:bodyPr/>
-          <a:lstStyle/>
-          <a:p>
-            <a:r>
-              <a:rPr lang="en-US" dirty="0" smtClean="0"/>
-              <a:t>Make height = </a:t>
-            </a:r>
+        <p:spPr>
+          <a:xfrm>
+            <a:off x="838200" y="1825625"/>
+            <a:ext cx="10515600" cy="4777476"/>
+          </a:xfrm>
+        </p:spPr>
+        <p:txBody>
+          <a:bodyPr/>
+          <a:lstStyle/>
+          <a:p>
+            <a:pPr marL="0" indent="0">
+              <a:buNone/>
+            </a:pPr>
+            <a:r>
+              <a:rPr lang="en-US" i="1" dirty="0" smtClean="0"/>
+              <a:t>Once we get set up, we should only visit controller (and </a:t>
+            </a:r>
+            <a:r>
+              <a:rPr lang="en-US" i="1" dirty="0" err="1" smtClean="0"/>
+              <a:t>css</a:t>
+            </a:r>
+            <a:r>
+              <a:rPr lang="en-US" i="1" dirty="0" smtClean="0"/>
+              <a:t>)</a:t>
+            </a:r>
+          </a:p>
+          <a:p>
+            <a:r>
+              <a:rPr lang="en-US" dirty="0" smtClean="0"/>
+              <a:t>Select the “#graph” element</a:t>
+            </a:r>
+          </a:p>
+          <a:p>
+            <a:pPr lvl="1"/>
+            <a:r>
+              <a:rPr lang="en-US" dirty="0" smtClean="0"/>
+              <a:t>Reference this with a </a:t>
+            </a:r>
+            <a:r>
+              <a:rPr lang="en-US" b="1" i="1" dirty="0" err="1" smtClean="0">
+                <a:solidFill>
+                  <a:schemeClr val="accent1">
+                    <a:lumMod val="60000"/>
+                    <a:lumOff val="40000"/>
+                  </a:schemeClr>
+                </a:solidFill>
+              </a:rPr>
+              <a:t>var</a:t>
+            </a:r>
+            <a:r>
+              <a:rPr lang="en-US" b="1" i="1" dirty="0">
+                <a:solidFill>
+                  <a:schemeClr val="accent1">
+                    <a:lumMod val="60000"/>
+                    <a:lumOff val="40000"/>
+                  </a:schemeClr>
+                </a:solidFill>
+              </a:rPr>
+              <a:t> </a:t>
+            </a:r>
+            <a:endParaRPr lang="en-US" b="1" i="1" dirty="0" smtClean="0">
+              <a:solidFill>
+                <a:schemeClr val="accent1">
+                  <a:lumMod val="60000"/>
+                  <a:lumOff val="40000"/>
+                </a:schemeClr>
+              </a:solidFill>
+            </a:endParaRPr>
+          </a:p>
+          <a:p>
+            <a:pPr lvl="1"/>
+            <a:r>
+              <a:rPr lang="en-US" dirty="0" smtClean="0"/>
+              <a:t>Give it dimensions</a:t>
+            </a:r>
+          </a:p>
+          <a:p>
+            <a:r>
+              <a:rPr lang="en-US" dirty="0" smtClean="0"/>
+              <a:t>Append g</a:t>
+            </a:r>
+          </a:p>
+          <a:p>
+            <a:pPr lvl="1"/>
+            <a:r>
+              <a:rPr lang="en-US" dirty="0" smtClean="0"/>
+              <a:t>Reference this g with a </a:t>
+            </a:r>
+            <a:r>
+              <a:rPr lang="en-US" b="1" i="1" dirty="0" err="1" smtClean="0">
+                <a:solidFill>
+                  <a:schemeClr val="accent1">
+                    <a:lumMod val="60000"/>
+                    <a:lumOff val="40000"/>
+                  </a:schemeClr>
+                </a:solidFill>
+              </a:rPr>
+              <a:t>var</a:t>
+            </a:r>
+            <a:endParaRPr lang="en-US" b="1" i="1" dirty="0" smtClean="0">
+              <a:solidFill>
+                <a:schemeClr val="accent1">
+                  <a:lumMod val="60000"/>
+                  <a:lumOff val="40000"/>
+                </a:schemeClr>
+              </a:solidFill>
+            </a:endParaRPr>
+          </a:p>
+          <a:p>
             <a:r>
               <a:rPr lang="en-US" dirty="0" err="1" smtClean="0"/>
-              <a:t>d.frequency</a:t>
-            </a:r>
-            <a:endParaRPr lang="en-US" dirty="0" smtClean="0"/>
-          </a:p>
-          <a:p>
-            <a:r>
-              <a:rPr lang="en-US" dirty="0" smtClean="0"/>
-              <a:t>Make width = 10</a:t>
-            </a:r>
-          </a:p>
-          <a:p>
-            <a:r>
-              <a:rPr lang="en-US" dirty="0" smtClean="0"/>
-              <a:t>Make x = </a:t>
+              <a:t>g.selectAll</a:t>
+            </a:r>
+            <a:r>
+              <a:rPr lang="en-US" dirty="0" smtClean="0"/>
+              <a:t>(‘.bar’)</a:t>
+            </a:r>
+          </a:p>
+          <a:p>
+            <a:pPr marL="457200" lvl="1" indent="0">
+              <a:buNone/>
+            </a:pPr>
+            <a:r>
+              <a:rPr lang="en-US" dirty="0" smtClean="0"/>
+              <a:t>.data(data)</a:t>
+            </a:r>
+          </a:p>
+          <a:p>
+            <a:pPr marL="457200" lvl="1" indent="0">
+              <a:buNone/>
+            </a:pPr>
+            <a:r>
+              <a:rPr lang="en-US" dirty="0" smtClean="0"/>
+              <a:t>.enter().append(‘</a:t>
             </a:r>
             <a:r>
               <a:rPr lang="en-US" dirty="0" err="1" smtClean="0"/>
-              <a:t>i</a:t>
-            </a:r>
-            <a:r>
-              <a:rPr lang="en-US" dirty="0" smtClean="0"/>
-              <a:t>*10</a:t>
-            </a:r>
-          </a:p>
-          <a:p>
-            <a:endParaRPr lang="en-US" dirty="0" smtClean="0"/>
-          </a:p>
-          <a:p>
-            <a:r>
-              <a:rPr lang="en-US" dirty="0" smtClean="0"/>
-              <a:t>Try:</a:t>
-            </a:r>
+              <a:t>rect</a:t>
+            </a:r>
+            <a:r>
+              <a:rPr lang="en-US" dirty="0" smtClean="0"/>
+              <a:t>’)</a:t>
+            </a:r>
+            <a:endParaRPr lang="en-US" dirty="0"/>
           </a:p>
           <a:p>
             <a:r>
               <a:rPr lang="en-US" dirty="0"/>
-              <a:t>Make height = 1000x the frequency</a:t>
-            </a:r>
-          </a:p>
-          <a:p>
-            <a:r>
-              <a:rPr lang="en-US" dirty="0"/>
-              <a:t>Make width = 20</a:t>
-            </a:r>
-          </a:p>
-          <a:p>
-            <a:r>
-              <a:rPr lang="en-US" dirty="0"/>
-              <a:t>Make x = </a:t>
-            </a:r>
-            <a:r>
-              <a:rPr lang="en-US" dirty="0" err="1" smtClean="0"/>
-              <a:t>i</a:t>
-            </a:r>
-            <a:r>
-              <a:rPr lang="en-US" dirty="0" smtClean="0"/>
-              <a:t>*22</a:t>
-            </a:r>
-            <a:endParaRPr lang="en-US" dirty="0"/>
-          </a:p>
-          <a:p>
+              <a:t>Discuss SVG types &amp; explain </a:t>
+            </a:r>
+            <a:r>
+              <a:rPr lang="en-US" dirty="0" smtClean="0"/>
+              <a:t>SVG</a:t>
+            </a:r>
             <a:endParaRPr lang="en-US" dirty="0"/>
           </a:p>
         </p:txBody>
@@ -5215,7 +5131,7 @@
     </p:spTree>
     <p:extLst>
       <p:ext uri="{BB962C8B-B14F-4D97-AF65-F5344CB8AC3E}">
-        <p14:creationId xmlns:p14="http://schemas.microsoft.com/office/powerpoint/2010/main" val="1930288520"/>
+        <p14:creationId xmlns:p14="http://schemas.microsoft.com/office/powerpoint/2010/main" val="674903255"/>
       </p:ext>
     </p:extLst>
   </p:cSld>
@@ -5259,11 +5175,7 @@
           <a:p>
             <a:r>
               <a:rPr lang="en-US" dirty="0" smtClean="0"/>
-              <a:t>1c. How </a:t>
-            </a:r>
-            <a:r>
-              <a:rPr lang="en-US" dirty="0" smtClean="0"/>
-              <a:t>to inspect</a:t>
+              <a:t>1b. Use the bound data!</a:t>
             </a:r>
             <a:endParaRPr lang="en-US" dirty="0"/>
           </a:p>
@@ -5286,20 +5198,24 @@
           <a:p>
             <a:r>
               <a:rPr lang="en-US" dirty="0" smtClean="0"/>
-              <a:t>Show __data__ property of the element</a:t>
-            </a:r>
-          </a:p>
-          <a:p>
-            <a:r>
-              <a:rPr lang="en-US" dirty="0" smtClean="0"/>
-              <a:t>Show console.log(this)</a:t>
-            </a:r>
-          </a:p>
-          <a:p>
-            <a:pPr lvl="1"/>
-            <a:r>
-              <a:rPr lang="en-US" dirty="0" smtClean="0"/>
-              <a:t>(</a:t>
+              <a:t>Make height = </a:t>
+            </a:r>
+            <a:r>
+              <a:rPr lang="en-US" dirty="0" err="1" smtClean="0"/>
+              <a:t>d.frequency</a:t>
+            </a:r>
+            <a:endParaRPr lang="en-US" dirty="0" smtClean="0"/>
+          </a:p>
+          <a:p>
+            <a:r>
+              <a:rPr lang="en-US" dirty="0" smtClean="0"/>
+              <a:t>Make width = 10</a:t>
+            </a:r>
+          </a:p>
+          <a:p>
+            <a:r>
+              <a:rPr lang="en-US" dirty="0" smtClean="0"/>
+              <a:t>Make x = </a:t>
             </a:r>
             <a:r>
               <a:rPr lang="en-US" dirty="0" err="1" smtClean="0"/>
@@ -5307,37 +5223,54 @@
             </a:r>
             <a:r>
               <a:rPr lang="en-US" dirty="0" smtClean="0"/>
-              <a:t>)</a:t>
-            </a:r>
-          </a:p>
-          <a:p>
-            <a:pPr lvl="1"/>
-            <a:r>
-              <a:rPr lang="en-US" dirty="0" smtClean="0"/>
-              <a:t>(d</a:t>
-            </a:r>
-            <a:r>
-              <a:rPr lang="en-US" dirty="0" smtClean="0"/>
-              <a:t>)</a:t>
-            </a:r>
-          </a:p>
-          <a:p>
-            <a:pPr lvl="1"/>
-            <a:r>
-              <a:rPr lang="en-US" dirty="0" smtClean="0"/>
-              <a:t>d3.select(this)</a:t>
-            </a:r>
+              <a:t>*10</a:t>
+            </a:r>
+          </a:p>
+          <a:p>
             <a:endParaRPr lang="en-US" dirty="0" smtClean="0"/>
           </a:p>
           <a:p>
-            <a:endParaRPr lang="en-US" dirty="0" smtClean="0"/>
+            <a:r>
+              <a:rPr lang="en-US" dirty="0" smtClean="0"/>
+              <a:t>Try:</a:t>
+            </a:r>
+          </a:p>
+          <a:p>
+            <a:r>
+              <a:rPr lang="en-US" dirty="0"/>
+              <a:t>Make height = 1000x the frequency</a:t>
+            </a:r>
+          </a:p>
+          <a:p>
+            <a:r>
+              <a:rPr lang="en-US" dirty="0"/>
+              <a:t>Make width = 20</a:t>
+            </a:r>
+          </a:p>
+          <a:p>
+            <a:r>
+              <a:rPr lang="en-US" dirty="0"/>
+              <a:t>Make x = </a:t>
+            </a:r>
+            <a:r>
+              <a:rPr lang="en-US" dirty="0" err="1" smtClean="0"/>
+              <a:t>i</a:t>
+            </a:r>
+            <a:r>
+              <a:rPr lang="en-US" dirty="0" smtClean="0"/>
+              <a:t>*22</a:t>
+            </a:r>
+            <a:endParaRPr lang="en-US" dirty="0"/>
+          </a:p>
+          <a:p>
+            <a:endParaRPr lang="en-US" dirty="0"/>
           </a:p>
         </p:txBody>
       </p:sp>
     </p:spTree>
     <p:extLst>
       <p:ext uri="{BB962C8B-B14F-4D97-AF65-F5344CB8AC3E}">
-        <p14:creationId xmlns:p14="http://schemas.microsoft.com/office/powerpoint/2010/main" val="3300785810"/>
+        <p14:creationId xmlns:p14="http://schemas.microsoft.com/office/powerpoint/2010/main" val="1930288520"/>
       </p:ext>
     </p:extLst>
   </p:cSld>
@@ -5381,15 +5314,7 @@
           <a:p>
             <a:r>
               <a:rPr lang="en-US" dirty="0" smtClean="0"/>
-              <a:t>2. Build </a:t>
-            </a:r>
-            <a:r>
-              <a:rPr lang="en-US" dirty="0" smtClean="0"/>
-              <a:t>a </a:t>
-            </a:r>
-            <a:r>
-              <a:rPr lang="en-US" dirty="0" smtClean="0"/>
-              <a:t>scale that makes sense</a:t>
+              <a:t>1c. How to inspect</a:t>
             </a:r>
             <a:endParaRPr lang="en-US" dirty="0"/>
           </a:p>
@@ -5412,39 +5337,24 @@
           <a:p>
             <a:r>
               <a:rPr lang="en-US" dirty="0" smtClean="0"/>
-              <a:t>Create margin object</a:t>
-            </a:r>
-          </a:p>
-          <a:p>
-            <a:r>
-              <a:rPr lang="en-US" dirty="0" smtClean="0"/>
-              <a:t>Create “actual” width/height variables, subtracting the margins</a:t>
-            </a:r>
-            <a:endParaRPr lang="en-US" dirty="0" smtClean="0"/>
-          </a:p>
-          <a:p>
-            <a:endParaRPr lang="en-US" dirty="0" smtClean="0"/>
-          </a:p>
-          <a:p>
-            <a:r>
-              <a:rPr lang="en-US" dirty="0" smtClean="0"/>
-              <a:t>Pass these to x </a:t>
-            </a:r>
-            <a:r>
-              <a:rPr lang="en-US" dirty="0" smtClean="0"/>
-              <a:t>range - band </a:t>
-            </a:r>
-            <a:r>
-              <a:rPr lang="en-US" dirty="0" smtClean="0"/>
-              <a:t>(width) and y </a:t>
-            </a:r>
-            <a:r>
-              <a:rPr lang="en-US" dirty="0" smtClean="0"/>
-              <a:t>range - linear </a:t>
-            </a:r>
-            <a:r>
-              <a:rPr lang="en-US" dirty="0" smtClean="0"/>
-              <a:t>(height</a:t>
+              <a:t>Show __data__ property of the element</a:t>
+            </a:r>
+          </a:p>
+          <a:p>
+            <a:r>
+              <a:rPr lang="en-US" dirty="0" smtClean="0"/>
+              <a:t>Show console.log(this)</a:t>
+            </a:r>
+          </a:p>
+          <a:p>
+            <a:pPr lvl="1"/>
+            <a:r>
+              <a:rPr lang="en-US" dirty="0" smtClean="0"/>
+              <a:t>(</a:t>
+            </a:r>
+            <a:r>
+              <a:rPr lang="en-US" dirty="0" err="1" smtClean="0"/>
+              <a:t>i</a:t>
             </a:r>
             <a:r>
               <a:rPr lang="en-US" dirty="0" smtClean="0"/>
@@ -5452,32 +5362,20 @@
             </a:r>
           </a:p>
           <a:p>
-            <a:r>
-              <a:rPr lang="en-US" dirty="0" smtClean="0"/>
-              <a:t>Pass our data to the domain, using map for letters and max for </a:t>
-            </a:r>
-            <a:r>
-              <a:rPr lang="en-US" dirty="0" err="1" smtClean="0"/>
-              <a:t>requency</a:t>
-            </a:r>
-            <a:endParaRPr lang="en-US" dirty="0" smtClean="0"/>
-          </a:p>
-          <a:p>
-            <a:endParaRPr lang="en-US" dirty="0"/>
-          </a:p>
-          <a:p>
-            <a:r>
-              <a:rPr lang="en-US" dirty="0" smtClean="0"/>
-              <a:t>Update our </a:t>
-            </a:r>
-            <a:r>
-              <a:rPr lang="en-US" dirty="0" err="1" smtClean="0"/>
-              <a:t>attr</a:t>
-            </a:r>
-            <a:r>
-              <a:rPr lang="en-US" dirty="0" smtClean="0"/>
-              <a:t> binding to use these new things</a:t>
-            </a:r>
+            <a:pPr lvl="1"/>
+            <a:r>
+              <a:rPr lang="en-US" dirty="0" smtClean="0"/>
+              <a:t>(d)</a:t>
+            </a:r>
+          </a:p>
+          <a:p>
+            <a:pPr lvl="1"/>
+            <a:r>
+              <a:rPr lang="en-US" dirty="0" smtClean="0"/>
+              <a:t>d3.select(this)</a:t>
+            </a:r>
+          </a:p>
+          <a:p>
             <a:endParaRPr lang="en-US" dirty="0" smtClean="0"/>
           </a:p>
         </p:txBody>
@@ -5485,7 +5383,7 @@
     </p:spTree>
     <p:extLst>
       <p:ext uri="{BB962C8B-B14F-4D97-AF65-F5344CB8AC3E}">
-        <p14:creationId xmlns:p14="http://schemas.microsoft.com/office/powerpoint/2010/main" val="1165932269"/>
+        <p14:creationId xmlns:p14="http://schemas.microsoft.com/office/powerpoint/2010/main" val="3300785810"/>
       </p:ext>
     </p:extLst>
   </p:cSld>
@@ -5529,7 +5427,7 @@
           <a:p>
             <a:r>
               <a:rPr lang="en-US" dirty="0" smtClean="0"/>
-              <a:t>3. Add the axes and some styling</a:t>
+              <a:t>2. Build a scale that makes sense</a:t>
             </a:r>
             <a:endParaRPr lang="en-US" dirty="0"/>
           </a:p>
@@ -5552,63 +5450,58 @@
           <a:p>
             <a:r>
               <a:rPr lang="en-US" dirty="0" smtClean="0"/>
-              <a:t>Append g with an </a:t>
+              <a:t>Create margin object</a:t>
+            </a:r>
+          </a:p>
+          <a:p>
+            <a:r>
+              <a:rPr lang="en-US" dirty="0" smtClean="0"/>
+              <a:t>Create “actual” width/height variables, subtracting the margins</a:t>
+            </a:r>
+          </a:p>
+          <a:p>
+            <a:endParaRPr lang="en-US" dirty="0" smtClean="0"/>
+          </a:p>
+          <a:p>
+            <a:r>
+              <a:rPr lang="en-US" dirty="0" smtClean="0"/>
+              <a:t>Pass these to x range - band (width) and y range - linear (height)</a:t>
+            </a:r>
+          </a:p>
+          <a:p>
+            <a:r>
+              <a:rPr lang="en-US" dirty="0" smtClean="0"/>
+              <a:t>Pass our data to the domain, using map for letters and max for </a:t>
             </a:r>
             <a:r>
               <a:rPr lang="en-US" dirty="0" err="1" smtClean="0"/>
-              <a:t>axisBottom</a:t>
-            </a:r>
-            <a:r>
-              <a:rPr lang="en-US" dirty="0" smtClean="0"/>
-              <a:t> on x, translate for height (to put on bottom – otherwise it is a downward axis on the top)</a:t>
-            </a:r>
-          </a:p>
-          <a:p>
+              <a:t>requency</a:t>
+            </a:r>
             <a:endParaRPr lang="en-US" dirty="0" smtClean="0"/>
           </a:p>
           <a:p>
-            <a:r>
-              <a:rPr lang="en-US" dirty="0" smtClean="0"/>
-              <a:t>Append g with an axis for y, add 10 ticks with %</a:t>
-            </a:r>
-          </a:p>
-          <a:p>
-            <a:endParaRPr lang="en-US" dirty="0" smtClean="0"/>
-          </a:p>
-          <a:p>
-            <a:r>
-              <a:rPr lang="en-US" dirty="0" smtClean="0"/>
-              <a:t>Open our empty index.css </a:t>
-            </a:r>
-          </a:p>
-          <a:p>
-            <a:pPr lvl="1"/>
-            <a:r>
-              <a:rPr lang="en-US" dirty="0" smtClean="0"/>
-              <a:t>Add fill color for .bar class and .</a:t>
+            <a:endParaRPr lang="en-US" dirty="0"/>
+          </a:p>
+          <a:p>
+            <a:r>
+              <a:rPr lang="en-US" dirty="0" smtClean="0"/>
+              <a:t>Update our </a:t>
             </a:r>
             <a:r>
               <a:rPr lang="en-US" dirty="0" err="1" smtClean="0"/>
-              <a:t>bar:hover</a:t>
-            </a:r>
-            <a:endParaRPr lang="en-US" dirty="0" smtClean="0"/>
-          </a:p>
-          <a:p>
-            <a:pPr lvl="1"/>
-            <a:r>
-              <a:rPr lang="en-US" dirty="0" smtClean="0"/>
-              <a:t>Remove axis--x path</a:t>
-            </a:r>
-          </a:p>
-          <a:p>
-            <a:endParaRPr lang="en-US" dirty="0"/>
+              <a:t>attr</a:t>
+            </a:r>
+            <a:r>
+              <a:rPr lang="en-US" dirty="0" smtClean="0"/>
+              <a:t> binding to use these new things</a:t>
+            </a:r>
           </a:p>
         </p:txBody>
       </p:sp>
     </p:spTree>
     <p:extLst>
       <p:ext uri="{BB962C8B-B14F-4D97-AF65-F5344CB8AC3E}">
-        <p14:creationId xmlns:p14="http://schemas.microsoft.com/office/powerpoint/2010/main" val="4110432089"/>
+        <p14:creationId xmlns:p14="http://schemas.microsoft.com/office/powerpoint/2010/main" val="1165932269"/>
       </p:ext>
     </p:extLst>
   </p:cSld>
@@ -5637,46 +5530,93 @@
       </p:grpSpPr>
       <p:sp>
         <p:nvSpPr>
-          <p:cNvPr id="4" name="Title 3"/>
-          <p:cNvSpPr>
-            <a:spLocks noGrp="1"/>
-          </p:cNvSpPr>
-          <p:nvPr>
-            <p:ph type="ctrTitle"/>
-          </p:nvPr>
-        </p:nvSpPr>
-        <p:spPr/>
-        <p:txBody>
-          <a:bodyPr/>
-          <a:lstStyle/>
-          <a:p>
-            <a:r>
-              <a:rPr lang="en-US" dirty="0" smtClean="0"/>
-              <a:t>Resources</a:t>
-            </a:r>
-            <a:endParaRPr lang="en-US" dirty="0"/>
-          </a:p>
-        </p:txBody>
-      </p:sp>
-      <p:sp>
-        <p:nvSpPr>
-          <p:cNvPr id="5" name="Subtitle 4"/>
-          <p:cNvSpPr>
-            <a:spLocks noGrp="1"/>
-          </p:cNvSpPr>
-          <p:nvPr>
-            <p:ph type="subTitle" idx="1"/>
-          </p:nvPr>
-        </p:nvSpPr>
-        <p:spPr/>
-        <p:txBody>
-          <a:bodyPr/>
-          <a:lstStyle/>
-          <a:p>
-            <a:r>
-              <a:rPr lang="en-US" dirty="0" smtClean="0"/>
-              <a:t>Things you should explore when looking further</a:t>
-            </a:r>
+          <p:cNvPr id="2" name="Title 1"/>
+          <p:cNvSpPr>
+            <a:spLocks noGrp="1"/>
+          </p:cNvSpPr>
+          <p:nvPr>
+            <p:ph type="title"/>
+          </p:nvPr>
+        </p:nvSpPr>
+        <p:spPr/>
+        <p:txBody>
+          <a:bodyPr/>
+          <a:lstStyle/>
+          <a:p>
+            <a:r>
+              <a:rPr lang="en-US" dirty="0" smtClean="0"/>
+              <a:t>3. Add the axes and some styling</a:t>
+            </a:r>
+            <a:endParaRPr lang="en-US" dirty="0"/>
+          </a:p>
+        </p:txBody>
+      </p:sp>
+      <p:sp>
+        <p:nvSpPr>
+          <p:cNvPr id="3" name="Content Placeholder 2"/>
+          <p:cNvSpPr>
+            <a:spLocks noGrp="1"/>
+          </p:cNvSpPr>
+          <p:nvPr>
+            <p:ph idx="1"/>
+          </p:nvPr>
+        </p:nvSpPr>
+        <p:spPr/>
+        <p:txBody>
+          <a:bodyPr/>
+          <a:lstStyle/>
+          <a:p>
+            <a:r>
+              <a:rPr lang="en-US" dirty="0" smtClean="0"/>
+              <a:t>Append g with an </a:t>
+            </a:r>
+            <a:r>
+              <a:rPr lang="en-US" dirty="0" err="1" smtClean="0"/>
+              <a:t>axisBottom</a:t>
+            </a:r>
+            <a:r>
+              <a:rPr lang="en-US" dirty="0" smtClean="0"/>
+              <a:t> on x, translate for height (to put on bottom – otherwise it is a downward axis on the top)</a:t>
+            </a:r>
+          </a:p>
+          <a:p>
+            <a:endParaRPr lang="en-US" dirty="0" smtClean="0"/>
+          </a:p>
+          <a:p>
+            <a:r>
+              <a:rPr lang="en-US" dirty="0" smtClean="0"/>
+              <a:t>Append g with an axis for y, add 10 ticks with %</a:t>
+            </a:r>
+          </a:p>
+          <a:p>
+            <a:endParaRPr lang="en-US" dirty="0" smtClean="0"/>
+          </a:p>
+          <a:p>
+            <a:r>
+              <a:rPr lang="en-US" dirty="0" smtClean="0"/>
+              <a:t>Open our empty index.css </a:t>
+            </a:r>
+          </a:p>
+          <a:p>
+            <a:pPr lvl="1"/>
+            <a:r>
+              <a:rPr lang="en-US" dirty="0" smtClean="0"/>
+              <a:t>Add fill color for .bar class and .</a:t>
+            </a:r>
+            <a:r>
+              <a:rPr lang="en-US" dirty="0" err="1" smtClean="0"/>
+              <a:t>bar:hover</a:t>
+            </a:r>
+            <a:endParaRPr lang="en-US" dirty="0" smtClean="0"/>
+          </a:p>
+          <a:p>
+            <a:pPr lvl="1"/>
+            <a:r>
+              <a:rPr lang="en-US" dirty="0" smtClean="0"/>
+              <a:t>Remove axis--x path</a:t>
+            </a:r>
+          </a:p>
+          <a:p>
             <a:endParaRPr lang="en-US" dirty="0"/>
           </a:p>
         </p:txBody>
@@ -5684,7 +5624,7 @@
     </p:spTree>
     <p:extLst>
       <p:ext uri="{BB962C8B-B14F-4D97-AF65-F5344CB8AC3E}">
-        <p14:creationId xmlns:p14="http://schemas.microsoft.com/office/powerpoint/2010/main" val="2724028488"/>
+        <p14:creationId xmlns:p14="http://schemas.microsoft.com/office/powerpoint/2010/main" val="4110432089"/>
       </p:ext>
     </p:extLst>
   </p:cSld>
@@ -5713,7 +5653,7 @@
       </p:grpSpPr>
       <p:sp>
         <p:nvSpPr>
-          <p:cNvPr id="2" name="Title 1"/>
+          <p:cNvPr id="4" name="Title 3"/>
           <p:cNvSpPr>
             <a:spLocks noGrp="1"/>
           </p:cNvSpPr>
@@ -5728,15 +5668,15 @@
           <a:p>
             <a:r>
               <a:rPr lang="en-US" dirty="0" smtClean="0"/>
-              <a:t>Read the docs!</a:t>
-            </a:r>
-            <a:endParaRPr lang="en-US" dirty="0"/>
-          </a:p>
-        </p:txBody>
-      </p:sp>
-      <p:sp>
-        <p:nvSpPr>
-          <p:cNvPr id="3" name="Content Placeholder 2"/>
+              <a:t>Resources</a:t>
+            </a:r>
+            <a:endParaRPr lang="en-US" dirty="0"/>
+          </a:p>
+        </p:txBody>
+      </p:sp>
+      <p:sp>
+        <p:nvSpPr>
+          <p:cNvPr id="5" name="Subtitle 4"/>
           <p:cNvSpPr>
             <a:spLocks noGrp="1"/>
           </p:cNvSpPr>
@@ -5750,30 +5690,8 @@
           <a:lstStyle/>
           <a:p>
             <a:r>
-              <a:rPr lang="en-US" b="1" dirty="0" smtClean="0"/>
-              <a:t>D3: </a:t>
-            </a:r>
-            <a:r>
-              <a:rPr lang="en-US" dirty="0" smtClean="0"/>
-              <a:t>https</a:t>
-            </a:r>
-            <a:r>
-              <a:rPr lang="en-US" dirty="0"/>
-              <a:t>://</a:t>
-            </a:r>
-            <a:r>
-              <a:rPr lang="en-US" dirty="0" smtClean="0"/>
-              <a:t>github.com/d3/d3/wiki</a:t>
-            </a:r>
-          </a:p>
-          <a:p>
-            <a:r>
-              <a:rPr lang="en-US" b="1" dirty="0"/>
-              <a:t>Web: </a:t>
-            </a:r>
-            <a:r>
-              <a:rPr lang="en-US" dirty="0"/>
-              <a:t>https://developer.mozilla.org/en-US/</a:t>
+              <a:rPr lang="en-US" dirty="0" smtClean="0"/>
+              <a:t>Things you should explore when looking further</a:t>
             </a:r>
             <a:endParaRPr lang="en-US" dirty="0"/>
           </a:p>
@@ -5782,7 +5700,7 @@
     </p:spTree>
     <p:extLst>
       <p:ext uri="{BB962C8B-B14F-4D97-AF65-F5344CB8AC3E}">
-        <p14:creationId xmlns:p14="http://schemas.microsoft.com/office/powerpoint/2010/main" val="2779721294"/>
+        <p14:creationId xmlns:p14="http://schemas.microsoft.com/office/powerpoint/2010/main" val="2724028488"/>
       </p:ext>
     </p:extLst>
   </p:cSld>
@@ -5811,7 +5729,7 @@
       </p:grpSpPr>
       <p:sp>
         <p:nvSpPr>
-          <p:cNvPr id="4" name="Title 3"/>
+          <p:cNvPr id="2" name="Title 1"/>
           <p:cNvSpPr>
             <a:spLocks noGrp="1"/>
           </p:cNvSpPr>
@@ -5826,15 +5744,15 @@
           <a:p>
             <a:r>
               <a:rPr lang="en-US" dirty="0" smtClean="0"/>
-              <a:t>Top 3 resources:</a:t>
-            </a:r>
-            <a:endParaRPr lang="en-US" dirty="0"/>
-          </a:p>
-        </p:txBody>
-      </p:sp>
-      <p:sp>
-        <p:nvSpPr>
-          <p:cNvPr id="5" name="Subtitle 4"/>
+              <a:t>Read the docs!</a:t>
+            </a:r>
+            <a:endParaRPr lang="en-US" dirty="0"/>
+          </a:p>
+        </p:txBody>
+      </p:sp>
+      <p:sp>
+        <p:nvSpPr>
+          <p:cNvPr id="3" name="Content Placeholder 2"/>
           <p:cNvSpPr>
             <a:spLocks noGrp="1"/>
           </p:cNvSpPr>
@@ -5848,47 +5766,38 @@
           <a:lstStyle/>
           <a:p>
             <a:r>
-              <a:rPr lang="en-US" dirty="0" smtClean="0"/>
-              <a:t>The d3 API documentation</a:t>
-            </a:r>
-          </a:p>
-          <a:p>
-            <a:r>
-              <a:rPr lang="en-US" dirty="0" smtClean="0"/>
-              <a:t>MDN web standards documentation</a:t>
-            </a:r>
-          </a:p>
-          <a:p>
+              <a:rPr lang="en-US" b="1" dirty="0" smtClean="0"/>
+              <a:t>D3: </a:t>
+            </a:r>
+            <a:r>
+              <a:rPr lang="en-US" dirty="0" smtClean="0"/>
+              <a:t>https</a:t>
+            </a:r>
             <a:r>
               <a:rPr lang="en-US" dirty="0"/>
-              <a:t>Googling </a:t>
-            </a:r>
-            <a:r>
-              <a:rPr lang="en-US" dirty="0" smtClean="0"/>
-              <a:t>things you want to make </a:t>
+              <a:t>://</a:t>
+            </a:r>
+            <a:r>
+              <a:rPr lang="en-US" dirty="0" smtClean="0"/>
+              <a:t>github.com/d3/d3/wiki</a:t>
+            </a:r>
+          </a:p>
+          <a:p>
+            <a:r>
+              <a:rPr lang="en-US" b="1" dirty="0"/>
+              <a:t>Web: </a:t>
             </a:r>
             <a:r>
               <a:rPr lang="en-US" dirty="0"/>
-              <a:t>(“d3 scatterplot </a:t>
-            </a:r>
-            <a:r>
-              <a:rPr lang="en-US" dirty="0" err="1"/>
-              <a:t>bl.ocks</a:t>
-            </a:r>
-            <a:r>
-              <a:rPr lang="en-US" dirty="0"/>
-              <a:t>”)</a:t>
-            </a:r>
-          </a:p>
-          <a:p>
-            <a:endParaRPr lang="en-US" dirty="0"/>
+              <a:t>https://developer.mozilla.org/en-US/</a:t>
+            </a:r>
           </a:p>
         </p:txBody>
       </p:sp>
     </p:spTree>
     <p:extLst>
       <p:ext uri="{BB962C8B-B14F-4D97-AF65-F5344CB8AC3E}">
-        <p14:creationId xmlns:p14="http://schemas.microsoft.com/office/powerpoint/2010/main" val="3084310567"/>
+        <p14:creationId xmlns:p14="http://schemas.microsoft.com/office/powerpoint/2010/main" val="2779721294"/>
       </p:ext>
     </p:extLst>
   </p:cSld>
@@ -5917,7 +5826,7 @@
       </p:grpSpPr>
       <p:sp>
         <p:nvSpPr>
-          <p:cNvPr id="2" name="Title 1"/>
+          <p:cNvPr id="4" name="Title 3"/>
           <p:cNvSpPr>
             <a:spLocks noGrp="1"/>
           </p:cNvSpPr>
@@ -5925,27 +5834,22 @@
             <p:ph type="ctrTitle"/>
           </p:nvPr>
         </p:nvSpPr>
-        <p:spPr>
-          <a:xfrm>
-            <a:off x="1524000" y="174567"/>
-            <a:ext cx="9144000" cy="982894"/>
-          </a:xfrm>
-        </p:spPr>
-        <p:txBody>
-          <a:bodyPr/>
-          <a:lstStyle/>
-          <a:p>
-            <a:r>
-              <a:rPr lang="en-US" dirty="0" smtClean="0"/>
-              <a:t>Listing the Basics:</a:t>
-            </a:r>
-            <a:endParaRPr lang="en-US" dirty="0"/>
-          </a:p>
-        </p:txBody>
-      </p:sp>
-      <p:sp>
-        <p:nvSpPr>
-          <p:cNvPr id="3" name="Subtitle 2"/>
+        <p:spPr/>
+        <p:txBody>
+          <a:bodyPr/>
+          <a:lstStyle/>
+          <a:p>
+            <a:r>
+              <a:rPr lang="en-US" dirty="0" smtClean="0"/>
+              <a:t>Top 3 resources:</a:t>
+            </a:r>
+            <a:endParaRPr lang="en-US" dirty="0"/>
+          </a:p>
+        </p:txBody>
+      </p:sp>
+      <p:sp>
+        <p:nvSpPr>
+          <p:cNvPr id="5" name="Subtitle 4"/>
           <p:cNvSpPr>
             <a:spLocks noGrp="1"/>
           </p:cNvSpPr>
@@ -5953,145 +5857,45 @@
             <p:ph type="subTitle" idx="1"/>
           </p:nvPr>
         </p:nvSpPr>
-        <p:spPr>
-          <a:xfrm>
-            <a:off x="2219498" y="1263535"/>
-            <a:ext cx="7753004" cy="5412394"/>
-          </a:xfrm>
-        </p:spPr>
-        <p:txBody>
-          <a:bodyPr>
-            <a:normAutofit/>
-          </a:bodyPr>
-          <a:lstStyle/>
-          <a:p>
-            <a:pPr algn="l"/>
-            <a:r>
-              <a:rPr lang="en-US" sz="2800" b="1" dirty="0" smtClean="0"/>
-              <a:t>Know what these are, you will use them often:</a:t>
-            </a:r>
-          </a:p>
-          <a:p>
-            <a:pPr marL="342900" indent="-342900" algn="l">
-              <a:buFont typeface="Arial" panose="020B0604020202020204" pitchFamily="34" charset="0"/>
-              <a:buChar char="•"/>
-            </a:pPr>
-            <a:r>
-              <a:rPr lang="en-US" dirty="0" smtClean="0"/>
-              <a:t>Selections (select, </a:t>
-            </a:r>
-            <a:r>
-              <a:rPr lang="en-US" dirty="0" err="1" smtClean="0"/>
-              <a:t>selectAll</a:t>
-            </a:r>
-            <a:r>
-              <a:rPr lang="en-US" dirty="0" smtClean="0"/>
-              <a:t> and how they work</a:t>
-            </a:r>
-            <a:r>
-              <a:rPr lang="en-US" dirty="0" smtClean="0"/>
-              <a:t>)</a:t>
-            </a:r>
-          </a:p>
-          <a:p>
-            <a:pPr marL="342900" indent="-342900" algn="l">
-              <a:buFont typeface="Arial" panose="020B0604020202020204" pitchFamily="34" charset="0"/>
-              <a:buChar char="•"/>
-            </a:pPr>
-            <a:r>
-              <a:rPr lang="en-US" dirty="0" smtClean="0"/>
-              <a:t>SVG types (circle, </a:t>
-            </a:r>
-            <a:r>
-              <a:rPr lang="en-US" dirty="0" err="1" smtClean="0"/>
-              <a:t>rect</a:t>
-            </a:r>
-            <a:r>
-              <a:rPr lang="en-US" dirty="0" smtClean="0"/>
-              <a:t>, text, path)</a:t>
-            </a:r>
-            <a:endParaRPr lang="en-US" dirty="0" smtClean="0"/>
-          </a:p>
-          <a:p>
-            <a:pPr marL="342900" indent="-342900" algn="l">
-              <a:buFont typeface="Arial" panose="020B0604020202020204" pitchFamily="34" charset="0"/>
-              <a:buChar char="•"/>
-            </a:pPr>
-            <a:r>
-              <a:rPr lang="en-US" dirty="0" smtClean="0"/>
-              <a:t>Data Enter/Append</a:t>
-            </a:r>
-          </a:p>
-          <a:p>
-            <a:pPr marL="342900" indent="-342900" algn="l">
-              <a:buFont typeface="Arial" panose="020B0604020202020204" pitchFamily="34" charset="0"/>
-              <a:buChar char="•"/>
-            </a:pPr>
-            <a:r>
-              <a:rPr lang="en-US" dirty="0" smtClean="0"/>
-              <a:t>Data Exit/Remove</a:t>
-            </a:r>
-          </a:p>
-          <a:p>
-            <a:pPr marL="342900" indent="-342900" algn="l">
-              <a:buFont typeface="Arial" panose="020B0604020202020204" pitchFamily="34" charset="0"/>
-              <a:buChar char="•"/>
-            </a:pPr>
-            <a:r>
-              <a:rPr lang="en-US" dirty="0" smtClean="0"/>
-              <a:t>Chaining</a:t>
-            </a:r>
-          </a:p>
-          <a:p>
-            <a:pPr marL="342900" indent="-342900" algn="l">
-              <a:buFont typeface="Arial" panose="020B0604020202020204" pitchFamily="34" charset="0"/>
-              <a:buChar char="•"/>
-            </a:pPr>
-            <a:r>
-              <a:rPr lang="en-US" dirty="0" err="1" smtClean="0"/>
-              <a:t>Attributes+Transitions</a:t>
-            </a:r>
-            <a:endParaRPr lang="en-US" dirty="0" smtClean="0"/>
-          </a:p>
-          <a:p>
-            <a:pPr marL="342900" indent="-342900" algn="l">
-              <a:buFont typeface="Arial" panose="020B0604020202020204" pitchFamily="34" charset="0"/>
-              <a:buChar char="•"/>
-            </a:pPr>
-            <a:r>
-              <a:rPr lang="en-US" dirty="0" smtClean="0"/>
-              <a:t>Arrays: Min/Max/Range, Keys, Merge, Nest</a:t>
-            </a:r>
-          </a:p>
-          <a:p>
-            <a:pPr marL="342900" indent="-342900" algn="l">
-              <a:buFont typeface="Arial" panose="020B0604020202020204" pitchFamily="34" charset="0"/>
-              <a:buChar char="•"/>
-            </a:pPr>
-            <a:r>
-              <a:rPr lang="en-US" dirty="0" smtClean="0"/>
-              <a:t>Scales</a:t>
-            </a:r>
-          </a:p>
-          <a:p>
-            <a:pPr marL="342900" indent="-342900" algn="l">
-              <a:buFont typeface="Arial" panose="020B0604020202020204" pitchFamily="34" charset="0"/>
-              <a:buChar char="•"/>
-            </a:pPr>
-            <a:r>
-              <a:rPr lang="en-US" dirty="0" smtClean="0"/>
-              <a:t>Color</a:t>
-            </a:r>
-          </a:p>
-          <a:p>
-            <a:pPr marL="342900" indent="-342900" algn="l">
-              <a:buFont typeface="Arial" panose="020B0604020202020204" pitchFamily="34" charset="0"/>
-              <a:buChar char="•"/>
-            </a:pPr>
-            <a:r>
-              <a:rPr lang="en-US" dirty="0" smtClean="0"/>
-              <a:t>Axes</a:t>
-            </a:r>
+        <p:spPr/>
+        <p:txBody>
+          <a:bodyPr/>
+          <a:lstStyle/>
+          <a:p>
+            <a:r>
+              <a:rPr lang="en-US" dirty="0" smtClean="0"/>
+              <a:t>The d3 API documentation</a:t>
+            </a:r>
+          </a:p>
+          <a:p>
+            <a:r>
+              <a:rPr lang="en-US" dirty="0" smtClean="0"/>
+              <a:t>MDN web standards documentation</a:t>
+            </a:r>
+          </a:p>
+          <a:p>
+            <a:r>
+              <a:rPr lang="en-US" dirty="0"/>
+              <a:t>Googling </a:t>
+            </a:r>
+            <a:r>
+              <a:rPr lang="en-US" dirty="0" smtClean="0"/>
+              <a:t>things you want to make </a:t>
+            </a:r>
+            <a:r>
+              <a:rPr lang="en-US" dirty="0"/>
+              <a:t>(“d3 scatterplot </a:t>
+            </a:r>
+            <a:r>
+              <a:rPr lang="en-US" dirty="0" err="1"/>
+              <a:t>bl.ocks</a:t>
+            </a:r>
+            <a:r>
+              <a:rPr lang="en-US" dirty="0"/>
+              <a:t>”)</a:t>
+            </a:r>
+          </a:p>
+          <a:p>
             <a:endParaRPr lang="en-US" dirty="0"/>
           </a:p>
         </p:txBody>
@@ -6099,7 +5903,7 @@
     </p:spTree>
     <p:extLst>
       <p:ext uri="{BB962C8B-B14F-4D97-AF65-F5344CB8AC3E}">
-        <p14:creationId xmlns:p14="http://schemas.microsoft.com/office/powerpoint/2010/main" val="1452815126"/>
+        <p14:creationId xmlns:p14="http://schemas.microsoft.com/office/powerpoint/2010/main" val="3084310567"/>
       </p:ext>
     </p:extLst>
   </p:cSld>
@@ -6136,30 +5940,30 @@
             <p:ph type="ctrTitle"/>
           </p:nvPr>
         </p:nvSpPr>
-        <p:spPr/>
-        <p:txBody>
-          <a:bodyPr/>
-          <a:lstStyle/>
-          <a:p>
-            <a:r>
-              <a:rPr lang="en-US" dirty="0" smtClean="0"/>
-              <a:t>y </a:t>
-            </a:r>
-            <a:r>
-              <a:rPr lang="en-US" dirty="0" err="1" smtClean="0"/>
-              <a:t>tho</a:t>
-            </a:r>
-            <a:r>
-              <a:rPr lang="en-US" dirty="0" smtClean="0"/>
-              <a:t>?</a:t>
-            </a:r>
-            <a:endParaRPr lang="en-US" dirty="0"/>
-          </a:p>
-        </p:txBody>
-      </p:sp>
-      <p:sp>
-        <p:nvSpPr>
-          <p:cNvPr id="4" name="Subtitle 3"/>
+        <p:spPr>
+          <a:xfrm>
+            <a:off x="1524000" y="1064027"/>
+            <a:ext cx="9144000" cy="1207337"/>
+          </a:xfrm>
+        </p:spPr>
+        <p:txBody>
+          <a:bodyPr>
+            <a:normAutofit/>
+          </a:bodyPr>
+          <a:lstStyle/>
+          <a:p>
+            <a:pPr algn="l"/>
+            <a:r>
+              <a:rPr lang="en-US" dirty="0" smtClean="0"/>
+              <a:t>What is D3 capable of?</a:t>
+            </a:r>
+            <a:endParaRPr lang="en-US" dirty="0"/>
+          </a:p>
+        </p:txBody>
+      </p:sp>
+      <p:sp>
+        <p:nvSpPr>
+          <p:cNvPr id="3" name="Subtitle 2"/>
           <p:cNvSpPr>
             <a:spLocks noGrp="1"/>
           </p:cNvSpPr>
@@ -6167,15 +5971,85 @@
             <p:ph type="subTitle" idx="1"/>
           </p:nvPr>
         </p:nvSpPr>
-        <p:spPr/>
-        <p:txBody>
-          <a:bodyPr/>
-          <a:lstStyle/>
-          <a:p>
-            <a:r>
-              <a:rPr lang="en-US" dirty="0" smtClean="0"/>
-              <a:t>Answer: the web + data = magic.</a:t>
-            </a:r>
+        <p:spPr>
+          <a:xfrm>
+            <a:off x="1524000" y="2271364"/>
+            <a:ext cx="9144000" cy="4048320"/>
+          </a:xfrm>
+        </p:spPr>
+        <p:txBody>
+          <a:bodyPr/>
+          <a:lstStyle/>
+          <a:p>
+            <a:pPr algn="l"/>
+            <a:r>
+              <a:rPr lang="en-US" dirty="0"/>
+              <a:t>https://</a:t>
+            </a:r>
+            <a:r>
+              <a:rPr lang="en-US" dirty="0" smtClean="0"/>
+              <a:t>ligo.northwestern.edu/media/mass-plot/index.html</a:t>
+            </a:r>
+          </a:p>
+          <a:p>
+            <a:pPr algn="l"/>
+            <a:endParaRPr lang="en-US" dirty="0" smtClean="0"/>
+          </a:p>
+          <a:p>
+            <a:pPr algn="l"/>
+            <a:r>
+              <a:rPr lang="en-US" dirty="0" smtClean="0"/>
+              <a:t>http</a:t>
+            </a:r>
+            <a:r>
+              <a:rPr lang="en-US" dirty="0"/>
+              <a:t>://www.r2d3.us/visual-intro-to-machine-learning-part-1</a:t>
+            </a:r>
+            <a:r>
+              <a:rPr lang="en-US" dirty="0" smtClean="0"/>
+              <a:t>/</a:t>
+            </a:r>
+          </a:p>
+          <a:p>
+            <a:pPr algn="l"/>
+            <a:r>
+              <a:rPr lang="en-US" dirty="0"/>
+              <a:t>http://</a:t>
+            </a:r>
+            <a:r>
+              <a:rPr lang="en-US" dirty="0" smtClean="0"/>
+              <a:t>bit.ly/2wJEeIy</a:t>
+            </a:r>
+          </a:p>
+          <a:p>
+            <a:pPr algn="l"/>
+            <a:r>
+              <a:rPr lang="en-US" dirty="0" smtClean="0"/>
+              <a:t>http://nbremer.github.io/urbanization/</a:t>
+            </a:r>
+          </a:p>
+          <a:p>
+            <a:pPr algn="l"/>
+            <a:r>
+              <a:rPr lang="en-US" dirty="0" smtClean="0"/>
+              <a:t>https</a:t>
+            </a:r>
+            <a:r>
+              <a:rPr lang="en-US" dirty="0"/>
+              <a:t>://</a:t>
+            </a:r>
+            <a:r>
+              <a:rPr lang="en-US" dirty="0" smtClean="0"/>
+              <a:t>www.nytimes.com/interactive/2014/upshot/buy-rent-calculator.htmlhttps</a:t>
+            </a:r>
+            <a:r>
+              <a:rPr lang="en-US" dirty="0"/>
+              <a:t>://bost.ocks.org/mike/algorithms/</a:t>
+            </a:r>
+            <a:endParaRPr lang="en-US" dirty="0" smtClean="0"/>
+          </a:p>
+          <a:p>
+            <a:pPr algn="l"/>
             <a:endParaRPr lang="en-US" dirty="0"/>
           </a:p>
         </p:txBody>
@@ -6183,7 +6057,7 @@
     </p:spTree>
     <p:extLst>
       <p:ext uri="{BB962C8B-B14F-4D97-AF65-F5344CB8AC3E}">
-        <p14:creationId xmlns:p14="http://schemas.microsoft.com/office/powerpoint/2010/main" val="1573091371"/>
+        <p14:creationId xmlns:p14="http://schemas.microsoft.com/office/powerpoint/2010/main" val="990942484"/>
       </p:ext>
     </p:extLst>
   </p:cSld>
@@ -6220,14 +6094,19 @@
             <p:ph type="ctrTitle"/>
           </p:nvPr>
         </p:nvSpPr>
-        <p:spPr/>
-        <p:txBody>
-          <a:bodyPr/>
-          <a:lstStyle/>
-          <a:p>
-            <a:r>
-              <a:rPr lang="en-US" dirty="0" smtClean="0"/>
-              <a:t>Design Basics for Charts</a:t>
+        <p:spPr>
+          <a:xfrm>
+            <a:off x="1524000" y="174567"/>
+            <a:ext cx="9144000" cy="982894"/>
+          </a:xfrm>
+        </p:spPr>
+        <p:txBody>
+          <a:bodyPr/>
+          <a:lstStyle/>
+          <a:p>
+            <a:r>
+              <a:rPr lang="en-US" dirty="0" smtClean="0"/>
+              <a:t>Listing the Basics:</a:t>
             </a:r>
             <a:endParaRPr lang="en-US" dirty="0"/>
           </a:p>
@@ -6243,40 +6122,139 @@
             <p:ph type="subTitle" idx="1"/>
           </p:nvPr>
         </p:nvSpPr>
-        <p:spPr/>
-        <p:txBody>
-          <a:bodyPr/>
-          <a:lstStyle/>
-          <a:p>
-            <a:r>
-              <a:rPr lang="en-US" sz="4000" dirty="0"/>
-              <a:t>http://</a:t>
-            </a:r>
-            <a:r>
-              <a:rPr lang="en-US" sz="4000" dirty="0" smtClean="0"/>
-              <a:t>bit.ly/1RfYZxm</a:t>
-            </a:r>
-          </a:p>
-          <a:p>
-            <a:r>
-              <a:rPr lang="en-US" dirty="0" smtClean="0"/>
-              <a:t>Worth mentioning: There are additional </a:t>
+        <p:spPr>
+          <a:xfrm>
+            <a:off x="2219498" y="1263535"/>
+            <a:ext cx="7753004" cy="5412394"/>
+          </a:xfrm>
+        </p:spPr>
+        <p:txBody>
+          <a:bodyPr>
+            <a:normAutofit/>
+          </a:bodyPr>
+          <a:lstStyle/>
+          <a:p>
+            <a:pPr algn="l"/>
+            <a:r>
+              <a:rPr lang="en-US" sz="2800" b="1" dirty="0" smtClean="0"/>
+              <a:t>Know what these are, you will use them often:</a:t>
+            </a:r>
+          </a:p>
+          <a:p>
+            <a:pPr marL="342900" indent="-342900" algn="l">
+              <a:buFont typeface="Arial" panose="020B0604020202020204" pitchFamily="34" charset="0"/>
+              <a:buChar char="•"/>
+            </a:pPr>
+            <a:r>
+              <a:rPr lang="en-US" dirty="0" smtClean="0"/>
+              <a:t>Selections (select, </a:t>
             </a:r>
             <a:r>
               <a:rPr lang="en-US" dirty="0" err="1" smtClean="0"/>
-              <a:t>slidedecks</a:t>
-            </a:r>
-            <a:r>
-              <a:rPr lang="en-US" dirty="0" smtClean="0"/>
-              <a:t> by </a:t>
-            </a:r>
-            <a:r>
-              <a:rPr lang="en-US" dirty="0" smtClean="0"/>
-              <a:t>the above authors </a:t>
-            </a:r>
-            <a:r>
-              <a:rPr lang="en-US" dirty="0" smtClean="0"/>
-              <a:t>on Maps, Pie Charts, and even Data Tables</a:t>
+              <a:t>selectAll</a:t>
+            </a:r>
+            <a:r>
+              <a:rPr lang="en-US" dirty="0" smtClean="0"/>
+              <a:t> and how they work)</a:t>
+            </a:r>
+          </a:p>
+          <a:p>
+            <a:pPr marL="342900" indent="-342900" algn="l">
+              <a:buFont typeface="Arial" panose="020B0604020202020204" pitchFamily="34" charset="0"/>
+              <a:buChar char="•"/>
+            </a:pPr>
+            <a:r>
+              <a:rPr lang="en-US" dirty="0" smtClean="0"/>
+              <a:t>SVG types (circle, </a:t>
+            </a:r>
+            <a:r>
+              <a:rPr lang="en-US" dirty="0" err="1" smtClean="0"/>
+              <a:t>rect</a:t>
+            </a:r>
+            <a:r>
+              <a:rPr lang="en-US" dirty="0" smtClean="0"/>
+              <a:t>, text, path)</a:t>
+            </a:r>
+          </a:p>
+          <a:p>
+            <a:pPr marL="342900" indent="-342900" algn="l">
+              <a:buFont typeface="Arial" panose="020B0604020202020204" pitchFamily="34" charset="0"/>
+              <a:buChar char="•"/>
+            </a:pPr>
+            <a:r>
+              <a:rPr lang="en-US" dirty="0" smtClean="0"/>
+              <a:t>Data Enter/Append</a:t>
+            </a:r>
+          </a:p>
+          <a:p>
+            <a:pPr marL="342900" indent="-342900" algn="l">
+              <a:buFont typeface="Arial" panose="020B0604020202020204" pitchFamily="34" charset="0"/>
+              <a:buChar char="•"/>
+            </a:pPr>
+            <a:r>
+              <a:rPr lang="en-US" dirty="0" smtClean="0"/>
+              <a:t>Data Exit/Remove</a:t>
+            </a:r>
+          </a:p>
+          <a:p>
+            <a:pPr marL="342900" indent="-342900" algn="l">
+              <a:buFont typeface="Arial" panose="020B0604020202020204" pitchFamily="34" charset="0"/>
+              <a:buChar char="•"/>
+            </a:pPr>
+            <a:r>
+              <a:rPr lang="en-US" dirty="0" smtClean="0"/>
+              <a:t>Chaining</a:t>
+            </a:r>
+          </a:p>
+          <a:p>
+            <a:pPr marL="342900" indent="-342900" algn="l">
+              <a:buFont typeface="Arial" panose="020B0604020202020204" pitchFamily="34" charset="0"/>
+              <a:buChar char="•"/>
+            </a:pPr>
+            <a:r>
+              <a:rPr lang="en-US" dirty="0" err="1" smtClean="0"/>
+              <a:t>Attributes+Transitions</a:t>
+            </a:r>
+            <a:endParaRPr lang="en-US" dirty="0" smtClean="0"/>
+          </a:p>
+          <a:p>
+            <a:pPr marL="342900" indent="-342900" algn="l">
+              <a:buFont typeface="Arial" panose="020B0604020202020204" pitchFamily="34" charset="0"/>
+              <a:buChar char="•"/>
+            </a:pPr>
+            <a:r>
+              <a:rPr lang="en-US" dirty="0" smtClean="0"/>
+              <a:t>Arrays: Min/Max/Range, Keys, Merge, Nest</a:t>
+            </a:r>
+          </a:p>
+          <a:p>
+            <a:pPr marL="342900" indent="-342900" algn="l">
+              <a:buFont typeface="Arial" panose="020B0604020202020204" pitchFamily="34" charset="0"/>
+              <a:buChar char="•"/>
+            </a:pPr>
+            <a:r>
+              <a:rPr lang="en-US" dirty="0" smtClean="0"/>
+              <a:t>Scales</a:t>
+            </a:r>
+          </a:p>
+          <a:p>
+            <a:pPr marL="342900" indent="-342900" algn="l">
+              <a:buFont typeface="Arial" panose="020B0604020202020204" pitchFamily="34" charset="0"/>
+              <a:buChar char="•"/>
+            </a:pPr>
+            <a:r>
+              <a:rPr lang="en-US" dirty="0" smtClean="0"/>
+              <a:t>Color</a:t>
+            </a:r>
+          </a:p>
+          <a:p>
+            <a:pPr marL="342900" indent="-342900" algn="l">
+              <a:buFont typeface="Arial" panose="020B0604020202020204" pitchFamily="34" charset="0"/>
+              <a:buChar char="•"/>
+            </a:pPr>
+            <a:r>
+              <a:rPr lang="en-US" dirty="0" smtClean="0"/>
+              <a:t>Axes</a:t>
             </a:r>
             <a:endParaRPr lang="en-US" dirty="0"/>
           </a:p>
@@ -6285,7 +6263,7 @@
     </p:spTree>
     <p:extLst>
       <p:ext uri="{BB962C8B-B14F-4D97-AF65-F5344CB8AC3E}">
-        <p14:creationId xmlns:p14="http://schemas.microsoft.com/office/powerpoint/2010/main" val="4186733631"/>
+        <p14:creationId xmlns:p14="http://schemas.microsoft.com/office/powerpoint/2010/main" val="1452815126"/>
       </p:ext>
     </p:extLst>
   </p:cSld>
@@ -6322,19 +6300,14 @@
             <p:ph type="ctrTitle"/>
           </p:nvPr>
         </p:nvSpPr>
-        <p:spPr>
-          <a:xfrm>
-            <a:off x="987829" y="108066"/>
-            <a:ext cx="10216342" cy="1273838"/>
-          </a:xfrm>
-        </p:spPr>
-        <p:txBody>
-          <a:bodyPr/>
-          <a:lstStyle/>
-          <a:p>
-            <a:r>
-              <a:rPr lang="en-US" dirty="0" smtClean="0"/>
-              <a:t>Advanced d3 Abilities</a:t>
+        <p:spPr/>
+        <p:txBody>
+          <a:bodyPr/>
+          <a:lstStyle/>
+          <a:p>
+            <a:r>
+              <a:rPr lang="en-US" dirty="0" smtClean="0"/>
+              <a:t>Design Basics for Charts</a:t>
             </a:r>
             <a:endParaRPr lang="en-US" dirty="0"/>
           </a:p>
@@ -6350,227 +6323,41 @@
             <p:ph type="subTitle" idx="1"/>
           </p:nvPr>
         </p:nvSpPr>
-        <p:spPr>
-          <a:xfrm>
-            <a:off x="201337" y="1975104"/>
-            <a:ext cx="6317673" cy="4160559"/>
-          </a:xfrm>
-        </p:spPr>
-        <p:txBody>
-          <a:bodyPr>
-            <a:normAutofit/>
-          </a:bodyPr>
-          <a:lstStyle/>
-          <a:p>
-            <a:pPr algn="l"/>
-            <a:r>
-              <a:rPr lang="en-US" b="1" dirty="0"/>
-              <a:t>Curve Interpolations: </a:t>
-            </a:r>
-            <a:r>
-              <a:rPr lang="en-US" dirty="0"/>
+        <p:spPr/>
+        <p:txBody>
+          <a:bodyPr/>
+          <a:lstStyle/>
+          <a:p>
+            <a:r>
+              <a:rPr lang="en-US" sz="4000" dirty="0"/>
               <a:t>http://</a:t>
             </a:r>
             <a:r>
-              <a:rPr lang="en-US" dirty="0" smtClean="0"/>
-              <a:t>bit.ly/2xR9VxX</a:t>
-            </a:r>
-            <a:endParaRPr lang="en-US" dirty="0"/>
-          </a:p>
-          <a:p>
-            <a:pPr algn="l"/>
-            <a:r>
-              <a:rPr lang="en-US" b="1" dirty="0" err="1" smtClean="0"/>
-              <a:t>Voronoi</a:t>
-            </a:r>
-            <a:r>
-              <a:rPr lang="en-US" b="1" dirty="0" smtClean="0"/>
-              <a:t>: </a:t>
-            </a:r>
-            <a:r>
-              <a:rPr lang="en-US" dirty="0"/>
-              <a:t>http://</a:t>
-            </a:r>
-            <a:r>
-              <a:rPr lang="en-US" dirty="0" smtClean="0"/>
-              <a:t>bit.ly/2gK35mi </a:t>
-            </a:r>
-          </a:p>
-          <a:p>
-            <a:pPr algn="l"/>
-            <a:r>
-              <a:rPr lang="en-US" dirty="0"/>
-              <a:t>	https://</a:t>
-            </a:r>
-            <a:r>
-              <a:rPr lang="en-US" dirty="0" smtClean="0"/>
-              <a:t>bl.ocks.org/mbostock/4060366</a:t>
-            </a:r>
-          </a:p>
-          <a:p>
-            <a:pPr algn="l"/>
-            <a:r>
-              <a:rPr lang="en-US" b="1" dirty="0" smtClean="0"/>
-              <a:t>Zooming: </a:t>
-            </a:r>
-            <a:r>
-              <a:rPr lang="en-US" dirty="0"/>
-              <a:t>http://</a:t>
-            </a:r>
-            <a:r>
-              <a:rPr lang="en-US" dirty="0" smtClean="0"/>
-              <a:t>bit.ly/2f6WYsg</a:t>
-            </a:r>
-          </a:p>
-          <a:p>
-            <a:pPr algn="l"/>
-            <a:r>
-              <a:rPr lang="en-US" b="1" dirty="0" smtClean="0"/>
-              <a:t>Brushing/Zooming</a:t>
-            </a:r>
-            <a:r>
-              <a:rPr lang="en-US" b="1" dirty="0" smtClean="0"/>
-              <a:t>: </a:t>
-            </a:r>
-            <a:r>
-              <a:rPr lang="en-US" dirty="0"/>
-              <a:t>http://bit.ly/2lTjfef</a:t>
-            </a:r>
-            <a:endParaRPr lang="en-US" dirty="0" smtClean="0"/>
-          </a:p>
-          <a:p>
-            <a:pPr algn="l"/>
-            <a:r>
-              <a:rPr lang="en-US" b="1" dirty="0" smtClean="0"/>
-              <a:t>Stacking:</a:t>
-            </a:r>
-            <a:r>
-              <a:rPr lang="en-US" dirty="0"/>
-              <a:t> http://</a:t>
-            </a:r>
-            <a:r>
-              <a:rPr lang="en-US" dirty="0" smtClean="0"/>
-              <a:t>bl.ocks.org/mbostock/582915</a:t>
-            </a:r>
-          </a:p>
-          <a:p>
-            <a:pPr algn="l"/>
-            <a:r>
-              <a:rPr lang="en-US" b="1" dirty="0" smtClean="0"/>
-              <a:t>Collision Constraint: </a:t>
-            </a:r>
-            <a:r>
-              <a:rPr lang="en-US" dirty="0"/>
-              <a:t>http://</a:t>
-            </a:r>
-            <a:r>
-              <a:rPr lang="en-US" dirty="0" smtClean="0"/>
-              <a:t>bit.ly/2vOPk05</a:t>
-            </a:r>
-          </a:p>
-          <a:p>
-            <a:pPr algn="l"/>
-            <a:r>
-              <a:rPr lang="en-US" b="1" dirty="0" smtClean="0"/>
-              <a:t>Dragging: </a:t>
-            </a:r>
-            <a:r>
-              <a:rPr lang="en-US" dirty="0"/>
-              <a:t>http://</a:t>
-            </a:r>
-            <a:r>
-              <a:rPr lang="en-US" dirty="0" smtClean="0"/>
-              <a:t>bit.ly/2j6x5gH</a:t>
-            </a:r>
-          </a:p>
-          <a:p>
-            <a:pPr algn="l"/>
-            <a:r>
-              <a:rPr lang="en-US" b="1" dirty="0" smtClean="0"/>
-              <a:t>“Each”: </a:t>
-            </a:r>
-            <a:r>
-              <a:rPr lang="en-US" dirty="0"/>
-              <a:t>https://</a:t>
-            </a:r>
-            <a:r>
-              <a:rPr lang="en-US" dirty="0" smtClean="0"/>
-              <a:t>bl.ocks.org/mbostock/9490313</a:t>
-            </a:r>
-          </a:p>
-          <a:p>
-            <a:pPr algn="l"/>
-            <a:endParaRPr lang="en-US" dirty="0"/>
-          </a:p>
-        </p:txBody>
-      </p:sp>
-      <p:sp>
-        <p:nvSpPr>
-          <p:cNvPr id="4" name="Rectangle 3"/>
-          <p:cNvSpPr/>
-          <p:nvPr/>
-        </p:nvSpPr>
-        <p:spPr>
-          <a:xfrm>
-            <a:off x="6519010" y="3085888"/>
-            <a:ext cx="6096000" cy="1938992"/>
-          </a:xfrm>
-          <a:prstGeom prst="rect">
-            <a:avLst/>
-          </a:prstGeom>
-        </p:spPr>
-        <p:txBody>
-          <a:bodyPr>
-            <a:spAutoFit/>
-          </a:bodyPr>
-          <a:lstStyle/>
-          <a:p>
-            <a:r>
-              <a:rPr lang="en-US" sz="2400" b="1" dirty="0"/>
-              <a:t>Dispatching</a:t>
-            </a:r>
-            <a:r>
-              <a:rPr lang="en-US" sz="2400" dirty="0"/>
-              <a:t> (super advanced): https://</a:t>
-            </a:r>
-            <a:r>
-              <a:rPr lang="en-US" sz="2400" dirty="0" smtClean="0"/>
-              <a:t>bl.ocks.org/mbostock/5872848</a:t>
-            </a:r>
-          </a:p>
-          <a:p>
-            <a:endParaRPr lang="en-US" sz="2400" dirty="0"/>
-          </a:p>
-          <a:p>
-            <a:r>
-              <a:rPr lang="en-US" sz="2400" b="1" dirty="0"/>
-              <a:t>Modules/Plugins</a:t>
-            </a:r>
-            <a:r>
-              <a:rPr lang="en-US" sz="2400" dirty="0"/>
-              <a:t> (</a:t>
-            </a:r>
-            <a:r>
-              <a:rPr lang="en-US" sz="2400" i="1" dirty="0"/>
-              <a:t>most</a:t>
-            </a:r>
-            <a:r>
-              <a:rPr lang="en-US" sz="2400" dirty="0"/>
-              <a:t> advanced):</a:t>
-            </a:r>
-          </a:p>
-          <a:p>
-            <a:r>
-              <a:rPr lang="en-US" sz="2400" dirty="0"/>
-              <a:t>https://bost.ocks.org/mike/d3-plugin/</a:t>
-            </a:r>
+              <a:rPr lang="en-US" sz="4000" dirty="0" smtClean="0"/>
+              <a:t>bit.ly/1RfYZxm</a:t>
+            </a:r>
+          </a:p>
+          <a:p>
+            <a:r>
+              <a:rPr lang="en-US" dirty="0" smtClean="0"/>
+              <a:t>Worth mentioning: There are additional </a:t>
+            </a:r>
+            <a:r>
+              <a:rPr lang="en-US" dirty="0" err="1" smtClean="0"/>
+              <a:t>slidedecks</a:t>
+            </a:r>
+            <a:r>
+              <a:rPr lang="en-US" dirty="0" smtClean="0"/>
+              <a:t> by the above authors on Maps, Pie Charts, and even Data Tables</a:t>
+            </a:r>
+            <a:endParaRPr lang="en-US" dirty="0"/>
           </a:p>
         </p:txBody>
       </p:sp>
     </p:spTree>
     <p:extLst>
       <p:ext uri="{BB962C8B-B14F-4D97-AF65-F5344CB8AC3E}">
-        <p14:creationId xmlns:p14="http://schemas.microsoft.com/office/powerpoint/2010/main" val="3499195240"/>
+        <p14:creationId xmlns:p14="http://schemas.microsoft.com/office/powerpoint/2010/main" val="4186733631"/>
       </p:ext>
     </p:extLst>
   </p:cSld>
@@ -6607,14 +6394,19 @@
             <p:ph type="ctrTitle"/>
           </p:nvPr>
         </p:nvSpPr>
-        <p:spPr/>
-        <p:txBody>
-          <a:bodyPr/>
-          <a:lstStyle/>
-          <a:p>
-            <a:r>
-              <a:rPr lang="en-US" dirty="0" smtClean="0"/>
-              <a:t>SVG Documentation</a:t>
+        <p:spPr>
+          <a:xfrm>
+            <a:off x="987829" y="108066"/>
+            <a:ext cx="10216342" cy="1273838"/>
+          </a:xfrm>
+        </p:spPr>
+        <p:txBody>
+          <a:bodyPr/>
+          <a:lstStyle/>
+          <a:p>
+            <a:r>
+              <a:rPr lang="en-US" dirty="0" smtClean="0"/>
+              <a:t>Advanced d3 Abilities</a:t>
             </a:r>
             <a:endParaRPr lang="en-US" dirty="0"/>
           </a:p>
@@ -6630,33 +6422,223 @@
             <p:ph type="subTitle" idx="1"/>
           </p:nvPr>
         </p:nvSpPr>
-        <p:spPr/>
-        <p:txBody>
-          <a:bodyPr/>
-          <a:lstStyle/>
-          <a:p>
-            <a:r>
-              <a:rPr lang="en-US" sz="4000" dirty="0"/>
+        <p:spPr>
+          <a:xfrm>
+            <a:off x="201337" y="1975104"/>
+            <a:ext cx="6317673" cy="4160559"/>
+          </a:xfrm>
+        </p:spPr>
+        <p:txBody>
+          <a:bodyPr>
+            <a:normAutofit/>
+          </a:bodyPr>
+          <a:lstStyle/>
+          <a:p>
+            <a:pPr algn="l"/>
+            <a:r>
+              <a:rPr lang="en-US" b="1" dirty="0"/>
+              <a:t>Curve Interpolations: </a:t>
+            </a:r>
+            <a:r>
+              <a:rPr lang="en-US" dirty="0"/>
+              <a:t>http://</a:t>
+            </a:r>
+            <a:r>
+              <a:rPr lang="en-US" dirty="0" smtClean="0"/>
+              <a:t>bit.ly/2xR9VxX</a:t>
+            </a:r>
+            <a:endParaRPr lang="en-US" dirty="0"/>
+          </a:p>
+          <a:p>
+            <a:pPr algn="l"/>
+            <a:r>
+              <a:rPr lang="en-US" b="1" dirty="0" err="1" smtClean="0"/>
+              <a:t>Voronoi</a:t>
+            </a:r>
+            <a:r>
+              <a:rPr lang="en-US" b="1" dirty="0" smtClean="0"/>
+              <a:t>: </a:t>
+            </a:r>
+            <a:r>
+              <a:rPr lang="en-US" dirty="0"/>
+              <a:t>http://</a:t>
+            </a:r>
+            <a:r>
+              <a:rPr lang="en-US" dirty="0" smtClean="0"/>
+              <a:t>bit.ly/2gK35mi </a:t>
+            </a:r>
+          </a:p>
+          <a:p>
+            <a:pPr algn="l"/>
+            <a:r>
+              <a:rPr lang="en-US" dirty="0"/>
+              <a:t>	https://</a:t>
+            </a:r>
+            <a:r>
+              <a:rPr lang="en-US" dirty="0" smtClean="0"/>
+              <a:t>bl.ocks.org/mbostock/4060366</a:t>
+            </a:r>
+          </a:p>
+          <a:p>
+            <a:pPr algn="l"/>
+            <a:r>
+              <a:rPr lang="en-US" b="1" dirty="0" smtClean="0"/>
+              <a:t>Zooming: </a:t>
+            </a:r>
+            <a:r>
+              <a:rPr lang="en-US" dirty="0"/>
+              <a:t>http://</a:t>
+            </a:r>
+            <a:r>
+              <a:rPr lang="en-US" dirty="0" smtClean="0"/>
+              <a:t>bit.ly/2f6WYsg</a:t>
+            </a:r>
+          </a:p>
+          <a:p>
+            <a:pPr algn="l"/>
+            <a:r>
+              <a:rPr lang="en-US" b="1" dirty="0" smtClean="0"/>
+              <a:t>Brushing/Zooming: </a:t>
+            </a:r>
+            <a:r>
+              <a:rPr lang="en-US" dirty="0"/>
+              <a:t>http://bit.ly/2lTjfef</a:t>
+            </a:r>
+            <a:endParaRPr lang="en-US" dirty="0" smtClean="0"/>
+          </a:p>
+          <a:p>
+            <a:pPr algn="l"/>
+            <a:r>
+              <a:rPr lang="en-US" b="1" dirty="0" smtClean="0"/>
+              <a:t>Stacking:</a:t>
+            </a:r>
+            <a:r>
+              <a:rPr lang="en-US" dirty="0"/>
+              <a:t> http://</a:t>
+            </a:r>
+            <a:r>
+              <a:rPr lang="en-US" dirty="0" smtClean="0"/>
+              <a:t>bl.ocks.org/mbostock/582915</a:t>
+            </a:r>
+          </a:p>
+          <a:p>
+            <a:pPr algn="l"/>
+            <a:r>
+              <a:rPr lang="en-US" b="1" dirty="0" smtClean="0"/>
+              <a:t>Collision Constraint: </a:t>
+            </a:r>
+            <a:r>
+              <a:rPr lang="en-US" dirty="0"/>
+              <a:t>http://</a:t>
+            </a:r>
+            <a:r>
+              <a:rPr lang="en-US" dirty="0" smtClean="0"/>
+              <a:t>bit.ly/2vOPk05</a:t>
+            </a:r>
+          </a:p>
+          <a:p>
+            <a:pPr algn="l"/>
+            <a:r>
+              <a:rPr lang="en-US" b="1" dirty="0" smtClean="0"/>
+              <a:t>Dragging: </a:t>
+            </a:r>
+            <a:r>
+              <a:rPr lang="en-US" dirty="0"/>
+              <a:t>http://</a:t>
+            </a:r>
+            <a:r>
+              <a:rPr lang="en-US" dirty="0" smtClean="0"/>
+              <a:t>bit.ly/2j6x5gH</a:t>
+            </a:r>
+          </a:p>
+          <a:p>
+            <a:pPr algn="l"/>
+            <a:r>
+              <a:rPr lang="en-US" b="1" dirty="0" smtClean="0"/>
+              <a:t>“Each”: </a:t>
+            </a:r>
+            <a:r>
+              <a:rPr lang="en-US" dirty="0"/>
               <a:t>https://</a:t>
             </a:r>
             <a:r>
-              <a:rPr lang="en-US" sz="4000" dirty="0" smtClean="0"/>
-              <a:t>mzl.la/1nP24aN</a:t>
-            </a:r>
-          </a:p>
-          <a:p>
-            <a:r>
-              <a:rPr lang="en-US" dirty="0" smtClean="0"/>
-              <a:t>Check it: this is good to be familiar with, as is all of MDN</a:t>
-            </a:r>
-            <a:endParaRPr lang="en-US" dirty="0"/>
+              <a:rPr lang="en-US" dirty="0" smtClean="0"/>
+              <a:t>bl.ocks.org/mbostock/9490313</a:t>
+            </a:r>
+          </a:p>
+          <a:p>
+            <a:pPr algn="l"/>
+            <a:endParaRPr lang="en-US" dirty="0"/>
+          </a:p>
+        </p:txBody>
+      </p:sp>
+      <p:sp>
+        <p:nvSpPr>
+          <p:cNvPr id="4" name="Rectangle 3"/>
+          <p:cNvSpPr/>
+          <p:nvPr/>
+        </p:nvSpPr>
+        <p:spPr>
+          <a:xfrm>
+            <a:off x="6519010" y="3085888"/>
+            <a:ext cx="6096000" cy="1938992"/>
+          </a:xfrm>
+          <a:prstGeom prst="rect">
+            <a:avLst/>
+          </a:prstGeom>
+        </p:spPr>
+        <p:txBody>
+          <a:bodyPr>
+            <a:spAutoFit/>
+          </a:bodyPr>
+          <a:lstStyle/>
+          <a:p>
+            <a:r>
+              <a:rPr lang="en-US" sz="2400" b="1" dirty="0"/>
+              <a:t>Dispatching</a:t>
+            </a:r>
+            <a:r>
+              <a:rPr lang="en-US" sz="2400" dirty="0"/>
+              <a:t> (super advanced): https://</a:t>
+            </a:r>
+            <a:r>
+              <a:rPr lang="en-US" sz="2400" dirty="0" smtClean="0"/>
+              <a:t>bl.ocks.org/mbostock/5872848</a:t>
+            </a:r>
+          </a:p>
+          <a:p>
+            <a:endParaRPr lang="en-US" sz="2400" dirty="0"/>
+          </a:p>
+          <a:p>
+            <a:r>
+              <a:rPr lang="en-US" sz="2400" b="1" dirty="0"/>
+              <a:t>Modules/Plugins</a:t>
+            </a:r>
+            <a:r>
+              <a:rPr lang="en-US" sz="2400" dirty="0"/>
+              <a:t> (</a:t>
+            </a:r>
+            <a:r>
+              <a:rPr lang="en-US" sz="2400" i="1" dirty="0"/>
+              <a:t>most</a:t>
+            </a:r>
+            <a:r>
+              <a:rPr lang="en-US" sz="2400" dirty="0"/>
+              <a:t> advanced):</a:t>
+            </a:r>
+          </a:p>
+          <a:p>
+            <a:r>
+              <a:rPr lang="en-US" sz="2400" dirty="0"/>
+              <a:t>https://bost.ocks.org/mike/d3-plugin/</a:t>
+            </a:r>
           </a:p>
         </p:txBody>
       </p:sp>
     </p:spTree>
     <p:extLst>
       <p:ext uri="{BB962C8B-B14F-4D97-AF65-F5344CB8AC3E}">
-        <p14:creationId xmlns:p14="http://schemas.microsoft.com/office/powerpoint/2010/main" val="3991108098"/>
+        <p14:creationId xmlns:p14="http://schemas.microsoft.com/office/powerpoint/2010/main" val="3499195240"/>
       </p:ext>
     </p:extLst>
   </p:cSld>
@@ -6700,7 +6682,7 @@
           <a:p>
             <a:r>
               <a:rPr lang="en-US" dirty="0" smtClean="0"/>
-              <a:t>SVG Level 2</a:t>
+              <a:t>SVG Documentation</a:t>
             </a:r>
             <a:endParaRPr lang="en-US" dirty="0"/>
           </a:p>
@@ -6723,25 +6705,17 @@
           <a:p>
             <a:r>
               <a:rPr lang="en-US" sz="4000" dirty="0"/>
-              <a:t>http://</a:t>
+              <a:t>https://</a:t>
             </a:r>
             <a:r>
               <a:rPr lang="en-US" sz="4000" dirty="0" smtClean="0"/>
-              <a:t>bit.ly/2xdgJsI</a:t>
-            </a:r>
-          </a:p>
-          <a:p>
-            <a:r>
-              <a:rPr lang="en-US" dirty="0" smtClean="0"/>
-              <a:t>Plug: </a:t>
-            </a:r>
-            <a:r>
-              <a:rPr lang="en-US" dirty="0" err="1" smtClean="0"/>
-              <a:t>VisualCinnamon</a:t>
-            </a:r>
-            <a:r>
-              <a:rPr lang="en-US" dirty="0" smtClean="0"/>
-              <a:t> is extraordinary. Their work on SVG in particular is the best I have found to date.</a:t>
+              <a:t>mzl.la/1nP24aN</a:t>
+            </a:r>
+          </a:p>
+          <a:p>
+            <a:r>
+              <a:rPr lang="en-US" dirty="0" smtClean="0"/>
+              <a:t>Check it: this is good to be familiar with, as is all of MDN</a:t>
             </a:r>
             <a:endParaRPr lang="en-US" dirty="0"/>
           </a:p>
@@ -6750,7 +6724,7 @@
     </p:spTree>
     <p:extLst>
       <p:ext uri="{BB962C8B-B14F-4D97-AF65-F5344CB8AC3E}">
-        <p14:creationId xmlns:p14="http://schemas.microsoft.com/office/powerpoint/2010/main" val="3830241924"/>
+        <p14:creationId xmlns:p14="http://schemas.microsoft.com/office/powerpoint/2010/main" val="3991108098"/>
       </p:ext>
     </p:extLst>
   </p:cSld>
@@ -6794,7 +6768,7 @@
           <a:p>
             <a:r>
               <a:rPr lang="en-US" dirty="0" smtClean="0"/>
-              <a:t>Maps in D3</a:t>
+              <a:t>SVG Level 2</a:t>
             </a:r>
             <a:endParaRPr lang="en-US" dirty="0"/>
           </a:p>
@@ -6810,57 +6784,41 @@
             <p:ph type="subTitle" idx="1"/>
           </p:nvPr>
         </p:nvSpPr>
-        <p:spPr>
-          <a:xfrm>
-            <a:off x="1524000" y="3602037"/>
-            <a:ext cx="9144000" cy="2083868"/>
-          </a:xfrm>
-        </p:spPr>
-        <p:txBody>
-          <a:bodyPr>
-            <a:normAutofit lnSpcReduction="10000"/>
-          </a:bodyPr>
+        <p:spPr/>
+        <p:txBody>
+          <a:bodyPr/>
           <a:lstStyle/>
           <a:p>
             <a:r>
               <a:rPr lang="en-US" sz="4000" dirty="0"/>
-              <a:t>http://bit.ly/2f7o4Q5</a:t>
-            </a:r>
-            <a:endParaRPr lang="en-US" sz="6000" dirty="0" smtClean="0"/>
-          </a:p>
-          <a:p>
+              <a:t>http://</a:t>
+            </a:r>
             <a:r>
               <a:rPr lang="en-US" sz="4000" dirty="0" smtClean="0"/>
-              <a:t>http</a:t>
-            </a:r>
-            <a:r>
-              <a:rPr lang="en-US" sz="4000" dirty="0"/>
-              <a:t>://</a:t>
-            </a:r>
-            <a:r>
-              <a:rPr lang="en-US" sz="4000" dirty="0" smtClean="0"/>
-              <a:t>oreil.ly/1UnNtFe</a:t>
-            </a:r>
-          </a:p>
-          <a:p>
-            <a:r>
-              <a:rPr lang="en-US" dirty="0" smtClean="0"/>
-              <a:t>Warning: This is advanced level!</a:t>
-            </a:r>
-          </a:p>
-          <a:p>
-            <a:r>
-              <a:rPr lang="en-US" sz="2000" dirty="0" smtClean="0"/>
-              <a:t>Also: The d3 library contains geo maps of many kinds already.</a:t>
-            </a:r>
-            <a:endParaRPr lang="en-US" sz="2000" dirty="0"/>
+              <a:t>bit.ly/2xdgJsI</a:t>
+            </a:r>
+          </a:p>
+          <a:p>
+            <a:r>
+              <a:rPr lang="en-US" dirty="0" smtClean="0"/>
+              <a:t>Plug: </a:t>
+            </a:r>
+            <a:r>
+              <a:rPr lang="en-US" dirty="0" err="1" smtClean="0"/>
+              <a:t>VisualCinnamon</a:t>
+            </a:r>
+            <a:r>
+              <a:rPr lang="en-US" dirty="0" smtClean="0"/>
+              <a:t> is extraordinary. Their work on SVG in particular is the best I have found to date.</a:t>
+            </a:r>
+            <a:endParaRPr lang="en-US" dirty="0"/>
           </a:p>
         </p:txBody>
       </p:sp>
     </p:spTree>
     <p:extLst>
       <p:ext uri="{BB962C8B-B14F-4D97-AF65-F5344CB8AC3E}">
-        <p14:creationId xmlns:p14="http://schemas.microsoft.com/office/powerpoint/2010/main" val="1384479126"/>
+        <p14:creationId xmlns:p14="http://schemas.microsoft.com/office/powerpoint/2010/main" val="3830241924"/>
       </p:ext>
     </p:extLst>
   </p:cSld>
@@ -6904,7 +6862,7 @@
           <a:p>
             <a:r>
               <a:rPr lang="en-US" dirty="0" smtClean="0"/>
-              <a:t>D3’s Extensive Library:</a:t>
+              <a:t>Maps in D3</a:t>
             </a:r>
             <a:endParaRPr lang="en-US" dirty="0"/>
           </a:p>
@@ -6922,62 +6880,55 @@
         </p:nvSpPr>
         <p:spPr>
           <a:xfrm>
-            <a:off x="713509" y="3509963"/>
-            <a:ext cx="10764982" cy="3056457"/>
+            <a:off x="1524000" y="3602037"/>
+            <a:ext cx="9144000" cy="2083868"/>
           </a:xfrm>
         </p:spPr>
         <p:txBody>
           <a:bodyPr>
-            <a:normAutofit/>
+            <a:normAutofit lnSpcReduction="10000"/>
           </a:bodyPr>
           <a:lstStyle/>
           <a:p>
-            <a:pPr algn="l"/>
             <a:r>
               <a:rPr lang="en-US" sz="4000" dirty="0"/>
-              <a:t>https://github.com/d3/d3/blob/master/API.md</a:t>
-            </a:r>
-          </a:p>
-          <a:p>
-            <a:pPr algn="l"/>
-            <a:endParaRPr lang="en-US" dirty="0" smtClean="0"/>
-          </a:p>
-          <a:p>
-            <a:pPr algn="l"/>
-            <a:r>
-              <a:rPr lang="en-US" dirty="0" smtClean="0"/>
-              <a:t>Statistics</a:t>
-            </a:r>
-            <a:r>
-              <a:rPr lang="en-US" dirty="0"/>
-              <a:t>, histograms (4 kinds), ES6’s Map/Set, Nesting, Data Ingestion (CSV, TSV, </a:t>
-            </a:r>
-            <a:r>
-              <a:rPr lang="en-US" dirty="0" err="1"/>
-              <a:t>etc</a:t>
-            </a:r>
-            <a:r>
-              <a:rPr lang="en-US" dirty="0"/>
-              <a:t>), many </a:t>
-            </a:r>
-            <a:r>
-              <a:rPr lang="en-US" dirty="0" smtClean="0"/>
-              <a:t>animation/easing/time </a:t>
-            </a:r>
-            <a:r>
-              <a:rPr lang="en-US" dirty="0"/>
-              <a:t>options, force/physics, geography and projections, spherical maps/math, and that is just the first 25% of it: </a:t>
-            </a:r>
-          </a:p>
-          <a:p>
-            <a:endParaRPr lang="en-US" dirty="0"/>
+              <a:t>http://bit.ly/2f7o4Q5</a:t>
+            </a:r>
+            <a:endParaRPr lang="en-US" sz="6000" dirty="0" smtClean="0"/>
+          </a:p>
+          <a:p>
+            <a:r>
+              <a:rPr lang="en-US" sz="4000" dirty="0" smtClean="0"/>
+              <a:t>http</a:t>
+            </a:r>
+            <a:r>
+              <a:rPr lang="en-US" sz="4000" dirty="0"/>
+              <a:t>://</a:t>
+            </a:r>
+            <a:r>
+              <a:rPr lang="en-US" sz="4000" dirty="0" smtClean="0"/>
+              <a:t>oreil.ly/1UnNtFe</a:t>
+            </a:r>
+          </a:p>
+          <a:p>
+            <a:r>
+              <a:rPr lang="en-US" dirty="0" smtClean="0"/>
+              <a:t>Warning: This is advanced level!</a:t>
+            </a:r>
+          </a:p>
+          <a:p>
+            <a:r>
+              <a:rPr lang="en-US" sz="2000" dirty="0" smtClean="0"/>
+              <a:t>Also: The d3 library contains geo maps of many kinds already.</a:t>
+            </a:r>
+            <a:endParaRPr lang="en-US" sz="2000" dirty="0"/>
           </a:p>
         </p:txBody>
       </p:sp>
     </p:spTree>
     <p:extLst>
       <p:ext uri="{BB962C8B-B14F-4D97-AF65-F5344CB8AC3E}">
-        <p14:creationId xmlns:p14="http://schemas.microsoft.com/office/powerpoint/2010/main" val="1065099257"/>
+        <p14:creationId xmlns:p14="http://schemas.microsoft.com/office/powerpoint/2010/main" val="1384479126"/>
       </p:ext>
     </p:extLst>
   </p:cSld>
@@ -7021,6 +6972,123 @@
           <a:p>
             <a:r>
               <a:rPr lang="en-US" dirty="0" smtClean="0"/>
+              <a:t>D3’s Extensive Library:</a:t>
+            </a:r>
+            <a:endParaRPr lang="en-US" dirty="0"/>
+          </a:p>
+        </p:txBody>
+      </p:sp>
+      <p:sp>
+        <p:nvSpPr>
+          <p:cNvPr id="3" name="Subtitle 2"/>
+          <p:cNvSpPr>
+            <a:spLocks noGrp="1"/>
+          </p:cNvSpPr>
+          <p:nvPr>
+            <p:ph type="subTitle" idx="1"/>
+          </p:nvPr>
+        </p:nvSpPr>
+        <p:spPr>
+          <a:xfrm>
+            <a:off x="713509" y="3509963"/>
+            <a:ext cx="10764982" cy="3056457"/>
+          </a:xfrm>
+        </p:spPr>
+        <p:txBody>
+          <a:bodyPr>
+            <a:normAutofit/>
+          </a:bodyPr>
+          <a:lstStyle/>
+          <a:p>
+            <a:pPr algn="l"/>
+            <a:r>
+              <a:rPr lang="en-US" sz="4000" dirty="0"/>
+              <a:t>https://github.com/d3/d3/blob/master/API.md</a:t>
+            </a:r>
+          </a:p>
+          <a:p>
+            <a:pPr algn="l"/>
+            <a:endParaRPr lang="en-US" dirty="0" smtClean="0"/>
+          </a:p>
+          <a:p>
+            <a:pPr algn="l"/>
+            <a:r>
+              <a:rPr lang="en-US" dirty="0" smtClean="0"/>
+              <a:t>Statistics</a:t>
+            </a:r>
+            <a:r>
+              <a:rPr lang="en-US" dirty="0"/>
+              <a:t>, histograms (4 kinds), ES6’s Map/Set, Nesting, Data Ingestion (CSV, TSV, </a:t>
+            </a:r>
+            <a:r>
+              <a:rPr lang="en-US" dirty="0" err="1"/>
+              <a:t>etc</a:t>
+            </a:r>
+            <a:r>
+              <a:rPr lang="en-US" dirty="0"/>
+              <a:t>), many </a:t>
+            </a:r>
+            <a:r>
+              <a:rPr lang="en-US" dirty="0" smtClean="0"/>
+              <a:t>animation/easing/time </a:t>
+            </a:r>
+            <a:r>
+              <a:rPr lang="en-US" dirty="0"/>
+              <a:t>options, force/physics, geography and projections, spherical maps/math, and that is just the first 25% of it: </a:t>
+            </a:r>
+          </a:p>
+          <a:p>
+            <a:endParaRPr lang="en-US" dirty="0"/>
+          </a:p>
+        </p:txBody>
+      </p:sp>
+    </p:spTree>
+    <p:extLst>
+      <p:ext uri="{BB962C8B-B14F-4D97-AF65-F5344CB8AC3E}">
+        <p14:creationId xmlns:p14="http://schemas.microsoft.com/office/powerpoint/2010/main" val="1065099257"/>
+      </p:ext>
+    </p:extLst>
+  </p:cSld>
+  <p:clrMapOvr>
+    <a:masterClrMapping/>
+  </p:clrMapOvr>
+</p:sld>
+</file>
+
+<file path=ppt/slides/slide37.xml><?xml version="1.0" encoding="utf-8"?>
+<p:sld xmlns:a="http://schemas.openxmlformats.org/drawingml/2006/main" xmlns:r="http://schemas.openxmlformats.org/officeDocument/2006/relationships" xmlns:p="http://schemas.openxmlformats.org/presentationml/2006/main">
+  <p:cSld>
+    <p:spTree>
+      <p:nvGrpSpPr>
+        <p:cNvPr id="1" name=""/>
+        <p:cNvGrpSpPr/>
+        <p:nvPr/>
+      </p:nvGrpSpPr>
+      <p:grpSpPr>
+        <a:xfrm>
+          <a:off x="0" y="0"/>
+          <a:ext cx="0" cy="0"/>
+          <a:chOff x="0" y="0"/>
+          <a:chExt cx="0" cy="0"/>
+        </a:xfrm>
+      </p:grpSpPr>
+      <p:sp>
+        <p:nvSpPr>
+          <p:cNvPr id="2" name="Title 1"/>
+          <p:cNvSpPr>
+            <a:spLocks noGrp="1"/>
+          </p:cNvSpPr>
+          <p:nvPr>
+            <p:ph type="ctrTitle"/>
+          </p:nvPr>
+        </p:nvSpPr>
+        <p:spPr/>
+        <p:txBody>
+          <a:bodyPr/>
+          <a:lstStyle/>
+          <a:p>
+            <a:r>
+              <a:rPr lang="en-US" dirty="0" smtClean="0"/>
               <a:t>Canvas and D3</a:t>
             </a:r>
             <a:endParaRPr lang="en-US" dirty="0"/>
@@ -7080,7 +7148,7 @@
 </p:sld>
 </file>
 
-<file path=ppt/slides/slide37.xml><?xml version="1.0" encoding="utf-8"?>
+<file path=ppt/slides/slide38.xml><?xml version="1.0" encoding="utf-8"?>
 <p:sld xmlns:a="http://schemas.openxmlformats.org/drawingml/2006/main" xmlns:r="http://schemas.openxmlformats.org/officeDocument/2006/relationships" xmlns:p="http://schemas.openxmlformats.org/presentationml/2006/main">
   <p:cSld>
     <p:spTree>
@@ -7211,6 +7279,94 @@
             <a:spLocks noGrp="1"/>
           </p:cNvSpPr>
           <p:nvPr>
+            <p:ph type="ctrTitle"/>
+          </p:nvPr>
+        </p:nvSpPr>
+        <p:spPr/>
+        <p:txBody>
+          <a:bodyPr/>
+          <a:lstStyle/>
+          <a:p>
+            <a:r>
+              <a:rPr lang="en-US" dirty="0" smtClean="0"/>
+              <a:t>y </a:t>
+            </a:r>
+            <a:r>
+              <a:rPr lang="en-US" dirty="0" err="1" smtClean="0"/>
+              <a:t>tho</a:t>
+            </a:r>
+            <a:r>
+              <a:rPr lang="en-US" dirty="0" smtClean="0"/>
+              <a:t>?</a:t>
+            </a:r>
+            <a:endParaRPr lang="en-US" dirty="0"/>
+          </a:p>
+        </p:txBody>
+      </p:sp>
+      <p:sp>
+        <p:nvSpPr>
+          <p:cNvPr id="4" name="Subtitle 3"/>
+          <p:cNvSpPr>
+            <a:spLocks noGrp="1"/>
+          </p:cNvSpPr>
+          <p:nvPr>
+            <p:ph type="subTitle" idx="1"/>
+          </p:nvPr>
+        </p:nvSpPr>
+        <p:spPr/>
+        <p:txBody>
+          <a:bodyPr/>
+          <a:lstStyle/>
+          <a:p>
+            <a:r>
+              <a:rPr lang="en-US" dirty="0" smtClean="0"/>
+              <a:t>answer</a:t>
+            </a:r>
+            <a:r>
+              <a:rPr lang="en-US" dirty="0" smtClean="0"/>
+              <a:t>: the web + data = magic.</a:t>
+            </a:r>
+            <a:endParaRPr lang="en-US" dirty="0"/>
+          </a:p>
+        </p:txBody>
+      </p:sp>
+    </p:spTree>
+    <p:extLst>
+      <p:ext uri="{BB962C8B-B14F-4D97-AF65-F5344CB8AC3E}">
+        <p14:creationId xmlns:p14="http://schemas.microsoft.com/office/powerpoint/2010/main" val="1573091371"/>
+      </p:ext>
+    </p:extLst>
+  </p:cSld>
+  <p:clrMapOvr>
+    <a:masterClrMapping/>
+  </p:clrMapOvr>
+</p:sld>
+</file>
+
+<file path=ppt/slides/slide5.xml><?xml version="1.0" encoding="utf-8"?>
+<p:sld xmlns:a="http://schemas.openxmlformats.org/drawingml/2006/main" xmlns:r="http://schemas.openxmlformats.org/officeDocument/2006/relationships" xmlns:p="http://schemas.openxmlformats.org/presentationml/2006/main">
+  <p:cSld>
+    <p:spTree>
+      <p:nvGrpSpPr>
+        <p:cNvPr id="1" name=""/>
+        <p:cNvGrpSpPr/>
+        <p:nvPr/>
+      </p:nvGrpSpPr>
+      <p:grpSpPr>
+        <a:xfrm>
+          <a:off x="0" y="0"/>
+          <a:ext cx="0" cy="0"/>
+          <a:chOff x="0" y="0"/>
+          <a:chExt cx="0" cy="0"/>
+        </a:xfrm>
+      </p:grpSpPr>
+      <p:sp>
+        <p:nvSpPr>
+          <p:cNvPr id="2" name="Title 1"/>
+          <p:cNvSpPr>
+            <a:spLocks noGrp="1"/>
+          </p:cNvSpPr>
+          <p:nvPr>
             <p:ph type="title"/>
           </p:nvPr>
         </p:nvSpPr>
@@ -7345,7 +7501,7 @@
 </p:sld>
 </file>
 
-<file path=ppt/slides/slide5.xml><?xml version="1.0" encoding="utf-8"?>
+<file path=ppt/slides/slide6.xml><?xml version="1.0" encoding="utf-8"?>
 <p:sld xmlns:a="http://schemas.openxmlformats.org/drawingml/2006/main" xmlns:r="http://schemas.openxmlformats.org/officeDocument/2006/relationships" xmlns:p="http://schemas.openxmlformats.org/presentationml/2006/main">
   <p:cSld>
     <p:spTree>
@@ -7463,7 +7619,7 @@
 </p:sld>
 </file>
 
-<file path=ppt/slides/slide6.xml><?xml version="1.0" encoding="utf-8"?>
+<file path=ppt/slides/slide7.xml><?xml version="1.0" encoding="utf-8"?>
 <p:sld xmlns:a="http://schemas.openxmlformats.org/drawingml/2006/main" xmlns:r="http://schemas.openxmlformats.org/officeDocument/2006/relationships" xmlns:p="http://schemas.openxmlformats.org/presentationml/2006/main">
   <p:cSld>
     <p:spTree>
@@ -7546,7 +7702,7 @@
 </p:sld>
 </file>
 
-<file path=ppt/slides/slide7.xml><?xml version="1.0" encoding="utf-8"?>
+<file path=ppt/slides/slide8.xml><?xml version="1.0" encoding="utf-8"?>
 <p:sld xmlns:a="http://schemas.openxmlformats.org/drawingml/2006/main" xmlns:r="http://schemas.openxmlformats.org/officeDocument/2006/relationships" xmlns:p="http://schemas.openxmlformats.org/presentationml/2006/main">
   <p:cSld>
     <p:spTree>
@@ -7723,7 +7879,7 @@
 </p:sld>
 </file>
 
-<file path=ppt/slides/slide8.xml><?xml version="1.0" encoding="utf-8"?>
+<file path=ppt/slides/slide9.xml><?xml version="1.0" encoding="utf-8"?>
 <p:sld xmlns:a="http://schemas.openxmlformats.org/drawingml/2006/main" xmlns:r="http://schemas.openxmlformats.org/officeDocument/2006/relationships" xmlns:p="http://schemas.openxmlformats.org/presentationml/2006/main">
   <p:cSld>
     <p:spTree>
@@ -7824,181 +7980,6 @@
     <p:extLst>
       <p:ext uri="{BB962C8B-B14F-4D97-AF65-F5344CB8AC3E}">
         <p14:creationId xmlns:p14="http://schemas.microsoft.com/office/powerpoint/2010/main" val="2798845760"/>
-      </p:ext>
-    </p:extLst>
-  </p:cSld>
-  <p:clrMapOvr>
-    <a:masterClrMapping/>
-  </p:clrMapOvr>
-  <p:timing>
-    <p:tnLst>
-      <p:par>
-        <p:cTn id="1" dur="indefinite" restart="never" nodeType="tmRoot">
-          <p:childTnLst>
-            <p:seq concurrent="1" nextAc="seek">
-              <p:cTn id="2" dur="indefinite" nodeType="mainSeq">
-                <p:childTnLst>
-                  <p:par>
-                    <p:cTn id="3" fill="hold">
-                      <p:stCondLst>
-                        <p:cond delay="indefinite"/>
-                      </p:stCondLst>
-                      <p:childTnLst>
-                        <p:par>
-                          <p:cTn id="4" fill="hold">
-                            <p:stCondLst>
-                              <p:cond delay="0"/>
-                            </p:stCondLst>
-                            <p:childTnLst>
-                              <p:par>
-                                <p:cTn id="5" presetID="1" presetClass="entr" presetSubtype="0" fill="hold" grpId="0" nodeType="clickEffect">
-                                  <p:stCondLst>
-                                    <p:cond delay="0"/>
-                                  </p:stCondLst>
-                                  <p:childTnLst>
-                                    <p:set>
-                                      <p:cBhvr>
-                                        <p:cTn id="6" dur="1" fill="hold">
-                                          <p:stCondLst>
-                                            <p:cond delay="0"/>
-                                          </p:stCondLst>
-                                        </p:cTn>
-                                        <p:tgtEl>
-                                          <p:spTgt spid="2"/>
-                                        </p:tgtEl>
-                                        <p:attrNameLst>
-                                          <p:attrName>style.visibility</p:attrName>
-                                        </p:attrNameLst>
-                                      </p:cBhvr>
-                                      <p:to>
-                                        <p:strVal val="visible"/>
-                                      </p:to>
-                                    </p:set>
-                                  </p:childTnLst>
-                                </p:cTn>
-                              </p:par>
-                            </p:childTnLst>
-                          </p:cTn>
-                        </p:par>
-                      </p:childTnLst>
-                    </p:cTn>
-                  </p:par>
-                </p:childTnLst>
-              </p:cTn>
-              <p:prevCondLst>
-                <p:cond evt="onPrev" delay="0">
-                  <p:tgtEl>
-                    <p:sldTgt/>
-                  </p:tgtEl>
-                </p:cond>
-              </p:prevCondLst>
-              <p:nextCondLst>
-                <p:cond evt="onNext" delay="0">
-                  <p:tgtEl>
-                    <p:sldTgt/>
-                  </p:tgtEl>
-                </p:cond>
-              </p:nextCondLst>
-            </p:seq>
-          </p:childTnLst>
-        </p:cTn>
-      </p:par>
-    </p:tnLst>
-    <p:bldLst>
-      <p:bldP spid="2" grpId="0"/>
-    </p:bldLst>
-  </p:timing>
-</p:sld>
-</file>
-
-<file path=ppt/slides/slide9.xml><?xml version="1.0" encoding="utf-8"?>
-<p:sld xmlns:a="http://schemas.openxmlformats.org/drawingml/2006/main" xmlns:r="http://schemas.openxmlformats.org/officeDocument/2006/relationships" xmlns:p="http://schemas.openxmlformats.org/presentationml/2006/main">
-  <p:cSld>
-    <p:spTree>
-      <p:nvGrpSpPr>
-        <p:cNvPr id="1" name=""/>
-        <p:cNvGrpSpPr/>
-        <p:nvPr/>
-      </p:nvGrpSpPr>
-      <p:grpSpPr>
-        <a:xfrm>
-          <a:off x="0" y="0"/>
-          <a:ext cx="0" cy="0"/>
-          <a:chOff x="0" y="0"/>
-          <a:chExt cx="0" cy="0"/>
-        </a:xfrm>
-      </p:grpSpPr>
-      <p:sp>
-        <p:nvSpPr>
-          <p:cNvPr id="2" name="Title 1"/>
-          <p:cNvSpPr>
-            <a:spLocks noGrp="1"/>
-          </p:cNvSpPr>
-          <p:nvPr>
-            <p:ph type="title"/>
-          </p:nvPr>
-        </p:nvSpPr>
-        <p:spPr>
-          <a:xfrm>
-            <a:off x="2739828" y="2657769"/>
-            <a:ext cx="10515600" cy="1325563"/>
-          </a:xfrm>
-        </p:spPr>
-        <p:txBody>
-          <a:bodyPr/>
-          <a:lstStyle/>
-          <a:p>
-            <a:r>
-              <a:rPr lang="en-US" dirty="0" smtClean="0"/>
-              <a:t>Tableau</a:t>
-            </a:r>
-            <a:endParaRPr lang="en-US" dirty="0"/>
-          </a:p>
-        </p:txBody>
-      </p:sp>
-      <p:pic>
-        <p:nvPicPr>
-          <p:cNvPr id="3080" name="Picture 8" descr="https://wittyandpretty.com/wp-content/uploads/2014/09/basic-cake.jpg"/>
-          <p:cNvPicPr>
-            <a:picLocks noChangeAspect="1" noChangeArrowheads="1"/>
-          </p:cNvPicPr>
-          <p:nvPr/>
-        </p:nvPicPr>
-        <p:blipFill rotWithShape="1">
-          <a:blip r:embed="rId2">
-            <a:extLst>
-              <a:ext uri="{28A0092B-C50C-407E-A947-70E740481C1C}">
-                <a14:useLocalDpi xmlns:a14="http://schemas.microsoft.com/office/drawing/2010/main" val="0"/>
-              </a:ext>
-            </a:extLst>
-          </a:blip>
-          <a:srcRect l="7729" r="12698"/>
-          <a:stretch/>
-        </p:blipFill>
-        <p:spPr bwMode="auto">
-          <a:xfrm>
-            <a:off x="5623965" y="365125"/>
-            <a:ext cx="6271327" cy="5910853"/>
-          </a:xfrm>
-          <a:prstGeom prst="rect">
-            <a:avLst/>
-          </a:prstGeom>
-          <a:noFill/>
-          <a:extLst>
-            <a:ext uri="{909E8E84-426E-40DD-AFC4-6F175D3DCCD1}">
-              <a14:hiddenFill xmlns:a14="http://schemas.microsoft.com/office/drawing/2010/main">
-                <a:solidFill>
-                  <a:srgbClr val="FFFFFF"/>
-                </a:solidFill>
-              </a14:hiddenFill>
-            </a:ext>
-          </a:extLst>
-        </p:spPr>
-      </p:pic>
-    </p:spTree>
-    <p:extLst>
-      <p:ext uri="{BB962C8B-B14F-4D97-AF65-F5344CB8AC3E}">
-        <p14:creationId xmlns:p14="http://schemas.microsoft.com/office/powerpoint/2010/main" val="3142918255"/>
       </p:ext>
     </p:extLst>
   </p:cSld>

</xml_diff>

<commit_message>
added key time targets at 2 intervals
</commit_message>
<xml_diff>
--- a/Introduction to D3.pptx
+++ b/Introduction to D3.pptx
@@ -1077,7 +1077,19 @@
           <a:p>
             <a:r>
               <a:rPr lang="en-US" dirty="0" smtClean="0"/>
-              <a:t>1 “Learn by doing”</a:t>
+              <a:t>1 “Learn by doing</a:t>
+            </a:r>
+            <a:r>
+              <a:rPr lang="en-US" dirty="0" smtClean="0"/>
+              <a:t>” IDEAL: 15:00</a:t>
+            </a:r>
+            <a:r>
+              <a:rPr lang="en-US" smtClean="0"/>
+              <a:t>, latest </a:t>
+            </a:r>
+            <a:r>
+              <a:rPr lang="en-US" dirty="0" smtClean="0"/>
+              <a:t>TARGET = 22:00</a:t>
             </a:r>
             <a:endParaRPr lang="en-US" dirty="0"/>
           </a:p>
@@ -1781,7 +1793,11 @@
           <a:p>
             <a:r>
               <a:rPr lang="en-US" dirty="0" smtClean="0"/>
-              <a:t>1</a:t>
+              <a:t>1 – TARGET = 54:00</a:t>
+            </a:r>
+            <a:r>
+              <a:rPr lang="en-US" baseline="0" dirty="0" smtClean="0"/>
+              <a:t>, else -1 min each slide</a:t>
             </a:r>
             <a:endParaRPr lang="en-US" dirty="0"/>
           </a:p>
@@ -2661,11 +2677,7 @@
           <a:p>
             <a:r>
               <a:rPr lang="en-US" dirty="0" smtClean="0"/>
-              <a:t>1 “</a:t>
-            </a:r>
-            <a:r>
-              <a:rPr lang="en-US" dirty="0" smtClean="0"/>
-              <a:t>Is store-bought even good though?”</a:t>
+              <a:t>1 “Is store-bought even good though?”</a:t>
             </a:r>
             <a:endParaRPr lang="en-US" dirty="0"/>
           </a:p>
@@ -6495,21 +6507,13 @@
           <a:p>
             <a:r>
               <a:rPr lang="en-US" dirty="0" smtClean="0"/>
-              <a:t>Eggs + water + </a:t>
-            </a:r>
-            <a:r>
-              <a:rPr lang="en-US" dirty="0" smtClean="0"/>
-              <a:t>their pre-mixed flour, </a:t>
-            </a:r>
-          </a:p>
-          <a:p>
-            <a:r>
-              <a:rPr lang="en-US" dirty="0" smtClean="0"/>
-              <a:t>Bake</a:t>
-            </a:r>
-            <a:r>
-              <a:rPr lang="en-US" dirty="0" smtClean="0"/>
-              <a:t>, </a:t>
+              <a:t>Eggs + water + their pre-mixed flour, </a:t>
+            </a:r>
+          </a:p>
+          <a:p>
+            <a:r>
+              <a:rPr lang="en-US" dirty="0" smtClean="0"/>
+              <a:t>Bake, </a:t>
             </a:r>
           </a:p>
           <a:p>
@@ -6524,11 +6528,7 @@
           <a:p>
             <a:r>
               <a:rPr lang="en-US" dirty="0" smtClean="0"/>
-              <a:t>In </a:t>
-            </a:r>
-            <a:r>
-              <a:rPr lang="en-US" dirty="0" smtClean="0"/>
-              <a:t>the end? Boring!</a:t>
+              <a:t>In the end? Boring!</a:t>
             </a:r>
           </a:p>
           <a:p>
@@ -6595,7 +6595,6 @@
               <a:rPr lang="en-US" dirty="0"/>
               <a:t>Cake “from scratch” is hard:</a:t>
             </a:r>
-            <a:endParaRPr lang="en-US" dirty="0"/>
           </a:p>
         </p:txBody>
       </p:sp>
@@ -6742,11 +6741,7 @@
           <a:p>
             <a:r>
               <a:rPr lang="en-US" dirty="0" smtClean="0"/>
-              <a:t>How do we talk about and use </a:t>
-            </a:r>
-            <a:r>
-              <a:rPr lang="en-US" dirty="0" smtClean="0"/>
-              <a:t>the core ingredients in any visualization?</a:t>
+              <a:t>How do we talk about and use the core ingredients in any visualization?</a:t>
             </a:r>
             <a:endParaRPr lang="en-US" dirty="0"/>
           </a:p>
@@ -6957,15 +6952,7 @@
           <a:p>
             <a:r>
               <a:rPr lang="en-US" dirty="0" smtClean="0"/>
-              <a:t>Ex #3: Build </a:t>
-            </a:r>
-            <a:r>
-              <a:rPr lang="en-US" dirty="0" smtClean="0"/>
-              <a:t>your </a:t>
-            </a:r>
-            <a:r>
-              <a:rPr lang="en-US" dirty="0" smtClean="0"/>
-              <a:t>environment</a:t>
+              <a:t>Ex #3: Build your environment</a:t>
             </a:r>
             <a:endParaRPr lang="en-US" dirty="0"/>
           </a:p>
@@ -7092,15 +7079,7 @@
           <a:p>
             <a:r>
               <a:rPr lang="en-US" dirty="0" smtClean="0"/>
-              <a:t>Ex #4: Look </a:t>
-            </a:r>
-            <a:r>
-              <a:rPr lang="en-US" dirty="0" smtClean="0"/>
-              <a:t>at our data, </a:t>
-            </a:r>
-            <a:r>
-              <a:rPr lang="en-US" dirty="0" smtClean="0"/>
-              <a:t>literally</a:t>
+              <a:t>Ex #4: Look at our data, literally</a:t>
             </a:r>
             <a:endParaRPr lang="en-US" dirty="0"/>
           </a:p>
@@ -7239,15 +7218,7 @@
           <a:p>
             <a:r>
               <a:rPr lang="en-US" dirty="0" smtClean="0"/>
-              <a:t>Ex #5: Look </a:t>
-            </a:r>
-            <a:r>
-              <a:rPr lang="en-US" dirty="0" smtClean="0"/>
-              <a:t>at the data, </a:t>
-            </a:r>
-            <a:r>
-              <a:rPr lang="en-US" dirty="0" smtClean="0"/>
-              <a:t>in-browser</a:t>
+              <a:t>Ex #5: Look at the data, in-browser</a:t>
             </a:r>
             <a:endParaRPr lang="en-US" dirty="0"/>
           </a:p>
@@ -7303,7 +7274,6 @@
               <a:rPr lang="en-US" dirty="0" smtClean="0"/>
               <a:t>data in the browser console</a:t>
             </a:r>
-            <a:endParaRPr lang="en-US" dirty="0" smtClean="0"/>
           </a:p>
           <a:p>
             <a:endParaRPr lang="en-US" dirty="0" smtClean="0"/>
@@ -7553,15 +7523,7 @@
           <a:p>
             <a:r>
               <a:rPr lang="en-US" dirty="0" smtClean="0"/>
-              <a:t>(Review) </a:t>
-            </a:r>
-            <a:r>
-              <a:rPr lang="en-US" dirty="0" smtClean="0"/>
-              <a:t>HTML </a:t>
-            </a:r>
-            <a:r>
-              <a:rPr lang="en-US" dirty="0" smtClean="0"/>
-              <a:t>layout should look like:</a:t>
+              <a:t>(Review) HTML layout should look like:</a:t>
             </a:r>
             <a:endParaRPr lang="en-US" dirty="0"/>
           </a:p>
@@ -10549,11 +10511,7 @@
           <a:p>
             <a:r>
               <a:rPr lang="en-US" dirty="0" smtClean="0"/>
-              <a:t>How do most people do it</a:t>
-            </a:r>
-            <a:r>
-              <a:rPr lang="en-US" dirty="0" smtClean="0"/>
-              <a:t>?</a:t>
+              <a:t>How do most people do it?</a:t>
             </a:r>
             <a:endParaRPr lang="en-US" dirty="0"/>
           </a:p>

</xml_diff>

<commit_message>
added svg file and info on svg section
</commit_message>
<xml_diff>
--- a/Introduction to D3.pptx
+++ b/Introduction to D3.pptx
@@ -234,7 +234,7 @@
           <a:p>
             <a:fld id="{5C7B60CB-4555-4E4C-8A61-26D94E33D181}" type="datetimeFigureOut">
               <a:rPr lang="en-US" smtClean="0"/>
-              <a:t>2/22/2018</a:t>
+              <a:t>2/27/2018</a:t>
             </a:fld>
             <a:endParaRPr lang="en-US"/>
           </a:p>
@@ -2941,7 +2941,7 @@
           <a:p>
             <a:fld id="{C336076D-836C-44D8-B1E0-272F963C7580}" type="datetimeFigureOut">
               <a:rPr lang="en-US" smtClean="0"/>
-              <a:t>2/22/2018</a:t>
+              <a:t>2/27/2018</a:t>
             </a:fld>
             <a:endParaRPr lang="en-US"/>
           </a:p>
@@ -3119,7 +3119,7 @@
           <a:p>
             <a:fld id="{C336076D-836C-44D8-B1E0-272F963C7580}" type="datetimeFigureOut">
               <a:rPr lang="en-US" smtClean="0"/>
-              <a:t>2/22/2018</a:t>
+              <a:t>2/27/2018</a:t>
             </a:fld>
             <a:endParaRPr lang="en-US"/>
           </a:p>
@@ -3307,7 +3307,7 @@
           <a:p>
             <a:fld id="{C336076D-836C-44D8-B1E0-272F963C7580}" type="datetimeFigureOut">
               <a:rPr lang="en-US" smtClean="0"/>
-              <a:t>2/22/2018</a:t>
+              <a:t>2/27/2018</a:t>
             </a:fld>
             <a:endParaRPr lang="en-US"/>
           </a:p>
@@ -3485,7 +3485,7 @@
           <a:p>
             <a:fld id="{C336076D-836C-44D8-B1E0-272F963C7580}" type="datetimeFigureOut">
               <a:rPr lang="en-US" smtClean="0"/>
-              <a:t>2/22/2018</a:t>
+              <a:t>2/27/2018</a:t>
             </a:fld>
             <a:endParaRPr lang="en-US"/>
           </a:p>
@@ -3739,7 +3739,7 @@
           <a:p>
             <a:fld id="{C336076D-836C-44D8-B1E0-272F963C7580}" type="datetimeFigureOut">
               <a:rPr lang="en-US" smtClean="0"/>
-              <a:t>2/22/2018</a:t>
+              <a:t>2/27/2018</a:t>
             </a:fld>
             <a:endParaRPr lang="en-US"/>
           </a:p>
@@ -3979,7 +3979,7 @@
           <a:p>
             <a:fld id="{C336076D-836C-44D8-B1E0-272F963C7580}" type="datetimeFigureOut">
               <a:rPr lang="en-US" smtClean="0"/>
-              <a:t>2/22/2018</a:t>
+              <a:t>2/27/2018</a:t>
             </a:fld>
             <a:endParaRPr lang="en-US"/>
           </a:p>
@@ -4354,7 +4354,7 @@
           <a:p>
             <a:fld id="{C336076D-836C-44D8-B1E0-272F963C7580}" type="datetimeFigureOut">
               <a:rPr lang="en-US" smtClean="0"/>
-              <a:t>2/22/2018</a:t>
+              <a:t>2/27/2018</a:t>
             </a:fld>
             <a:endParaRPr lang="en-US"/>
           </a:p>
@@ -4480,7 +4480,7 @@
           <a:p>
             <a:fld id="{C336076D-836C-44D8-B1E0-272F963C7580}" type="datetimeFigureOut">
               <a:rPr lang="en-US" smtClean="0"/>
-              <a:t>2/22/2018</a:t>
+              <a:t>2/27/2018</a:t>
             </a:fld>
             <a:endParaRPr lang="en-US"/>
           </a:p>
@@ -4583,7 +4583,7 @@
           <a:p>
             <a:fld id="{C336076D-836C-44D8-B1E0-272F963C7580}" type="datetimeFigureOut">
               <a:rPr lang="en-US" smtClean="0"/>
-              <a:t>2/22/2018</a:t>
+              <a:t>2/27/2018</a:t>
             </a:fld>
             <a:endParaRPr lang="en-US"/>
           </a:p>
@@ -4868,7 +4868,7 @@
           <a:p>
             <a:fld id="{C336076D-836C-44D8-B1E0-272F963C7580}" type="datetimeFigureOut">
               <a:rPr lang="en-US" smtClean="0"/>
-              <a:t>2/22/2018</a:t>
+              <a:t>2/27/2018</a:t>
             </a:fld>
             <a:endParaRPr lang="en-US"/>
           </a:p>
@@ -5133,7 +5133,7 @@
           <a:p>
             <a:fld id="{C336076D-836C-44D8-B1E0-272F963C7580}" type="datetimeFigureOut">
               <a:rPr lang="en-US" smtClean="0"/>
-              <a:t>2/22/2018</a:t>
+              <a:t>2/27/2018</a:t>
             </a:fld>
             <a:endParaRPr lang="en-US"/>
           </a:p>
@@ -5349,7 +5349,7 @@
           <a:p>
             <a:fld id="{C336076D-836C-44D8-B1E0-272F963C7580}" type="datetimeFigureOut">
               <a:rPr lang="en-US" smtClean="0"/>
-              <a:t>2/22/2018</a:t>
+              <a:t>2/27/2018</a:t>
             </a:fld>
             <a:endParaRPr lang="en-US"/>
           </a:p>
@@ -6211,7 +6211,11 @@
           <a:p>
             <a:r>
               <a:rPr lang="en-US" dirty="0" smtClean="0"/>
-              <a:t>“Store bought” cake is easy</a:t>
+              <a:t>“Boxed” </a:t>
+            </a:r>
+            <a:r>
+              <a:rPr lang="en-US" dirty="0" smtClean="0"/>
+              <a:t>cake is easy</a:t>
             </a:r>
             <a:endParaRPr lang="en-US" dirty="0"/>
           </a:p>
@@ -8021,11 +8025,15 @@
           <a:p>
             <a:r>
               <a:rPr lang="en-US" dirty="0" smtClean="0"/>
-              <a:t>Pass our data to the domain, using map for letters and max for </a:t>
-            </a:r>
-            <a:r>
-              <a:rPr lang="en-US" dirty="0" err="1" smtClean="0"/>
-              <a:t>requency</a:t>
+              <a:t>Pass our data to the domain, using map for letters and max </a:t>
+            </a:r>
+            <a:r>
+              <a:rPr lang="en-US" smtClean="0"/>
+              <a:t>for </a:t>
+            </a:r>
+            <a:r>
+              <a:rPr lang="en-US" smtClean="0"/>
+              <a:t>frequency</a:t>
             </a:r>
             <a:endParaRPr lang="en-US" dirty="0" smtClean="0"/>
           </a:p>

</xml_diff>

<commit_message>
updated part one and handout file
</commit_message>
<xml_diff>
--- a/Introduction to D3.pptx
+++ b/Introduction to D3.pptx
@@ -5,7 +5,7 @@
     <p:sldMasterId id="2147483660" r:id="rId1"/>
   </p:sldMasterIdLst>
   <p:notesMasterIdLst>
-    <p:notesMasterId r:id="rId64"/>
+    <p:notesMasterId r:id="rId65"/>
   </p:notesMasterIdLst>
   <p:sldIdLst>
     <p:sldId id="311" r:id="rId2"/>
@@ -58,18 +58,19 @@
     <p:sldId id="276" r:id="rId49"/>
     <p:sldId id="277" r:id="rId50"/>
     <p:sldId id="283" r:id="rId51"/>
-    <p:sldId id="291" r:id="rId52"/>
-    <p:sldId id="278" r:id="rId53"/>
-    <p:sldId id="292" r:id="rId54"/>
-    <p:sldId id="270" r:id="rId55"/>
-    <p:sldId id="261" r:id="rId56"/>
-    <p:sldId id="268" r:id="rId57"/>
-    <p:sldId id="266" r:id="rId58"/>
-    <p:sldId id="264" r:id="rId59"/>
-    <p:sldId id="262" r:id="rId60"/>
-    <p:sldId id="269" r:id="rId61"/>
-    <p:sldId id="267" r:id="rId62"/>
-    <p:sldId id="259" r:id="rId63"/>
+    <p:sldId id="328" r:id="rId52"/>
+    <p:sldId id="291" r:id="rId53"/>
+    <p:sldId id="278" r:id="rId54"/>
+    <p:sldId id="292" r:id="rId55"/>
+    <p:sldId id="270" r:id="rId56"/>
+    <p:sldId id="261" r:id="rId57"/>
+    <p:sldId id="268" r:id="rId58"/>
+    <p:sldId id="266" r:id="rId59"/>
+    <p:sldId id="264" r:id="rId60"/>
+    <p:sldId id="262" r:id="rId61"/>
+    <p:sldId id="269" r:id="rId62"/>
+    <p:sldId id="267" r:id="rId63"/>
+    <p:sldId id="259" r:id="rId64"/>
   </p:sldIdLst>
   <p:sldSz cx="12192000" cy="6858000"/>
   <p:notesSz cx="6858000" cy="9144000"/>
@@ -6504,6 +6505,13 @@
   <p:clrMapOvr>
     <a:masterClrMapping/>
   </p:clrMapOvr>
+  <p:timing>
+    <p:tnLst>
+      <p:par>
+        <p:cTn id="1" dur="indefinite" restart="never" nodeType="tmRoot"/>
+      </p:par>
+    </p:tnLst>
+  </p:timing>
 </p:sld>
 </file>
 
@@ -6626,6 +6634,13 @@
   <p:clrMapOvr>
     <a:masterClrMapping/>
   </p:clrMapOvr>
+  <p:timing>
+    <p:tnLst>
+      <p:par>
+        <p:cTn id="1" dur="indefinite" restart="never" nodeType="tmRoot"/>
+      </p:par>
+    </p:tnLst>
+  </p:timing>
 </p:sld>
 </file>
 
@@ -6686,13 +6701,8 @@
           <a:p>
             <a:r>
               <a:rPr lang="en-US" dirty="0" smtClean="0"/>
-              <a:t>Task #1</a:t>
-            </a:r>
-            <a:r>
-              <a:rPr lang="en-US" dirty="0" smtClean="0"/>
-              <a:t>: Get your tools</a:t>
-            </a:r>
-            <a:endParaRPr lang="en-US" dirty="0" smtClean="0"/>
+              <a:t>Task #1: Get your tools</a:t>
+            </a:r>
           </a:p>
           <a:p>
             <a:r>
@@ -6736,11 +6746,7 @@
           <a:p>
             <a:r>
               <a:rPr lang="en-US" dirty="0" smtClean="0"/>
-              <a:t>Task #2</a:t>
-            </a:r>
-            <a:r>
-              <a:rPr lang="en-US" dirty="0" smtClean="0"/>
-              <a:t>: Open your stuff</a:t>
+              <a:t>Task #2: Open your stuff</a:t>
             </a:r>
             <a:endParaRPr lang="en-US" dirty="0"/>
           </a:p>
@@ -6879,6 +6885,13 @@
   <p:clrMapOvr>
     <a:masterClrMapping/>
   </p:clrMapOvr>
+  <p:timing>
+    <p:tnLst>
+      <p:par>
+        <p:cTn id="1" dur="indefinite" restart="never" nodeType="tmRoot"/>
+      </p:par>
+    </p:tnLst>
+  </p:timing>
 </p:sld>
 </file>
 
@@ -6916,11 +6929,7 @@
           <a:p>
             <a:r>
               <a:rPr lang="en-US" dirty="0" smtClean="0"/>
-              <a:t>Task #3</a:t>
-            </a:r>
-            <a:r>
-              <a:rPr lang="en-US" dirty="0" smtClean="0"/>
-              <a:t>: Some </a:t>
+              <a:t>Task #3: Some </a:t>
             </a:r>
             <a:r>
               <a:rPr lang="en-US" i="1" dirty="0" smtClean="0"/>
@@ -6966,6 +6975,13 @@
   <p:clrMapOvr>
     <a:masterClrMapping/>
   </p:clrMapOvr>
+  <p:timing>
+    <p:tnLst>
+      <p:par>
+        <p:cTn id="1" dur="indefinite" restart="never" nodeType="tmRoot"/>
+      </p:par>
+    </p:tnLst>
+  </p:timing>
 </p:sld>
 </file>
 
@@ -7003,11 +7019,7 @@
           <a:p>
             <a:r>
               <a:rPr lang="en-US" dirty="0" smtClean="0"/>
-              <a:t>Task #4</a:t>
-            </a:r>
-            <a:r>
-              <a:rPr lang="en-US" dirty="0" smtClean="0"/>
-              <a:t>: Understanding AJAX failures</a:t>
+              <a:t>Task #4: Understanding AJAX failures</a:t>
             </a:r>
             <a:endParaRPr lang="en-US" dirty="0"/>
           </a:p>
@@ -7055,6 +7067,13 @@
   <p:clrMapOvr>
     <a:masterClrMapping/>
   </p:clrMapOvr>
+  <p:timing>
+    <p:tnLst>
+      <p:par>
+        <p:cTn id="1" dur="indefinite" restart="never" nodeType="tmRoot"/>
+      </p:par>
+    </p:tnLst>
+  </p:timing>
 </p:sld>
 </file>
 
@@ -7092,11 +7111,7 @@
           <a:p>
             <a:r>
               <a:rPr lang="en-US" dirty="0" smtClean="0"/>
-              <a:t>Task #5</a:t>
-            </a:r>
-            <a:r>
-              <a:rPr lang="en-US" dirty="0" smtClean="0"/>
-              <a:t>: Setting up a local server</a:t>
+              <a:t>Task #5: Setting up a local server</a:t>
             </a:r>
             <a:endParaRPr lang="en-US" dirty="0"/>
           </a:p>
@@ -7259,6 +7274,13 @@
   <p:clrMapOvr>
     <a:masterClrMapping/>
   </p:clrMapOvr>
+  <p:timing>
+    <p:tnLst>
+      <p:par>
+        <p:cTn id="1" dur="indefinite" restart="never" nodeType="tmRoot"/>
+      </p:par>
+    </p:tnLst>
+  </p:timing>
 </p:sld>
 </file>
 
@@ -7381,6 +7403,13 @@
   <p:clrMapOvr>
     <a:masterClrMapping/>
   </p:clrMapOvr>
+  <p:timing>
+    <p:tnLst>
+      <p:par>
+        <p:cTn id="1" dur="indefinite" restart="never" nodeType="tmRoot"/>
+      </p:par>
+    </p:tnLst>
+  </p:timing>
 </p:sld>
 </file>
 
@@ -7418,11 +7447,7 @@
           <a:p>
             <a:r>
               <a:rPr lang="en-US" dirty="0" smtClean="0"/>
-              <a:t>Task #</a:t>
-            </a:r>
-            <a:r>
-              <a:rPr lang="en-US" dirty="0" smtClean="0"/>
-              <a:t>6: Loading </a:t>
+              <a:t>Task #6: Loading </a:t>
             </a:r>
             <a:r>
               <a:rPr lang="en-US" dirty="0" err="1" smtClean="0"/>
@@ -7562,6 +7587,13 @@
   <p:clrMapOvr>
     <a:masterClrMapping/>
   </p:clrMapOvr>
+  <p:timing>
+    <p:tnLst>
+      <p:par>
+        <p:cTn id="1" dur="indefinite" restart="never" nodeType="tmRoot"/>
+      </p:par>
+    </p:tnLst>
+  </p:timing>
 </p:sld>
 </file>
 
@@ -7733,6 +7765,13 @@
   <p:clrMapOvr>
     <a:masterClrMapping/>
   </p:clrMapOvr>
+  <p:timing>
+    <p:tnLst>
+      <p:par>
+        <p:cTn id="1" dur="indefinite" restart="never" nodeType="tmRoot"/>
+      </p:par>
+    </p:tnLst>
+  </p:timing>
 </p:sld>
 </file>
 
@@ -7818,6 +7857,13 @@
   <p:clrMapOvr>
     <a:masterClrMapping/>
   </p:clrMapOvr>
+  <p:timing>
+    <p:tnLst>
+      <p:par>
+        <p:cTn id="1" dur="indefinite" restart="never" nodeType="tmRoot"/>
+      </p:par>
+    </p:tnLst>
+  </p:timing>
 </p:sld>
 </file>
 
@@ -7895,6 +7941,13 @@
   <p:clrMapOvr>
     <a:masterClrMapping/>
   </p:clrMapOvr>
+  <p:timing>
+    <p:tnLst>
+      <p:par>
+        <p:cTn id="1" dur="indefinite" restart="never" nodeType="tmRoot"/>
+      </p:par>
+    </p:tnLst>
+  </p:timing>
 </p:sld>
 </file>
 
@@ -7972,6 +8025,13 @@
   <p:clrMapOvr>
     <a:masterClrMapping/>
   </p:clrMapOvr>
+  <p:timing>
+    <p:tnLst>
+      <p:par>
+        <p:cTn id="1" dur="indefinite" restart="never" nodeType="tmRoot"/>
+      </p:par>
+    </p:tnLst>
+  </p:timing>
 </p:sld>
 </file>
 
@@ -8049,6 +8109,13 @@
   <p:clrMapOvr>
     <a:masterClrMapping/>
   </p:clrMapOvr>
+  <p:timing>
+    <p:tnLst>
+      <p:par>
+        <p:cTn id="1" dur="indefinite" restart="never" nodeType="tmRoot"/>
+      </p:par>
+    </p:tnLst>
+  </p:timing>
 </p:sld>
 </file>
 
@@ -8149,6 +8216,13 @@
   <p:clrMapOvr>
     <a:masterClrMapping/>
   </p:clrMapOvr>
+  <p:timing>
+    <p:tnLst>
+      <p:par>
+        <p:cTn id="1" dur="indefinite" restart="never" nodeType="tmRoot"/>
+      </p:par>
+    </p:tnLst>
+  </p:timing>
 </p:sld>
 </file>
 
@@ -8338,6 +8412,13 @@
   <p:clrMapOvr>
     <a:masterClrMapping/>
   </p:clrMapOvr>
+  <p:timing>
+    <p:tnLst>
+      <p:par>
+        <p:cTn id="1" dur="indefinite" restart="never" nodeType="tmRoot"/>
+      </p:par>
+    </p:tnLst>
+  </p:timing>
 </p:sld>
 </file>
 
@@ -10205,6 +10286,13 @@
   <p:clrMapOvr>
     <a:masterClrMapping/>
   </p:clrMapOvr>
+  <p:timing>
+    <p:tnLst>
+      <p:par>
+        <p:cTn id="1" dur="indefinite" restart="never" nodeType="tmRoot"/>
+      </p:par>
+    </p:tnLst>
+  </p:timing>
 </p:sld>
 </file>
 
@@ -10409,6 +10497,13 @@
   <p:clrMapOvr>
     <a:masterClrMapping/>
   </p:clrMapOvr>
+  <p:timing>
+    <p:tnLst>
+      <p:par>
+        <p:cTn id="1" dur="indefinite" restart="never" nodeType="tmRoot"/>
+      </p:par>
+    </p:tnLst>
+  </p:timing>
 </p:sld>
 </file>
 
@@ -10739,13 +10834,13 @@
         </p:spPr>
         <p:txBody>
           <a:bodyPr>
-            <a:normAutofit fontScale="92500" lnSpcReduction="20000"/>
+            <a:normAutofit fontScale="85000" lnSpcReduction="20000"/>
           </a:bodyPr>
           <a:lstStyle/>
           <a:p>
             <a:r>
               <a:rPr lang="en-US" dirty="0" smtClean="0"/>
-              <a:t>Import data.js into your html</a:t>
+              <a:t>Import data.js into your html, copy this to your dev folder</a:t>
             </a:r>
             <a:endParaRPr lang="en-US" dirty="0"/>
           </a:p>
@@ -11841,6 +11936,13 @@
   <p:clrMapOvr>
     <a:masterClrMapping/>
   </p:clrMapOvr>
+  <p:timing>
+    <p:tnLst>
+      <p:par>
+        <p:cTn id="1" dur="indefinite" restart="never" nodeType="tmRoot"/>
+      </p:par>
+    </p:tnLst>
+  </p:timing>
 </p:sld>
 </file>
 
@@ -11986,45 +12088,57 @@
       </p:grpSpPr>
       <p:sp>
         <p:nvSpPr>
-          <p:cNvPr id="4" name="Title 3"/>
-          <p:cNvSpPr>
-            <a:spLocks noGrp="1"/>
-          </p:cNvSpPr>
-          <p:nvPr>
-            <p:ph type="ctrTitle"/>
-          </p:nvPr>
-        </p:nvSpPr>
-        <p:spPr/>
-        <p:txBody>
-          <a:bodyPr/>
-          <a:lstStyle/>
-          <a:p>
-            <a:r>
-              <a:rPr lang="en-US" dirty="0" smtClean="0"/>
-              <a:t>Resources</a:t>
-            </a:r>
-            <a:endParaRPr lang="en-US" dirty="0"/>
-          </a:p>
-        </p:txBody>
-      </p:sp>
-      <p:sp>
-        <p:nvSpPr>
-          <p:cNvPr id="5" name="Subtitle 4"/>
-          <p:cNvSpPr>
-            <a:spLocks noGrp="1"/>
-          </p:cNvSpPr>
-          <p:nvPr>
-            <p:ph type="subTitle" idx="1"/>
-          </p:nvPr>
-        </p:nvSpPr>
-        <p:spPr/>
-        <p:txBody>
-          <a:bodyPr/>
-          <a:lstStyle/>
-          <a:p>
-            <a:r>
-              <a:rPr lang="en-US" dirty="0" smtClean="0"/>
-              <a:t>Things you should explore when looking further</a:t>
+          <p:cNvPr id="2" name="Title 1"/>
+          <p:cNvSpPr>
+            <a:spLocks noGrp="1"/>
+          </p:cNvSpPr>
+          <p:nvPr>
+            <p:ph type="title"/>
+          </p:nvPr>
+        </p:nvSpPr>
+        <p:spPr/>
+        <p:txBody>
+          <a:bodyPr/>
+          <a:lstStyle/>
+          <a:p>
+            <a:r>
+              <a:rPr lang="en-US" dirty="0" smtClean="0"/>
+              <a:t>Done? Great. One last exercise:</a:t>
+            </a:r>
+            <a:endParaRPr lang="en-US" dirty="0"/>
+          </a:p>
+        </p:txBody>
+      </p:sp>
+      <p:sp>
+        <p:nvSpPr>
+          <p:cNvPr id="3" name="Content Placeholder 2"/>
+          <p:cNvSpPr>
+            <a:spLocks noGrp="1"/>
+          </p:cNvSpPr>
+          <p:nvPr>
+            <p:ph idx="1"/>
+          </p:nvPr>
+        </p:nvSpPr>
+        <p:spPr/>
+        <p:txBody>
+          <a:bodyPr/>
+          <a:lstStyle/>
+          <a:p>
+            <a:r>
+              <a:rPr lang="en-US" dirty="0" smtClean="0"/>
+              <a:t>Recreate your code, but make it </a:t>
+            </a:r>
+            <a:r>
+              <a:rPr lang="en-US" dirty="0" smtClean="0"/>
+              <a:t>asynchronous</a:t>
+            </a:r>
+            <a:r>
+              <a:rPr lang="en-US" dirty="0" smtClean="0"/>
+              <a:t> and load once you click the </a:t>
+            </a:r>
+            <a:r>
+              <a:rPr lang="en-US" smtClean="0"/>
+              <a:t>‘body’ element</a:t>
             </a:r>
             <a:endParaRPr lang="en-US" dirty="0"/>
           </a:p>
@@ -12033,7 +12147,7 @@
     </p:spTree>
     <p:extLst>
       <p:ext uri="{BB962C8B-B14F-4D97-AF65-F5344CB8AC3E}">
-        <p14:creationId xmlns:p14="http://schemas.microsoft.com/office/powerpoint/2010/main" val="2724028488"/>
+        <p14:creationId xmlns:p14="http://schemas.microsoft.com/office/powerpoint/2010/main" val="310732629"/>
       </p:ext>
     </p:extLst>
   </p:cSld>
@@ -12062,7 +12176,7 @@
       </p:grpSpPr>
       <p:sp>
         <p:nvSpPr>
-          <p:cNvPr id="2" name="Title 1"/>
+          <p:cNvPr id="4" name="Title 3"/>
           <p:cNvSpPr>
             <a:spLocks noGrp="1"/>
           </p:cNvSpPr>
@@ -12077,15 +12191,15 @@
           <a:p>
             <a:r>
               <a:rPr lang="en-US" dirty="0" smtClean="0"/>
-              <a:t>Read the API docs!</a:t>
-            </a:r>
-            <a:endParaRPr lang="en-US" dirty="0"/>
-          </a:p>
-        </p:txBody>
-      </p:sp>
-      <p:sp>
-        <p:nvSpPr>
-          <p:cNvPr id="3" name="Content Placeholder 2"/>
+              <a:t>Resources</a:t>
+            </a:r>
+            <a:endParaRPr lang="en-US" dirty="0"/>
+          </a:p>
+        </p:txBody>
+      </p:sp>
+      <p:sp>
+        <p:nvSpPr>
+          <p:cNvPr id="5" name="Subtitle 4"/>
           <p:cNvSpPr>
             <a:spLocks noGrp="1"/>
           </p:cNvSpPr>
@@ -12099,38 +12213,17 @@
           <a:lstStyle/>
           <a:p>
             <a:r>
-              <a:rPr lang="en-US" b="1" dirty="0" smtClean="0"/>
-              <a:t>D3: </a:t>
-            </a:r>
-            <a:r>
-              <a:rPr lang="en-US" dirty="0" smtClean="0"/>
-              <a:t>https</a:t>
-            </a:r>
-            <a:r>
-              <a:rPr lang="en-US" dirty="0"/>
-              <a:t>://</a:t>
-            </a:r>
-            <a:r>
-              <a:rPr lang="en-US" dirty="0" smtClean="0"/>
-              <a:t>github.com/d3/d3/wiki</a:t>
-            </a:r>
-          </a:p>
-          <a:p>
-            <a:r>
-              <a:rPr lang="en-US" b="1" dirty="0"/>
-              <a:t>Web: </a:t>
-            </a:r>
-            <a:r>
-              <a:rPr lang="en-US" dirty="0"/>
-              <a:t>https://developer.mozilla.org/en-US/</a:t>
-            </a:r>
+              <a:rPr lang="en-US" dirty="0" smtClean="0"/>
+              <a:t>Things you should explore when looking further</a:t>
+            </a:r>
+            <a:endParaRPr lang="en-US" dirty="0"/>
           </a:p>
         </p:txBody>
       </p:sp>
     </p:spTree>
     <p:extLst>
       <p:ext uri="{BB962C8B-B14F-4D97-AF65-F5344CB8AC3E}">
-        <p14:creationId xmlns:p14="http://schemas.microsoft.com/office/powerpoint/2010/main" val="2779721294"/>
+        <p14:creationId xmlns:p14="http://schemas.microsoft.com/office/powerpoint/2010/main" val="2724028488"/>
       </p:ext>
     </p:extLst>
   </p:cSld>
@@ -12159,7 +12252,7 @@
       </p:grpSpPr>
       <p:sp>
         <p:nvSpPr>
-          <p:cNvPr id="4" name="Title 3"/>
+          <p:cNvPr id="2" name="Title 1"/>
           <p:cNvSpPr>
             <a:spLocks noGrp="1"/>
           </p:cNvSpPr>
@@ -12174,15 +12267,15 @@
           <a:p>
             <a:r>
               <a:rPr lang="en-US" dirty="0" smtClean="0"/>
-              <a:t>Top 3 resources:</a:t>
-            </a:r>
-            <a:endParaRPr lang="en-US" dirty="0"/>
-          </a:p>
-        </p:txBody>
-      </p:sp>
-      <p:sp>
-        <p:nvSpPr>
-          <p:cNvPr id="5" name="Subtitle 4"/>
+              <a:t>Read the API docs!</a:t>
+            </a:r>
+            <a:endParaRPr lang="en-US" dirty="0"/>
+          </a:p>
+        </p:txBody>
+      </p:sp>
+      <p:sp>
+        <p:nvSpPr>
+          <p:cNvPr id="3" name="Content Placeholder 2"/>
           <p:cNvSpPr>
             <a:spLocks noGrp="1"/>
           </p:cNvSpPr>
@@ -12196,47 +12289,38 @@
           <a:lstStyle/>
           <a:p>
             <a:r>
-              <a:rPr lang="en-US" dirty="0" smtClean="0"/>
-              <a:t>The d3 API documentation</a:t>
-            </a:r>
-          </a:p>
-          <a:p>
-            <a:r>
-              <a:rPr lang="en-US" dirty="0" smtClean="0"/>
-              <a:t>MDN web standards documentation</a:t>
-            </a:r>
-          </a:p>
-          <a:p>
+              <a:rPr lang="en-US" b="1" dirty="0" smtClean="0"/>
+              <a:t>D3: </a:t>
+            </a:r>
+            <a:r>
+              <a:rPr lang="en-US" dirty="0" smtClean="0"/>
+              <a:t>https</a:t>
+            </a:r>
             <a:r>
               <a:rPr lang="en-US" dirty="0"/>
-              <a:t>Googling </a:t>
-            </a:r>
-            <a:r>
-              <a:rPr lang="en-US" dirty="0" smtClean="0"/>
-              <a:t>things you want to make </a:t>
+              <a:t>://</a:t>
+            </a:r>
+            <a:r>
+              <a:rPr lang="en-US" dirty="0" smtClean="0"/>
+              <a:t>github.com/d3/d3/wiki</a:t>
+            </a:r>
+          </a:p>
+          <a:p>
+            <a:r>
+              <a:rPr lang="en-US" b="1" dirty="0"/>
+              <a:t>Web: </a:t>
             </a:r>
             <a:r>
               <a:rPr lang="en-US" dirty="0"/>
-              <a:t>(“d3 scatterplot </a:t>
-            </a:r>
-            <a:r>
-              <a:rPr lang="en-US" dirty="0" err="1"/>
-              <a:t>bl.ocks</a:t>
-            </a:r>
-            <a:r>
-              <a:rPr lang="en-US" dirty="0"/>
-              <a:t>”)</a:t>
-            </a:r>
-          </a:p>
-          <a:p>
-            <a:endParaRPr lang="en-US" dirty="0"/>
+              <a:t>https://developer.mozilla.org/en-US/</a:t>
+            </a:r>
           </a:p>
         </p:txBody>
       </p:sp>
     </p:spTree>
     <p:extLst>
       <p:ext uri="{BB962C8B-B14F-4D97-AF65-F5344CB8AC3E}">
-        <p14:creationId xmlns:p14="http://schemas.microsoft.com/office/powerpoint/2010/main" val="3084310567"/>
+        <p14:creationId xmlns:p14="http://schemas.microsoft.com/office/powerpoint/2010/main" val="2779721294"/>
       </p:ext>
     </p:extLst>
   </p:cSld>
@@ -12265,7 +12349,7 @@
       </p:grpSpPr>
       <p:sp>
         <p:nvSpPr>
-          <p:cNvPr id="2" name="Title 1"/>
+          <p:cNvPr id="4" name="Title 3"/>
           <p:cNvSpPr>
             <a:spLocks noGrp="1"/>
           </p:cNvSpPr>
@@ -12273,27 +12357,22 @@
             <p:ph type="ctrTitle"/>
           </p:nvPr>
         </p:nvSpPr>
-        <p:spPr>
-          <a:xfrm>
-            <a:off x="1524000" y="174567"/>
-            <a:ext cx="9144000" cy="982894"/>
-          </a:xfrm>
-        </p:spPr>
-        <p:txBody>
-          <a:bodyPr/>
-          <a:lstStyle/>
-          <a:p>
-            <a:r>
-              <a:rPr lang="en-US" dirty="0" smtClean="0"/>
-              <a:t>Listing the Basics:</a:t>
-            </a:r>
-            <a:endParaRPr lang="en-US" dirty="0"/>
-          </a:p>
-        </p:txBody>
-      </p:sp>
-      <p:sp>
-        <p:nvSpPr>
-          <p:cNvPr id="3" name="Subtitle 2"/>
+        <p:spPr/>
+        <p:txBody>
+          <a:bodyPr/>
+          <a:lstStyle/>
+          <a:p>
+            <a:r>
+              <a:rPr lang="en-US" dirty="0" smtClean="0"/>
+              <a:t>Top 3 resources:</a:t>
+            </a:r>
+            <a:endParaRPr lang="en-US" dirty="0"/>
+          </a:p>
+        </p:txBody>
+      </p:sp>
+      <p:sp>
+        <p:nvSpPr>
+          <p:cNvPr id="5" name="Subtitle 4"/>
           <p:cNvSpPr>
             <a:spLocks noGrp="1"/>
           </p:cNvSpPr>
@@ -12301,140 +12380,45 @@
             <p:ph type="subTitle" idx="1"/>
           </p:nvPr>
         </p:nvSpPr>
-        <p:spPr>
-          <a:xfrm>
-            <a:off x="2219498" y="1263535"/>
-            <a:ext cx="7753004" cy="5412394"/>
-          </a:xfrm>
-        </p:spPr>
-        <p:txBody>
-          <a:bodyPr>
-            <a:normAutofit/>
-          </a:bodyPr>
-          <a:lstStyle/>
-          <a:p>
-            <a:pPr algn="l"/>
-            <a:r>
-              <a:rPr lang="en-US" sz="2800" b="1" dirty="0" smtClean="0"/>
-              <a:t>Know what these are, you will use them often:</a:t>
-            </a:r>
-          </a:p>
-          <a:p>
-            <a:pPr marL="342900" indent="-342900" algn="l">
-              <a:buFont typeface="Arial" panose="020B0604020202020204" pitchFamily="34" charset="0"/>
-              <a:buChar char="•"/>
-            </a:pPr>
-            <a:r>
-              <a:rPr lang="en-US" dirty="0" smtClean="0"/>
-              <a:t>Selections (select, </a:t>
-            </a:r>
-            <a:r>
-              <a:rPr lang="en-US" dirty="0" err="1" smtClean="0"/>
-              <a:t>selectAll</a:t>
-            </a:r>
-            <a:r>
-              <a:rPr lang="en-US" dirty="0" smtClean="0"/>
-              <a:t> and how they work)</a:t>
-            </a:r>
-          </a:p>
-          <a:p>
-            <a:pPr marL="342900" indent="-342900" algn="l">
-              <a:buFont typeface="Arial" panose="020B0604020202020204" pitchFamily="34" charset="0"/>
-              <a:buChar char="•"/>
-            </a:pPr>
-            <a:r>
-              <a:rPr lang="en-US" dirty="0" smtClean="0"/>
-              <a:t>SVG types (circle, </a:t>
-            </a:r>
-            <a:r>
-              <a:rPr lang="en-US" dirty="0" err="1" smtClean="0"/>
-              <a:t>rect</a:t>
-            </a:r>
-            <a:r>
-              <a:rPr lang="en-US" dirty="0" smtClean="0"/>
-              <a:t>, text, path)</a:t>
-            </a:r>
-          </a:p>
-          <a:p>
-            <a:pPr marL="342900" indent="-342900" algn="l">
-              <a:buFont typeface="Arial" panose="020B0604020202020204" pitchFamily="34" charset="0"/>
-              <a:buChar char="•"/>
-            </a:pPr>
-            <a:r>
-              <a:rPr lang="en-US" dirty="0" smtClean="0"/>
-              <a:t>Data Enter/Append</a:t>
-            </a:r>
-          </a:p>
-          <a:p>
-            <a:pPr marL="342900" indent="-342900" algn="l">
-              <a:buFont typeface="Arial" panose="020B0604020202020204" pitchFamily="34" charset="0"/>
-              <a:buChar char="•"/>
-            </a:pPr>
-            <a:r>
-              <a:rPr lang="en-US" dirty="0" smtClean="0"/>
-              <a:t>Data Exit/Remove</a:t>
-            </a:r>
-          </a:p>
-          <a:p>
-            <a:pPr marL="342900" indent="-342900" algn="l">
-              <a:buFont typeface="Arial" panose="020B0604020202020204" pitchFamily="34" charset="0"/>
-              <a:buChar char="•"/>
-            </a:pPr>
-            <a:r>
-              <a:rPr lang="en-US" dirty="0" smtClean="0"/>
-              <a:t>Chaining</a:t>
-            </a:r>
-          </a:p>
-          <a:p>
-            <a:pPr marL="342900" indent="-342900" algn="l">
-              <a:buFont typeface="Arial" panose="020B0604020202020204" pitchFamily="34" charset="0"/>
-              <a:buChar char="•"/>
-            </a:pPr>
-            <a:r>
-              <a:rPr lang="en-US" dirty="0" err="1" smtClean="0"/>
-              <a:t>Attributes+Transitions</a:t>
-            </a:r>
-            <a:endParaRPr lang="en-US" dirty="0" smtClean="0"/>
-          </a:p>
-          <a:p>
-            <a:pPr marL="342900" indent="-342900" algn="l">
-              <a:buFont typeface="Arial" panose="020B0604020202020204" pitchFamily="34" charset="0"/>
-              <a:buChar char="•"/>
-            </a:pPr>
-            <a:r>
-              <a:rPr lang="en-US" dirty="0" smtClean="0"/>
-              <a:t>Arrays: Min/Max/Range, Keys, Merge, Nest</a:t>
-            </a:r>
-          </a:p>
-          <a:p>
-            <a:pPr marL="342900" indent="-342900" algn="l">
-              <a:buFont typeface="Arial" panose="020B0604020202020204" pitchFamily="34" charset="0"/>
-              <a:buChar char="•"/>
-            </a:pPr>
-            <a:r>
-              <a:rPr lang="en-US" dirty="0" smtClean="0"/>
-              <a:t>Scales</a:t>
-            </a:r>
-          </a:p>
-          <a:p>
-            <a:pPr marL="342900" indent="-342900" algn="l">
-              <a:buFont typeface="Arial" panose="020B0604020202020204" pitchFamily="34" charset="0"/>
-              <a:buChar char="•"/>
-            </a:pPr>
-            <a:r>
-              <a:rPr lang="en-US" dirty="0" smtClean="0"/>
-              <a:t>Color</a:t>
-            </a:r>
-          </a:p>
-          <a:p>
-            <a:pPr marL="342900" indent="-342900" algn="l">
-              <a:buFont typeface="Arial" panose="020B0604020202020204" pitchFamily="34" charset="0"/>
-              <a:buChar char="•"/>
-            </a:pPr>
-            <a:r>
-              <a:rPr lang="en-US" dirty="0" smtClean="0"/>
-              <a:t>Axes</a:t>
-            </a:r>
+        <p:spPr/>
+        <p:txBody>
+          <a:bodyPr/>
+          <a:lstStyle/>
+          <a:p>
+            <a:r>
+              <a:rPr lang="en-US" dirty="0" smtClean="0"/>
+              <a:t>The d3 API documentation</a:t>
+            </a:r>
+          </a:p>
+          <a:p>
+            <a:r>
+              <a:rPr lang="en-US" dirty="0" smtClean="0"/>
+              <a:t>MDN web standards documentation</a:t>
+            </a:r>
+          </a:p>
+          <a:p>
+            <a:r>
+              <a:rPr lang="en-US" dirty="0"/>
+              <a:t>Googling </a:t>
+            </a:r>
+            <a:r>
+              <a:rPr lang="en-US" dirty="0" smtClean="0"/>
+              <a:t>things you want to make </a:t>
+            </a:r>
+            <a:r>
+              <a:rPr lang="en-US" dirty="0"/>
+              <a:t>(“d3 scatterplot </a:t>
+            </a:r>
+            <a:r>
+              <a:rPr lang="en-US" dirty="0" err="1"/>
+              <a:t>bl.ocks</a:t>
+            </a:r>
+            <a:r>
+              <a:rPr lang="en-US" dirty="0"/>
+              <a:t>”)</a:t>
+            </a:r>
+          </a:p>
+          <a:p>
             <a:endParaRPr lang="en-US" dirty="0"/>
           </a:p>
         </p:txBody>
@@ -12442,7 +12426,7 @@
     </p:spTree>
     <p:extLst>
       <p:ext uri="{BB962C8B-B14F-4D97-AF65-F5344CB8AC3E}">
-        <p14:creationId xmlns:p14="http://schemas.microsoft.com/office/powerpoint/2010/main" val="1452815126"/>
+        <p14:creationId xmlns:p14="http://schemas.microsoft.com/office/powerpoint/2010/main" val="3084310567"/>
       </p:ext>
     </p:extLst>
   </p:cSld>
@@ -12479,14 +12463,19 @@
             <p:ph type="ctrTitle"/>
           </p:nvPr>
         </p:nvSpPr>
-        <p:spPr/>
-        <p:txBody>
-          <a:bodyPr/>
-          <a:lstStyle/>
-          <a:p>
-            <a:r>
-              <a:rPr lang="en-US" dirty="0" smtClean="0"/>
-              <a:t>Design Basics for Charts</a:t>
+        <p:spPr>
+          <a:xfrm>
+            <a:off x="1524000" y="174567"/>
+            <a:ext cx="9144000" cy="982894"/>
+          </a:xfrm>
+        </p:spPr>
+        <p:txBody>
+          <a:bodyPr/>
+          <a:lstStyle/>
+          <a:p>
+            <a:r>
+              <a:rPr lang="en-US" dirty="0" smtClean="0"/>
+              <a:t>Listing the Basics:</a:t>
             </a:r>
             <a:endParaRPr lang="en-US" dirty="0"/>
           </a:p>
@@ -12502,32 +12491,139 @@
             <p:ph type="subTitle" idx="1"/>
           </p:nvPr>
         </p:nvSpPr>
-        <p:spPr/>
-        <p:txBody>
-          <a:bodyPr/>
-          <a:lstStyle/>
-          <a:p>
-            <a:r>
-              <a:rPr lang="en-US" sz="4000" dirty="0"/>
-              <a:t>http://</a:t>
-            </a:r>
-            <a:r>
-              <a:rPr lang="en-US" sz="4000" dirty="0" smtClean="0"/>
-              <a:t>bit.ly/1RfYZxm</a:t>
-            </a:r>
-          </a:p>
-          <a:p>
-            <a:r>
-              <a:rPr lang="en-US" dirty="0" smtClean="0"/>
-              <a:t>Worth mentioning: There are additional </a:t>
+        <p:spPr>
+          <a:xfrm>
+            <a:off x="2219498" y="1263535"/>
+            <a:ext cx="7753004" cy="5412394"/>
+          </a:xfrm>
+        </p:spPr>
+        <p:txBody>
+          <a:bodyPr>
+            <a:normAutofit/>
+          </a:bodyPr>
+          <a:lstStyle/>
+          <a:p>
+            <a:pPr algn="l"/>
+            <a:r>
+              <a:rPr lang="en-US" sz="2800" b="1" dirty="0" smtClean="0"/>
+              <a:t>Know what these are, you will use them often:</a:t>
+            </a:r>
+          </a:p>
+          <a:p>
+            <a:pPr marL="342900" indent="-342900" algn="l">
+              <a:buFont typeface="Arial" panose="020B0604020202020204" pitchFamily="34" charset="0"/>
+              <a:buChar char="•"/>
+            </a:pPr>
+            <a:r>
+              <a:rPr lang="en-US" dirty="0" smtClean="0"/>
+              <a:t>Selections (select, </a:t>
             </a:r>
             <a:r>
               <a:rPr lang="en-US" dirty="0" err="1" smtClean="0"/>
-              <a:t>slidedecks</a:t>
-            </a:r>
-            <a:r>
-              <a:rPr lang="en-US" dirty="0" smtClean="0"/>
-              <a:t> by the above authors on Maps, Pie Charts, and even Data Tables</a:t>
+              <a:t>selectAll</a:t>
+            </a:r>
+            <a:r>
+              <a:rPr lang="en-US" dirty="0" smtClean="0"/>
+              <a:t> and how they work)</a:t>
+            </a:r>
+          </a:p>
+          <a:p>
+            <a:pPr marL="342900" indent="-342900" algn="l">
+              <a:buFont typeface="Arial" panose="020B0604020202020204" pitchFamily="34" charset="0"/>
+              <a:buChar char="•"/>
+            </a:pPr>
+            <a:r>
+              <a:rPr lang="en-US" dirty="0" smtClean="0"/>
+              <a:t>SVG types (circle, </a:t>
+            </a:r>
+            <a:r>
+              <a:rPr lang="en-US" dirty="0" err="1" smtClean="0"/>
+              <a:t>rect</a:t>
+            </a:r>
+            <a:r>
+              <a:rPr lang="en-US" dirty="0" smtClean="0"/>
+              <a:t>, text, path)</a:t>
+            </a:r>
+          </a:p>
+          <a:p>
+            <a:pPr marL="342900" indent="-342900" algn="l">
+              <a:buFont typeface="Arial" panose="020B0604020202020204" pitchFamily="34" charset="0"/>
+              <a:buChar char="•"/>
+            </a:pPr>
+            <a:r>
+              <a:rPr lang="en-US" dirty="0" smtClean="0"/>
+              <a:t>Data Enter/Append</a:t>
+            </a:r>
+          </a:p>
+          <a:p>
+            <a:pPr marL="342900" indent="-342900" algn="l">
+              <a:buFont typeface="Arial" panose="020B0604020202020204" pitchFamily="34" charset="0"/>
+              <a:buChar char="•"/>
+            </a:pPr>
+            <a:r>
+              <a:rPr lang="en-US" dirty="0" smtClean="0"/>
+              <a:t>Data Exit/Remove</a:t>
+            </a:r>
+          </a:p>
+          <a:p>
+            <a:pPr marL="342900" indent="-342900" algn="l">
+              <a:buFont typeface="Arial" panose="020B0604020202020204" pitchFamily="34" charset="0"/>
+              <a:buChar char="•"/>
+            </a:pPr>
+            <a:r>
+              <a:rPr lang="en-US" dirty="0" smtClean="0"/>
+              <a:t>Chaining</a:t>
+            </a:r>
+          </a:p>
+          <a:p>
+            <a:pPr marL="342900" indent="-342900" algn="l">
+              <a:buFont typeface="Arial" panose="020B0604020202020204" pitchFamily="34" charset="0"/>
+              <a:buChar char="•"/>
+            </a:pPr>
+            <a:r>
+              <a:rPr lang="en-US" dirty="0" err="1" smtClean="0"/>
+              <a:t>Attributes+Transitions</a:t>
+            </a:r>
+            <a:endParaRPr lang="en-US" dirty="0" smtClean="0"/>
+          </a:p>
+          <a:p>
+            <a:pPr marL="342900" indent="-342900" algn="l">
+              <a:buFont typeface="Arial" panose="020B0604020202020204" pitchFamily="34" charset="0"/>
+              <a:buChar char="•"/>
+            </a:pPr>
+            <a:r>
+              <a:rPr lang="en-US" dirty="0" smtClean="0"/>
+              <a:t>Arrays: Min/Max/Range, Keys, Merge, Nest</a:t>
+            </a:r>
+          </a:p>
+          <a:p>
+            <a:pPr marL="342900" indent="-342900" algn="l">
+              <a:buFont typeface="Arial" panose="020B0604020202020204" pitchFamily="34" charset="0"/>
+              <a:buChar char="•"/>
+            </a:pPr>
+            <a:r>
+              <a:rPr lang="en-US" dirty="0" smtClean="0"/>
+              <a:t>Scales</a:t>
+            </a:r>
+          </a:p>
+          <a:p>
+            <a:pPr marL="342900" indent="-342900" algn="l">
+              <a:buFont typeface="Arial" panose="020B0604020202020204" pitchFamily="34" charset="0"/>
+              <a:buChar char="•"/>
+            </a:pPr>
+            <a:r>
+              <a:rPr lang="en-US" dirty="0" smtClean="0"/>
+              <a:t>Color</a:t>
+            </a:r>
+          </a:p>
+          <a:p>
+            <a:pPr marL="342900" indent="-342900" algn="l">
+              <a:buFont typeface="Arial" panose="020B0604020202020204" pitchFamily="34" charset="0"/>
+              <a:buChar char="•"/>
+            </a:pPr>
+            <a:r>
+              <a:rPr lang="en-US" dirty="0" smtClean="0"/>
+              <a:t>Axes</a:t>
             </a:r>
             <a:endParaRPr lang="en-US" dirty="0"/>
           </a:p>
@@ -12536,7 +12632,7 @@
     </p:spTree>
     <p:extLst>
       <p:ext uri="{BB962C8B-B14F-4D97-AF65-F5344CB8AC3E}">
-        <p14:creationId xmlns:p14="http://schemas.microsoft.com/office/powerpoint/2010/main" val="4186733631"/>
+        <p14:creationId xmlns:p14="http://schemas.microsoft.com/office/powerpoint/2010/main" val="1452815126"/>
       </p:ext>
     </p:extLst>
   </p:cSld>
@@ -12573,19 +12669,14 @@
             <p:ph type="ctrTitle"/>
           </p:nvPr>
         </p:nvSpPr>
-        <p:spPr>
-          <a:xfrm>
-            <a:off x="987829" y="108066"/>
-            <a:ext cx="10216342" cy="1273838"/>
-          </a:xfrm>
-        </p:spPr>
-        <p:txBody>
-          <a:bodyPr/>
-          <a:lstStyle/>
-          <a:p>
-            <a:r>
-              <a:rPr lang="en-US" dirty="0" smtClean="0"/>
-              <a:t>Advanced d3 Abilities</a:t>
+        <p:spPr/>
+        <p:txBody>
+          <a:bodyPr/>
+          <a:lstStyle/>
+          <a:p>
+            <a:r>
+              <a:rPr lang="en-US" dirty="0" smtClean="0"/>
+              <a:t>Design Basics for Charts</a:t>
             </a:r>
             <a:endParaRPr lang="en-US" dirty="0"/>
           </a:p>
@@ -12601,223 +12692,41 @@
             <p:ph type="subTitle" idx="1"/>
           </p:nvPr>
         </p:nvSpPr>
-        <p:spPr>
-          <a:xfrm>
-            <a:off x="201337" y="1975104"/>
-            <a:ext cx="6317673" cy="4160559"/>
-          </a:xfrm>
-        </p:spPr>
-        <p:txBody>
-          <a:bodyPr>
-            <a:normAutofit/>
-          </a:bodyPr>
-          <a:lstStyle/>
-          <a:p>
-            <a:pPr algn="l"/>
-            <a:r>
-              <a:rPr lang="en-US" b="1" dirty="0"/>
-              <a:t>Curve Interpolations: </a:t>
-            </a:r>
-            <a:r>
-              <a:rPr lang="en-US" dirty="0"/>
+        <p:spPr/>
+        <p:txBody>
+          <a:bodyPr/>
+          <a:lstStyle/>
+          <a:p>
+            <a:r>
+              <a:rPr lang="en-US" sz="4000" dirty="0"/>
               <a:t>http://</a:t>
             </a:r>
             <a:r>
-              <a:rPr lang="en-US" dirty="0" smtClean="0"/>
-              <a:t>bit.ly/2xR9VxX</a:t>
-            </a:r>
-            <a:endParaRPr lang="en-US" dirty="0"/>
-          </a:p>
-          <a:p>
-            <a:pPr algn="l"/>
-            <a:r>
-              <a:rPr lang="en-US" b="1" dirty="0" err="1" smtClean="0"/>
-              <a:t>Voronoi</a:t>
-            </a:r>
-            <a:r>
-              <a:rPr lang="en-US" b="1" dirty="0" smtClean="0"/>
-              <a:t>: </a:t>
-            </a:r>
-            <a:r>
-              <a:rPr lang="en-US" dirty="0"/>
-              <a:t>http://</a:t>
-            </a:r>
-            <a:r>
-              <a:rPr lang="en-US" dirty="0" smtClean="0"/>
-              <a:t>bit.ly/2gK35mi </a:t>
-            </a:r>
-          </a:p>
-          <a:p>
-            <a:pPr algn="l"/>
-            <a:r>
-              <a:rPr lang="en-US" dirty="0"/>
-              <a:t>	https://</a:t>
-            </a:r>
-            <a:r>
-              <a:rPr lang="en-US" dirty="0" smtClean="0"/>
-              <a:t>bl.ocks.org/mbostock/4060366</a:t>
-            </a:r>
-          </a:p>
-          <a:p>
-            <a:pPr algn="l"/>
-            <a:r>
-              <a:rPr lang="en-US" b="1" dirty="0" smtClean="0"/>
-              <a:t>Zooming: </a:t>
-            </a:r>
-            <a:r>
-              <a:rPr lang="en-US" dirty="0"/>
-              <a:t>http://</a:t>
-            </a:r>
-            <a:r>
-              <a:rPr lang="en-US" dirty="0" smtClean="0"/>
-              <a:t>bit.ly/2f6WYsg</a:t>
-            </a:r>
-          </a:p>
-          <a:p>
-            <a:pPr algn="l"/>
-            <a:r>
-              <a:rPr lang="en-US" b="1" dirty="0" smtClean="0"/>
-              <a:t>Brushing/Zooming: </a:t>
-            </a:r>
-            <a:r>
-              <a:rPr lang="en-US" dirty="0"/>
-              <a:t>http://bit.ly/2lTjfef</a:t>
-            </a:r>
-            <a:endParaRPr lang="en-US" dirty="0" smtClean="0"/>
-          </a:p>
-          <a:p>
-            <a:pPr algn="l"/>
-            <a:r>
-              <a:rPr lang="en-US" b="1" dirty="0" smtClean="0"/>
-              <a:t>Stacking:</a:t>
-            </a:r>
-            <a:r>
-              <a:rPr lang="en-US" dirty="0"/>
-              <a:t> http://</a:t>
-            </a:r>
-            <a:r>
-              <a:rPr lang="en-US" dirty="0" smtClean="0"/>
-              <a:t>bl.ocks.org/mbostock/582915</a:t>
-            </a:r>
-          </a:p>
-          <a:p>
-            <a:pPr algn="l"/>
-            <a:r>
-              <a:rPr lang="en-US" b="1" dirty="0" smtClean="0"/>
-              <a:t>Collision Constraint: </a:t>
-            </a:r>
-            <a:r>
-              <a:rPr lang="en-US" dirty="0"/>
-              <a:t>http://</a:t>
-            </a:r>
-            <a:r>
-              <a:rPr lang="en-US" dirty="0" smtClean="0"/>
-              <a:t>bit.ly/2vOPk05</a:t>
-            </a:r>
-          </a:p>
-          <a:p>
-            <a:pPr algn="l"/>
-            <a:r>
-              <a:rPr lang="en-US" b="1" dirty="0" smtClean="0"/>
-              <a:t>Dragging: </a:t>
-            </a:r>
-            <a:r>
-              <a:rPr lang="en-US" dirty="0"/>
-              <a:t>http://</a:t>
-            </a:r>
-            <a:r>
-              <a:rPr lang="en-US" dirty="0" smtClean="0"/>
-              <a:t>bit.ly/2j6x5gH</a:t>
-            </a:r>
-          </a:p>
-          <a:p>
-            <a:pPr algn="l"/>
-            <a:r>
-              <a:rPr lang="en-US" b="1" dirty="0" smtClean="0"/>
-              <a:t>“Each”: </a:t>
-            </a:r>
-            <a:r>
-              <a:rPr lang="en-US" dirty="0"/>
-              <a:t>https://</a:t>
-            </a:r>
-            <a:r>
-              <a:rPr lang="en-US" dirty="0" smtClean="0"/>
-              <a:t>bl.ocks.org/mbostock/9490313</a:t>
-            </a:r>
-          </a:p>
-          <a:p>
-            <a:pPr algn="l"/>
-            <a:endParaRPr lang="en-US" dirty="0"/>
-          </a:p>
-        </p:txBody>
-      </p:sp>
-      <p:sp>
-        <p:nvSpPr>
-          <p:cNvPr id="4" name="Rectangle 3"/>
-          <p:cNvSpPr/>
-          <p:nvPr/>
-        </p:nvSpPr>
-        <p:spPr>
-          <a:xfrm>
-            <a:off x="6519010" y="3085888"/>
-            <a:ext cx="6096000" cy="1938992"/>
-          </a:xfrm>
-          <a:prstGeom prst="rect">
-            <a:avLst/>
-          </a:prstGeom>
-        </p:spPr>
-        <p:txBody>
-          <a:bodyPr>
-            <a:spAutoFit/>
-          </a:bodyPr>
-          <a:lstStyle/>
-          <a:p>
-            <a:r>
-              <a:rPr lang="en-US" sz="2400" b="1" dirty="0"/>
-              <a:t>Dispatching</a:t>
-            </a:r>
-            <a:r>
-              <a:rPr lang="en-US" sz="2400" dirty="0"/>
-              <a:t> (super advanced): https://</a:t>
-            </a:r>
-            <a:r>
-              <a:rPr lang="en-US" sz="2400" dirty="0" smtClean="0"/>
-              <a:t>bl.ocks.org/mbostock/5872848</a:t>
-            </a:r>
-          </a:p>
-          <a:p>
-            <a:endParaRPr lang="en-US" sz="2400" dirty="0"/>
-          </a:p>
-          <a:p>
-            <a:r>
-              <a:rPr lang="en-US" sz="2400" b="1" dirty="0"/>
-              <a:t>Modules/Plugins</a:t>
-            </a:r>
-            <a:r>
-              <a:rPr lang="en-US" sz="2400" dirty="0"/>
-              <a:t> (</a:t>
-            </a:r>
-            <a:r>
-              <a:rPr lang="en-US" sz="2400" i="1" dirty="0"/>
-              <a:t>most</a:t>
-            </a:r>
-            <a:r>
-              <a:rPr lang="en-US" sz="2400" dirty="0"/>
-              <a:t> advanced):</a:t>
-            </a:r>
-          </a:p>
-          <a:p>
-            <a:r>
-              <a:rPr lang="en-US" sz="2400" dirty="0"/>
-              <a:t>https://bost.ocks.org/mike/d3-plugin/</a:t>
-            </a:r>
+              <a:rPr lang="en-US" sz="4000" dirty="0" smtClean="0"/>
+              <a:t>bit.ly/1RfYZxm</a:t>
+            </a:r>
+          </a:p>
+          <a:p>
+            <a:r>
+              <a:rPr lang="en-US" dirty="0" smtClean="0"/>
+              <a:t>Worth mentioning: There are additional </a:t>
+            </a:r>
+            <a:r>
+              <a:rPr lang="en-US" dirty="0" err="1" smtClean="0"/>
+              <a:t>slidedecks</a:t>
+            </a:r>
+            <a:r>
+              <a:rPr lang="en-US" dirty="0" smtClean="0"/>
+              <a:t> by the above authors on Maps, Pie Charts, and even Data Tables</a:t>
+            </a:r>
+            <a:endParaRPr lang="en-US" dirty="0"/>
           </a:p>
         </p:txBody>
       </p:sp>
     </p:spTree>
     <p:extLst>
       <p:ext uri="{BB962C8B-B14F-4D97-AF65-F5344CB8AC3E}">
-        <p14:creationId xmlns:p14="http://schemas.microsoft.com/office/powerpoint/2010/main" val="3499195240"/>
+        <p14:creationId xmlns:p14="http://schemas.microsoft.com/office/powerpoint/2010/main" val="4186733631"/>
       </p:ext>
     </p:extLst>
   </p:cSld>
@@ -12854,14 +12763,19 @@
             <p:ph type="ctrTitle"/>
           </p:nvPr>
         </p:nvSpPr>
-        <p:spPr/>
-        <p:txBody>
-          <a:bodyPr/>
-          <a:lstStyle/>
-          <a:p>
-            <a:r>
-              <a:rPr lang="en-US" dirty="0" smtClean="0"/>
-              <a:t>SVG Documentation</a:t>
+        <p:spPr>
+          <a:xfrm>
+            <a:off x="987829" y="108066"/>
+            <a:ext cx="10216342" cy="1273838"/>
+          </a:xfrm>
+        </p:spPr>
+        <p:txBody>
+          <a:bodyPr/>
+          <a:lstStyle/>
+          <a:p>
+            <a:r>
+              <a:rPr lang="en-US" dirty="0" smtClean="0"/>
+              <a:t>Advanced d3 Abilities</a:t>
             </a:r>
             <a:endParaRPr lang="en-US" dirty="0"/>
           </a:p>
@@ -12877,33 +12791,223 @@
             <p:ph type="subTitle" idx="1"/>
           </p:nvPr>
         </p:nvSpPr>
-        <p:spPr/>
-        <p:txBody>
-          <a:bodyPr/>
-          <a:lstStyle/>
-          <a:p>
-            <a:r>
-              <a:rPr lang="en-US" sz="4000" dirty="0"/>
+        <p:spPr>
+          <a:xfrm>
+            <a:off x="201337" y="1975104"/>
+            <a:ext cx="6317673" cy="4160559"/>
+          </a:xfrm>
+        </p:spPr>
+        <p:txBody>
+          <a:bodyPr>
+            <a:normAutofit/>
+          </a:bodyPr>
+          <a:lstStyle/>
+          <a:p>
+            <a:pPr algn="l"/>
+            <a:r>
+              <a:rPr lang="en-US" b="1" dirty="0"/>
+              <a:t>Curve Interpolations: </a:t>
+            </a:r>
+            <a:r>
+              <a:rPr lang="en-US" dirty="0"/>
+              <a:t>http://</a:t>
+            </a:r>
+            <a:r>
+              <a:rPr lang="en-US" dirty="0" smtClean="0"/>
+              <a:t>bit.ly/2xR9VxX</a:t>
+            </a:r>
+            <a:endParaRPr lang="en-US" dirty="0"/>
+          </a:p>
+          <a:p>
+            <a:pPr algn="l"/>
+            <a:r>
+              <a:rPr lang="en-US" b="1" dirty="0" err="1" smtClean="0"/>
+              <a:t>Voronoi</a:t>
+            </a:r>
+            <a:r>
+              <a:rPr lang="en-US" b="1" dirty="0" smtClean="0"/>
+              <a:t>: </a:t>
+            </a:r>
+            <a:r>
+              <a:rPr lang="en-US" dirty="0"/>
+              <a:t>http://</a:t>
+            </a:r>
+            <a:r>
+              <a:rPr lang="en-US" dirty="0" smtClean="0"/>
+              <a:t>bit.ly/2gK35mi </a:t>
+            </a:r>
+          </a:p>
+          <a:p>
+            <a:pPr algn="l"/>
+            <a:r>
+              <a:rPr lang="en-US" dirty="0"/>
+              <a:t>	https://</a:t>
+            </a:r>
+            <a:r>
+              <a:rPr lang="en-US" dirty="0" smtClean="0"/>
+              <a:t>bl.ocks.org/mbostock/4060366</a:t>
+            </a:r>
+          </a:p>
+          <a:p>
+            <a:pPr algn="l"/>
+            <a:r>
+              <a:rPr lang="en-US" b="1" dirty="0" smtClean="0"/>
+              <a:t>Zooming: </a:t>
+            </a:r>
+            <a:r>
+              <a:rPr lang="en-US" dirty="0"/>
+              <a:t>http://</a:t>
+            </a:r>
+            <a:r>
+              <a:rPr lang="en-US" dirty="0" smtClean="0"/>
+              <a:t>bit.ly/2f6WYsg</a:t>
+            </a:r>
+          </a:p>
+          <a:p>
+            <a:pPr algn="l"/>
+            <a:r>
+              <a:rPr lang="en-US" b="1" dirty="0" smtClean="0"/>
+              <a:t>Brushing/Zooming: </a:t>
+            </a:r>
+            <a:r>
+              <a:rPr lang="en-US" dirty="0"/>
+              <a:t>http://bit.ly/2lTjfef</a:t>
+            </a:r>
+            <a:endParaRPr lang="en-US" dirty="0" smtClean="0"/>
+          </a:p>
+          <a:p>
+            <a:pPr algn="l"/>
+            <a:r>
+              <a:rPr lang="en-US" b="1" dirty="0" smtClean="0"/>
+              <a:t>Stacking:</a:t>
+            </a:r>
+            <a:r>
+              <a:rPr lang="en-US" dirty="0"/>
+              <a:t> http://</a:t>
+            </a:r>
+            <a:r>
+              <a:rPr lang="en-US" dirty="0" smtClean="0"/>
+              <a:t>bl.ocks.org/mbostock/582915</a:t>
+            </a:r>
+          </a:p>
+          <a:p>
+            <a:pPr algn="l"/>
+            <a:r>
+              <a:rPr lang="en-US" b="1" dirty="0" smtClean="0"/>
+              <a:t>Collision Constraint: </a:t>
+            </a:r>
+            <a:r>
+              <a:rPr lang="en-US" dirty="0"/>
+              <a:t>http://</a:t>
+            </a:r>
+            <a:r>
+              <a:rPr lang="en-US" dirty="0" smtClean="0"/>
+              <a:t>bit.ly/2vOPk05</a:t>
+            </a:r>
+          </a:p>
+          <a:p>
+            <a:pPr algn="l"/>
+            <a:r>
+              <a:rPr lang="en-US" b="1" dirty="0" smtClean="0"/>
+              <a:t>Dragging: </a:t>
+            </a:r>
+            <a:r>
+              <a:rPr lang="en-US" dirty="0"/>
+              <a:t>http://</a:t>
+            </a:r>
+            <a:r>
+              <a:rPr lang="en-US" dirty="0" smtClean="0"/>
+              <a:t>bit.ly/2j6x5gH</a:t>
+            </a:r>
+          </a:p>
+          <a:p>
+            <a:pPr algn="l"/>
+            <a:r>
+              <a:rPr lang="en-US" b="1" dirty="0" smtClean="0"/>
+              <a:t>“Each”: </a:t>
+            </a:r>
+            <a:r>
+              <a:rPr lang="en-US" dirty="0"/>
               <a:t>https://</a:t>
             </a:r>
             <a:r>
-              <a:rPr lang="en-US" sz="4000" dirty="0" smtClean="0"/>
-              <a:t>mzl.la/1nP24aN</a:t>
-            </a:r>
-          </a:p>
-          <a:p>
-            <a:r>
-              <a:rPr lang="en-US" dirty="0" smtClean="0"/>
-              <a:t>Check it: this is good to be familiar with, as is all of MDN</a:t>
-            </a:r>
-            <a:endParaRPr lang="en-US" dirty="0"/>
+              <a:rPr lang="en-US" dirty="0" smtClean="0"/>
+              <a:t>bl.ocks.org/mbostock/9490313</a:t>
+            </a:r>
+          </a:p>
+          <a:p>
+            <a:pPr algn="l"/>
+            <a:endParaRPr lang="en-US" dirty="0"/>
+          </a:p>
+        </p:txBody>
+      </p:sp>
+      <p:sp>
+        <p:nvSpPr>
+          <p:cNvPr id="4" name="Rectangle 3"/>
+          <p:cNvSpPr/>
+          <p:nvPr/>
+        </p:nvSpPr>
+        <p:spPr>
+          <a:xfrm>
+            <a:off x="6519010" y="3085888"/>
+            <a:ext cx="6096000" cy="1938992"/>
+          </a:xfrm>
+          <a:prstGeom prst="rect">
+            <a:avLst/>
+          </a:prstGeom>
+        </p:spPr>
+        <p:txBody>
+          <a:bodyPr>
+            <a:spAutoFit/>
+          </a:bodyPr>
+          <a:lstStyle/>
+          <a:p>
+            <a:r>
+              <a:rPr lang="en-US" sz="2400" b="1" dirty="0"/>
+              <a:t>Dispatching</a:t>
+            </a:r>
+            <a:r>
+              <a:rPr lang="en-US" sz="2400" dirty="0"/>
+              <a:t> (super advanced): https://</a:t>
+            </a:r>
+            <a:r>
+              <a:rPr lang="en-US" sz="2400" dirty="0" smtClean="0"/>
+              <a:t>bl.ocks.org/mbostock/5872848</a:t>
+            </a:r>
+          </a:p>
+          <a:p>
+            <a:endParaRPr lang="en-US" sz="2400" dirty="0"/>
+          </a:p>
+          <a:p>
+            <a:r>
+              <a:rPr lang="en-US" sz="2400" b="1" dirty="0"/>
+              <a:t>Modules/Plugins</a:t>
+            </a:r>
+            <a:r>
+              <a:rPr lang="en-US" sz="2400" dirty="0"/>
+              <a:t> (</a:t>
+            </a:r>
+            <a:r>
+              <a:rPr lang="en-US" sz="2400" i="1" dirty="0"/>
+              <a:t>most</a:t>
+            </a:r>
+            <a:r>
+              <a:rPr lang="en-US" sz="2400" dirty="0"/>
+              <a:t> advanced):</a:t>
+            </a:r>
+          </a:p>
+          <a:p>
+            <a:r>
+              <a:rPr lang="en-US" sz="2400" dirty="0"/>
+              <a:t>https://bost.ocks.org/mike/d3-plugin/</a:t>
+            </a:r>
           </a:p>
         </p:txBody>
       </p:sp>
     </p:spTree>
     <p:extLst>
       <p:ext uri="{BB962C8B-B14F-4D97-AF65-F5344CB8AC3E}">
-        <p14:creationId xmlns:p14="http://schemas.microsoft.com/office/powerpoint/2010/main" val="3991108098"/>
+        <p14:creationId xmlns:p14="http://schemas.microsoft.com/office/powerpoint/2010/main" val="3499195240"/>
       </p:ext>
     </p:extLst>
   </p:cSld>
@@ -12947,7 +13051,7 @@
           <a:p>
             <a:r>
               <a:rPr lang="en-US" dirty="0" smtClean="0"/>
-              <a:t>SVG Level 2</a:t>
+              <a:t>SVG Documentation</a:t>
             </a:r>
             <a:endParaRPr lang="en-US" dirty="0"/>
           </a:p>
@@ -12970,25 +13074,17 @@
           <a:p>
             <a:r>
               <a:rPr lang="en-US" sz="4000" dirty="0"/>
-              <a:t>http://</a:t>
+              <a:t>https://</a:t>
             </a:r>
             <a:r>
               <a:rPr lang="en-US" sz="4000" dirty="0" smtClean="0"/>
-              <a:t>bit.ly/2xdgJsI</a:t>
-            </a:r>
-          </a:p>
-          <a:p>
-            <a:r>
-              <a:rPr lang="en-US" dirty="0" smtClean="0"/>
-              <a:t>Plug: </a:t>
-            </a:r>
-            <a:r>
-              <a:rPr lang="en-US" dirty="0" err="1" smtClean="0"/>
-              <a:t>VisualCinnamon</a:t>
-            </a:r>
-            <a:r>
-              <a:rPr lang="en-US" dirty="0" smtClean="0"/>
-              <a:t> is extraordinary. Their work on SVG in particular is the best I have found to date.</a:t>
+              <a:t>mzl.la/1nP24aN</a:t>
+            </a:r>
+          </a:p>
+          <a:p>
+            <a:r>
+              <a:rPr lang="en-US" dirty="0" smtClean="0"/>
+              <a:t>Check it: this is good to be familiar with, as is all of MDN</a:t>
             </a:r>
             <a:endParaRPr lang="en-US" dirty="0"/>
           </a:p>
@@ -12997,7 +13093,7 @@
     </p:spTree>
     <p:extLst>
       <p:ext uri="{BB962C8B-B14F-4D97-AF65-F5344CB8AC3E}">
-        <p14:creationId xmlns:p14="http://schemas.microsoft.com/office/powerpoint/2010/main" val="3830241924"/>
+        <p14:creationId xmlns:p14="http://schemas.microsoft.com/office/powerpoint/2010/main" val="3991108098"/>
       </p:ext>
     </p:extLst>
   </p:cSld>
@@ -13041,7 +13137,7 @@
           <a:p>
             <a:r>
               <a:rPr lang="en-US" dirty="0" smtClean="0"/>
-              <a:t>Maps in D3</a:t>
+              <a:t>SVG Level 2</a:t>
             </a:r>
             <a:endParaRPr lang="en-US" dirty="0"/>
           </a:p>
@@ -13057,57 +13153,41 @@
             <p:ph type="subTitle" idx="1"/>
           </p:nvPr>
         </p:nvSpPr>
-        <p:spPr>
-          <a:xfrm>
-            <a:off x="1524000" y="3602037"/>
-            <a:ext cx="9144000" cy="2083868"/>
-          </a:xfrm>
-        </p:spPr>
-        <p:txBody>
-          <a:bodyPr>
-            <a:normAutofit lnSpcReduction="10000"/>
-          </a:bodyPr>
+        <p:spPr/>
+        <p:txBody>
+          <a:bodyPr/>
           <a:lstStyle/>
           <a:p>
             <a:r>
               <a:rPr lang="en-US" sz="4000" dirty="0"/>
-              <a:t>http://bit.ly/2f7o4Q5</a:t>
-            </a:r>
-            <a:endParaRPr lang="en-US" sz="6000" dirty="0" smtClean="0"/>
-          </a:p>
-          <a:p>
+              <a:t>http://</a:t>
+            </a:r>
             <a:r>
               <a:rPr lang="en-US" sz="4000" dirty="0" smtClean="0"/>
-              <a:t>http</a:t>
-            </a:r>
-            <a:r>
-              <a:rPr lang="en-US" sz="4000" dirty="0"/>
-              <a:t>://</a:t>
-            </a:r>
-            <a:r>
-              <a:rPr lang="en-US" sz="4000" dirty="0" smtClean="0"/>
-              <a:t>oreil.ly/1UnNtFe</a:t>
-            </a:r>
-          </a:p>
-          <a:p>
-            <a:r>
-              <a:rPr lang="en-US" dirty="0" smtClean="0"/>
-              <a:t>Warning: This is advanced level!</a:t>
-            </a:r>
-          </a:p>
-          <a:p>
-            <a:r>
-              <a:rPr lang="en-US" sz="2000" dirty="0" smtClean="0"/>
-              <a:t>Also: The d3 library contains geo maps of many kinds already.</a:t>
-            </a:r>
-            <a:endParaRPr lang="en-US" sz="2000" dirty="0"/>
+              <a:t>bit.ly/2xdgJsI</a:t>
+            </a:r>
+          </a:p>
+          <a:p>
+            <a:r>
+              <a:rPr lang="en-US" dirty="0" smtClean="0"/>
+              <a:t>Plug: </a:t>
+            </a:r>
+            <a:r>
+              <a:rPr lang="en-US" dirty="0" err="1" smtClean="0"/>
+              <a:t>VisualCinnamon</a:t>
+            </a:r>
+            <a:r>
+              <a:rPr lang="en-US" dirty="0" smtClean="0"/>
+              <a:t> is extraordinary. Their work on SVG in particular is the best I have found to date.</a:t>
+            </a:r>
+            <a:endParaRPr lang="en-US" dirty="0"/>
           </a:p>
         </p:txBody>
       </p:sp>
     </p:spTree>
     <p:extLst>
       <p:ext uri="{BB962C8B-B14F-4D97-AF65-F5344CB8AC3E}">
-        <p14:creationId xmlns:p14="http://schemas.microsoft.com/office/powerpoint/2010/main" val="1384479126"/>
+        <p14:creationId xmlns:p14="http://schemas.microsoft.com/office/powerpoint/2010/main" val="3830241924"/>
       </p:ext>
     </p:extLst>
   </p:cSld>
@@ -13223,6 +13303,13 @@
   <p:clrMapOvr>
     <a:masterClrMapping/>
   </p:clrMapOvr>
+  <p:timing>
+    <p:tnLst>
+      <p:par>
+        <p:cTn id="1" dur="indefinite" restart="never" nodeType="tmRoot"/>
+      </p:par>
+    </p:tnLst>
+  </p:timing>
 </p:sld>
 </file>
 
@@ -13260,7 +13347,7 @@
           <a:p>
             <a:r>
               <a:rPr lang="en-US" dirty="0" smtClean="0"/>
-              <a:t>D3’s Extensive Library:</a:t>
+              <a:t>Maps in D3</a:t>
             </a:r>
             <a:endParaRPr lang="en-US" dirty="0"/>
           </a:p>
@@ -13278,62 +13365,55 @@
         </p:nvSpPr>
         <p:spPr>
           <a:xfrm>
-            <a:off x="713509" y="3509963"/>
-            <a:ext cx="10764982" cy="3056457"/>
+            <a:off x="1524000" y="3602037"/>
+            <a:ext cx="9144000" cy="2083868"/>
           </a:xfrm>
         </p:spPr>
         <p:txBody>
           <a:bodyPr>
-            <a:normAutofit/>
+            <a:normAutofit lnSpcReduction="10000"/>
           </a:bodyPr>
           <a:lstStyle/>
           <a:p>
-            <a:pPr algn="l"/>
             <a:r>
               <a:rPr lang="en-US" sz="4000" dirty="0"/>
-              <a:t>https://github.com/d3/d3/blob/master/API.md</a:t>
-            </a:r>
-          </a:p>
-          <a:p>
-            <a:pPr algn="l"/>
-            <a:endParaRPr lang="en-US" dirty="0" smtClean="0"/>
-          </a:p>
-          <a:p>
-            <a:pPr algn="l"/>
-            <a:r>
-              <a:rPr lang="en-US" dirty="0" smtClean="0"/>
-              <a:t>Statistics</a:t>
-            </a:r>
-            <a:r>
-              <a:rPr lang="en-US" dirty="0"/>
-              <a:t>, histograms (4 kinds), ES6’s Map/Set, Nesting, Data Ingestion (CSV, TSV, </a:t>
-            </a:r>
-            <a:r>
-              <a:rPr lang="en-US" dirty="0" err="1"/>
-              <a:t>etc</a:t>
-            </a:r>
-            <a:r>
-              <a:rPr lang="en-US" dirty="0"/>
-              <a:t>), many </a:t>
-            </a:r>
-            <a:r>
-              <a:rPr lang="en-US" dirty="0" smtClean="0"/>
-              <a:t>animation/easing/time </a:t>
-            </a:r>
-            <a:r>
-              <a:rPr lang="en-US" dirty="0"/>
-              <a:t>options, force/physics, geography and projections, spherical maps/math, and that is just the first 25% of it: </a:t>
-            </a:r>
-          </a:p>
-          <a:p>
-            <a:endParaRPr lang="en-US" dirty="0"/>
+              <a:t>http://bit.ly/2f7o4Q5</a:t>
+            </a:r>
+            <a:endParaRPr lang="en-US" sz="6000" dirty="0" smtClean="0"/>
+          </a:p>
+          <a:p>
+            <a:r>
+              <a:rPr lang="en-US" sz="4000" dirty="0" smtClean="0"/>
+              <a:t>http</a:t>
+            </a:r>
+            <a:r>
+              <a:rPr lang="en-US" sz="4000" dirty="0"/>
+              <a:t>://</a:t>
+            </a:r>
+            <a:r>
+              <a:rPr lang="en-US" sz="4000" dirty="0" smtClean="0"/>
+              <a:t>oreil.ly/1UnNtFe</a:t>
+            </a:r>
+          </a:p>
+          <a:p>
+            <a:r>
+              <a:rPr lang="en-US" dirty="0" smtClean="0"/>
+              <a:t>Warning: This is advanced level!</a:t>
+            </a:r>
+          </a:p>
+          <a:p>
+            <a:r>
+              <a:rPr lang="en-US" sz="2000" dirty="0" smtClean="0"/>
+              <a:t>Also: The d3 library contains geo maps of many kinds already.</a:t>
+            </a:r>
+            <a:endParaRPr lang="en-US" sz="2000" dirty="0"/>
           </a:p>
         </p:txBody>
       </p:sp>
     </p:spTree>
     <p:extLst>
       <p:ext uri="{BB962C8B-B14F-4D97-AF65-F5344CB8AC3E}">
-        <p14:creationId xmlns:p14="http://schemas.microsoft.com/office/powerpoint/2010/main" val="1065099257"/>
+        <p14:creationId xmlns:p14="http://schemas.microsoft.com/office/powerpoint/2010/main" val="1384479126"/>
       </p:ext>
     </p:extLst>
   </p:cSld>
@@ -13377,6 +13457,123 @@
           <a:p>
             <a:r>
               <a:rPr lang="en-US" dirty="0" smtClean="0"/>
+              <a:t>D3’s Extensive Library:</a:t>
+            </a:r>
+            <a:endParaRPr lang="en-US" dirty="0"/>
+          </a:p>
+        </p:txBody>
+      </p:sp>
+      <p:sp>
+        <p:nvSpPr>
+          <p:cNvPr id="3" name="Subtitle 2"/>
+          <p:cNvSpPr>
+            <a:spLocks noGrp="1"/>
+          </p:cNvSpPr>
+          <p:nvPr>
+            <p:ph type="subTitle" idx="1"/>
+          </p:nvPr>
+        </p:nvSpPr>
+        <p:spPr>
+          <a:xfrm>
+            <a:off x="713509" y="3509963"/>
+            <a:ext cx="10764982" cy="3056457"/>
+          </a:xfrm>
+        </p:spPr>
+        <p:txBody>
+          <a:bodyPr>
+            <a:normAutofit/>
+          </a:bodyPr>
+          <a:lstStyle/>
+          <a:p>
+            <a:pPr algn="l"/>
+            <a:r>
+              <a:rPr lang="en-US" sz="4000" dirty="0"/>
+              <a:t>https://github.com/d3/d3/blob/master/API.md</a:t>
+            </a:r>
+          </a:p>
+          <a:p>
+            <a:pPr algn="l"/>
+            <a:endParaRPr lang="en-US" dirty="0" smtClean="0"/>
+          </a:p>
+          <a:p>
+            <a:pPr algn="l"/>
+            <a:r>
+              <a:rPr lang="en-US" dirty="0" smtClean="0"/>
+              <a:t>Statistics</a:t>
+            </a:r>
+            <a:r>
+              <a:rPr lang="en-US" dirty="0"/>
+              <a:t>, histograms (4 kinds), ES6’s Map/Set, Nesting, Data Ingestion (CSV, TSV, </a:t>
+            </a:r>
+            <a:r>
+              <a:rPr lang="en-US" dirty="0" err="1"/>
+              <a:t>etc</a:t>
+            </a:r>
+            <a:r>
+              <a:rPr lang="en-US" dirty="0"/>
+              <a:t>), many </a:t>
+            </a:r>
+            <a:r>
+              <a:rPr lang="en-US" dirty="0" smtClean="0"/>
+              <a:t>animation/easing/time </a:t>
+            </a:r>
+            <a:r>
+              <a:rPr lang="en-US" dirty="0"/>
+              <a:t>options, force/physics, geography and projections, spherical maps/math, and that is just the first 25% of it: </a:t>
+            </a:r>
+          </a:p>
+          <a:p>
+            <a:endParaRPr lang="en-US" dirty="0"/>
+          </a:p>
+        </p:txBody>
+      </p:sp>
+    </p:spTree>
+    <p:extLst>
+      <p:ext uri="{BB962C8B-B14F-4D97-AF65-F5344CB8AC3E}">
+        <p14:creationId xmlns:p14="http://schemas.microsoft.com/office/powerpoint/2010/main" val="1065099257"/>
+      </p:ext>
+    </p:extLst>
+  </p:cSld>
+  <p:clrMapOvr>
+    <a:masterClrMapping/>
+  </p:clrMapOvr>
+</p:sld>
+</file>
+
+<file path=ppt/slides/slide62.xml><?xml version="1.0" encoding="utf-8"?>
+<p:sld xmlns:a="http://schemas.openxmlformats.org/drawingml/2006/main" xmlns:r="http://schemas.openxmlformats.org/officeDocument/2006/relationships" xmlns:p="http://schemas.openxmlformats.org/presentationml/2006/main">
+  <p:cSld>
+    <p:spTree>
+      <p:nvGrpSpPr>
+        <p:cNvPr id="1" name=""/>
+        <p:cNvGrpSpPr/>
+        <p:nvPr/>
+      </p:nvGrpSpPr>
+      <p:grpSpPr>
+        <a:xfrm>
+          <a:off x="0" y="0"/>
+          <a:ext cx="0" cy="0"/>
+          <a:chOff x="0" y="0"/>
+          <a:chExt cx="0" cy="0"/>
+        </a:xfrm>
+      </p:grpSpPr>
+      <p:sp>
+        <p:nvSpPr>
+          <p:cNvPr id="2" name="Title 1"/>
+          <p:cNvSpPr>
+            <a:spLocks noGrp="1"/>
+          </p:cNvSpPr>
+          <p:nvPr>
+            <p:ph type="ctrTitle"/>
+          </p:nvPr>
+        </p:nvSpPr>
+        <p:spPr/>
+        <p:txBody>
+          <a:bodyPr/>
+          <a:lstStyle/>
+          <a:p>
+            <a:r>
+              <a:rPr lang="en-US" dirty="0" smtClean="0"/>
               <a:t>Canvas and D3</a:t>
             </a:r>
             <a:endParaRPr lang="en-US" dirty="0"/>
@@ -13436,7 +13633,7 @@
 </p:sld>
 </file>
 
-<file path=ppt/slides/slide62.xml><?xml version="1.0" encoding="utf-8"?>
+<file path=ppt/slides/slide63.xml><?xml version="1.0" encoding="utf-8"?>
 <p:sld xmlns:a="http://schemas.openxmlformats.org/drawingml/2006/main" xmlns:r="http://schemas.openxmlformats.org/officeDocument/2006/relationships" xmlns:p="http://schemas.openxmlformats.org/presentationml/2006/main">
   <p:cSld>
     <p:spTree>
@@ -13620,6 +13817,13 @@
   <p:clrMapOvr>
     <a:masterClrMapping/>
   </p:clrMapOvr>
+  <p:timing>
+    <p:tnLst>
+      <p:par>
+        <p:cTn id="1" dur="indefinite" restart="never" nodeType="tmRoot"/>
+      </p:par>
+    </p:tnLst>
+  </p:timing>
 </p:sld>
 </file>
 
@@ -13703,6 +13907,13 @@
   <p:clrMapOvr>
     <a:masterClrMapping/>
   </p:clrMapOvr>
+  <p:timing>
+    <p:tnLst>
+      <p:par>
+        <p:cTn id="1" dur="indefinite" restart="never" nodeType="tmRoot"/>
+      </p:par>
+    </p:tnLst>
+  </p:timing>
 </p:sld>
 </file>
 
@@ -13779,6 +13990,13 @@
   <p:clrMapOvr>
     <a:masterClrMapping/>
   </p:clrMapOvr>
+  <p:timing>
+    <p:tnLst>
+      <p:par>
+        <p:cTn id="1" dur="indefinite" restart="never" nodeType="tmRoot"/>
+      </p:par>
+    </p:tnLst>
+  </p:timing>
 </p:sld>
 </file>
 

</xml_diff>